<commit_message>
Updated all sections up to section 6 of the manuscript.
</commit_message>
<xml_diff>
--- a/Manuscript/Figures/02_Data_Example_FC_OBS.pptx
+++ b/Manuscript/Figures/02_Data_Example_FC_OBS.pptx
@@ -5,7 +5,7 @@
     <p:sldMasterId id="2147483720" r:id="rId1"/>
   </p:sldMasterIdLst>
   <p:sldIdLst>
-    <p:sldId id="256" r:id="rId2"/>
+    <p:sldId id="257" r:id="rId2"/>
   </p:sldIdLst>
   <p:sldSz cx="6588125" cy="3887788"/>
   <p:notesSz cx="6858000" cy="9144000"/>
@@ -123,6 +123,494 @@
 <file path=ppt/changesInfos/changesInfo1.xml><?xml version="1.0" encoding="utf-8"?>
 <pc:chgInfo xmlns:a="http://schemas.openxmlformats.org/drawingml/2006/main" xmlns:r="http://schemas.openxmlformats.org/officeDocument/2006/relationships" xmlns:ac="http://schemas.microsoft.com/office/drawing/2013/main/command" xmlns:pc="http://schemas.microsoft.com/office/powerpoint/2013/main/command">
   <pc:docChgLst>
+    <pc:chgData name="Fatima Pillosu" userId="a6295d4dc9e22643" providerId="LiveId" clId="{0756FD03-1706-4472-A4C9-E6951E3B5C4C}"/>
+    <pc:docChg chg="custSel modSld">
+      <pc:chgData name="Fatima Pillosu" userId="a6295d4dc9e22643" providerId="LiveId" clId="{0756FD03-1706-4472-A4C9-E6951E3B5C4C}" dt="2023-11-29T09:38:00.207" v="52" actId="1036"/>
+      <pc:docMkLst>
+        <pc:docMk/>
+      </pc:docMkLst>
+      <pc:sldChg chg="addSp delSp modSp mod">
+        <pc:chgData name="Fatima Pillosu" userId="a6295d4dc9e22643" providerId="LiveId" clId="{0756FD03-1706-4472-A4C9-E6951E3B5C4C}" dt="2023-11-29T09:38:00.207" v="52" actId="1036"/>
+        <pc:sldMkLst>
+          <pc:docMk/>
+          <pc:sldMk cId="1072346714" sldId="256"/>
+        </pc:sldMkLst>
+        <pc:spChg chg="del mod">
+          <ac:chgData name="Fatima Pillosu" userId="a6295d4dc9e22643" providerId="LiveId" clId="{0756FD03-1706-4472-A4C9-E6951E3B5C4C}" dt="2023-11-29T09:37:33.019" v="49" actId="21"/>
+          <ac:spMkLst>
+            <pc:docMk/>
+            <pc:sldMk cId="1072346714" sldId="256"/>
+            <ac:spMk id="26" creationId="{4D6BD6C7-6D5D-3367-95B6-7A5399D42A36}"/>
+          </ac:spMkLst>
+        </pc:spChg>
+        <pc:spChg chg="del mod">
+          <ac:chgData name="Fatima Pillosu" userId="a6295d4dc9e22643" providerId="LiveId" clId="{0756FD03-1706-4472-A4C9-E6951E3B5C4C}" dt="2023-11-29T09:37:33.019" v="49" actId="21"/>
+          <ac:spMkLst>
+            <pc:docMk/>
+            <pc:sldMk cId="1072346714" sldId="256"/>
+            <ac:spMk id="27" creationId="{33D724CA-F564-BB24-4C21-3B17DB159837}"/>
+          </ac:spMkLst>
+        </pc:spChg>
+        <pc:spChg chg="del mod">
+          <ac:chgData name="Fatima Pillosu" userId="a6295d4dc9e22643" providerId="LiveId" clId="{0756FD03-1706-4472-A4C9-E6951E3B5C4C}" dt="2023-11-29T09:37:33.019" v="49" actId="21"/>
+          <ac:spMkLst>
+            <pc:docMk/>
+            <pc:sldMk cId="1072346714" sldId="256"/>
+            <ac:spMk id="28" creationId="{FADEB154-1E14-E07E-AE86-1E1B57D9D799}"/>
+          </ac:spMkLst>
+        </pc:spChg>
+        <pc:spChg chg="del mod">
+          <ac:chgData name="Fatima Pillosu" userId="a6295d4dc9e22643" providerId="LiveId" clId="{0756FD03-1706-4472-A4C9-E6951E3B5C4C}" dt="2023-11-29T09:37:33.019" v="49" actId="21"/>
+          <ac:spMkLst>
+            <pc:docMk/>
+            <pc:sldMk cId="1072346714" sldId="256"/>
+            <ac:spMk id="29" creationId="{4D64AC32-9D89-42AB-CA47-4E37B5E9C371}"/>
+          </ac:spMkLst>
+        </pc:spChg>
+        <pc:spChg chg="del mod">
+          <ac:chgData name="Fatima Pillosu" userId="a6295d4dc9e22643" providerId="LiveId" clId="{0756FD03-1706-4472-A4C9-E6951E3B5C4C}" dt="2023-11-29T09:37:33.019" v="49" actId="21"/>
+          <ac:spMkLst>
+            <pc:docMk/>
+            <pc:sldMk cId="1072346714" sldId="256"/>
+            <ac:spMk id="30" creationId="{C0E4CF8B-2B7D-3A99-C2A0-B902715DC82D}"/>
+          </ac:spMkLst>
+        </pc:spChg>
+        <pc:spChg chg="del mod">
+          <ac:chgData name="Fatima Pillosu" userId="a6295d4dc9e22643" providerId="LiveId" clId="{0756FD03-1706-4472-A4C9-E6951E3B5C4C}" dt="2023-11-29T09:37:33.019" v="49" actId="21"/>
+          <ac:spMkLst>
+            <pc:docMk/>
+            <pc:sldMk cId="1072346714" sldId="256"/>
+            <ac:spMk id="34" creationId="{6A0CAB05-3A1A-545D-00E5-C520ADE2DE98}"/>
+          </ac:spMkLst>
+        </pc:spChg>
+        <pc:spChg chg="del mod">
+          <ac:chgData name="Fatima Pillosu" userId="a6295d4dc9e22643" providerId="LiveId" clId="{0756FD03-1706-4472-A4C9-E6951E3B5C4C}" dt="2023-11-29T09:37:33.019" v="49" actId="21"/>
+          <ac:spMkLst>
+            <pc:docMk/>
+            <pc:sldMk cId="1072346714" sldId="256"/>
+            <ac:spMk id="35" creationId="{DB0EAE5B-B91F-04EC-7FD5-6281E2FC4C6C}"/>
+          </ac:spMkLst>
+        </pc:spChg>
+        <pc:spChg chg="del mod">
+          <ac:chgData name="Fatima Pillosu" userId="a6295d4dc9e22643" providerId="LiveId" clId="{0756FD03-1706-4472-A4C9-E6951E3B5C4C}" dt="2023-11-29T09:37:33.019" v="49" actId="21"/>
+          <ac:spMkLst>
+            <pc:docMk/>
+            <pc:sldMk cId="1072346714" sldId="256"/>
+            <ac:spMk id="36" creationId="{5F68747B-853A-30C8-389E-AA4F4C616EC8}"/>
+          </ac:spMkLst>
+        </pc:spChg>
+        <pc:spChg chg="del mod">
+          <ac:chgData name="Fatima Pillosu" userId="a6295d4dc9e22643" providerId="LiveId" clId="{0756FD03-1706-4472-A4C9-E6951E3B5C4C}" dt="2023-11-29T09:37:33.019" v="49" actId="21"/>
+          <ac:spMkLst>
+            <pc:docMk/>
+            <pc:sldMk cId="1072346714" sldId="256"/>
+            <ac:spMk id="37" creationId="{C4FCC9A3-D86A-1A5F-B937-22E313A502C5}"/>
+          </ac:spMkLst>
+        </pc:spChg>
+        <pc:spChg chg="del mod">
+          <ac:chgData name="Fatima Pillosu" userId="a6295d4dc9e22643" providerId="LiveId" clId="{0756FD03-1706-4472-A4C9-E6951E3B5C4C}" dt="2023-11-29T09:37:33.019" v="49" actId="21"/>
+          <ac:spMkLst>
+            <pc:docMk/>
+            <pc:sldMk cId="1072346714" sldId="256"/>
+            <ac:spMk id="38" creationId="{1F0DCFE1-BA5A-8CF0-68A5-5AF9DF122315}"/>
+          </ac:spMkLst>
+        </pc:spChg>
+        <pc:spChg chg="del mod">
+          <ac:chgData name="Fatima Pillosu" userId="a6295d4dc9e22643" providerId="LiveId" clId="{0756FD03-1706-4472-A4C9-E6951E3B5C4C}" dt="2023-11-29T09:37:33.019" v="49" actId="21"/>
+          <ac:spMkLst>
+            <pc:docMk/>
+            <pc:sldMk cId="1072346714" sldId="256"/>
+            <ac:spMk id="39" creationId="{2E377314-5496-12AD-8BDF-90A42DD8E8F4}"/>
+          </ac:spMkLst>
+        </pc:spChg>
+        <pc:spChg chg="del mod">
+          <ac:chgData name="Fatima Pillosu" userId="a6295d4dc9e22643" providerId="LiveId" clId="{0756FD03-1706-4472-A4C9-E6951E3B5C4C}" dt="2023-11-29T09:37:33.019" v="49" actId="21"/>
+          <ac:spMkLst>
+            <pc:docMk/>
+            <pc:sldMk cId="1072346714" sldId="256"/>
+            <ac:spMk id="40" creationId="{B2A63B25-69CE-4281-940E-8AA360570CD0}"/>
+          </ac:spMkLst>
+        </pc:spChg>
+        <pc:spChg chg="del mod">
+          <ac:chgData name="Fatima Pillosu" userId="a6295d4dc9e22643" providerId="LiveId" clId="{0756FD03-1706-4472-A4C9-E6951E3B5C4C}" dt="2023-11-29T09:37:33.019" v="49" actId="21"/>
+          <ac:spMkLst>
+            <pc:docMk/>
+            <pc:sldMk cId="1072346714" sldId="256"/>
+            <ac:spMk id="41" creationId="{B7E954CF-847A-5202-4A7E-21E743CEE0EC}"/>
+          </ac:spMkLst>
+        </pc:spChg>
+        <pc:spChg chg="del mod">
+          <ac:chgData name="Fatima Pillosu" userId="a6295d4dc9e22643" providerId="LiveId" clId="{0756FD03-1706-4472-A4C9-E6951E3B5C4C}" dt="2023-11-29T09:37:33.019" v="49" actId="21"/>
+          <ac:spMkLst>
+            <pc:docMk/>
+            <pc:sldMk cId="1072346714" sldId="256"/>
+            <ac:spMk id="42" creationId="{A466677D-E070-FE73-93B9-CD8A8623DA35}"/>
+          </ac:spMkLst>
+        </pc:spChg>
+        <pc:spChg chg="del mod">
+          <ac:chgData name="Fatima Pillosu" userId="a6295d4dc9e22643" providerId="LiveId" clId="{0756FD03-1706-4472-A4C9-E6951E3B5C4C}" dt="2023-11-29T09:37:33.019" v="49" actId="21"/>
+          <ac:spMkLst>
+            <pc:docMk/>
+            <pc:sldMk cId="1072346714" sldId="256"/>
+            <ac:spMk id="43" creationId="{7743BAD9-1439-F899-912D-2D4812D5D5C8}"/>
+          </ac:spMkLst>
+        </pc:spChg>
+        <pc:spChg chg="del mod">
+          <ac:chgData name="Fatima Pillosu" userId="a6295d4dc9e22643" providerId="LiveId" clId="{0756FD03-1706-4472-A4C9-E6951E3B5C4C}" dt="2023-11-29T09:37:33.019" v="49" actId="21"/>
+          <ac:spMkLst>
+            <pc:docMk/>
+            <pc:sldMk cId="1072346714" sldId="256"/>
+            <ac:spMk id="44" creationId="{810A7679-63A0-270B-D9A3-1587B7A0592D}"/>
+          </ac:spMkLst>
+        </pc:spChg>
+        <pc:spChg chg="del mod">
+          <ac:chgData name="Fatima Pillosu" userId="a6295d4dc9e22643" providerId="LiveId" clId="{0756FD03-1706-4472-A4C9-E6951E3B5C4C}" dt="2023-11-29T09:37:33.019" v="49" actId="21"/>
+          <ac:spMkLst>
+            <pc:docMk/>
+            <pc:sldMk cId="1072346714" sldId="256"/>
+            <ac:spMk id="45" creationId="{BAE5F748-D858-F541-E783-B26433165740}"/>
+          </ac:spMkLst>
+        </pc:spChg>
+        <pc:spChg chg="del mod">
+          <ac:chgData name="Fatima Pillosu" userId="a6295d4dc9e22643" providerId="LiveId" clId="{0756FD03-1706-4472-A4C9-E6951E3B5C4C}" dt="2023-11-29T09:37:33.019" v="49" actId="21"/>
+          <ac:spMkLst>
+            <pc:docMk/>
+            <pc:sldMk cId="1072346714" sldId="256"/>
+            <ac:spMk id="46" creationId="{18FED8DD-8957-CF93-A4D5-2B74A0368F2E}"/>
+          </ac:spMkLst>
+        </pc:spChg>
+        <pc:spChg chg="del mod">
+          <ac:chgData name="Fatima Pillosu" userId="a6295d4dc9e22643" providerId="LiveId" clId="{0756FD03-1706-4472-A4C9-E6951E3B5C4C}" dt="2023-11-29T09:37:33.019" v="49" actId="21"/>
+          <ac:spMkLst>
+            <pc:docMk/>
+            <pc:sldMk cId="1072346714" sldId="256"/>
+            <ac:spMk id="47" creationId="{334882D8-1A9D-CC8A-06CF-488A793CF256}"/>
+          </ac:spMkLst>
+        </pc:spChg>
+        <pc:spChg chg="del mod">
+          <ac:chgData name="Fatima Pillosu" userId="a6295d4dc9e22643" providerId="LiveId" clId="{0756FD03-1706-4472-A4C9-E6951E3B5C4C}" dt="2023-11-29T09:37:33.019" v="49" actId="21"/>
+          <ac:spMkLst>
+            <pc:docMk/>
+            <pc:sldMk cId="1072346714" sldId="256"/>
+            <ac:spMk id="48" creationId="{F6A8E961-9243-0767-D3AA-AB18C84ADE56}"/>
+          </ac:spMkLst>
+        </pc:spChg>
+        <pc:spChg chg="del mod">
+          <ac:chgData name="Fatima Pillosu" userId="a6295d4dc9e22643" providerId="LiveId" clId="{0756FD03-1706-4472-A4C9-E6951E3B5C4C}" dt="2023-11-29T09:37:33.019" v="49" actId="21"/>
+          <ac:spMkLst>
+            <pc:docMk/>
+            <pc:sldMk cId="1072346714" sldId="256"/>
+            <ac:spMk id="49" creationId="{C4F5BF5B-44D1-F769-4A52-FEEA32A1D3C7}"/>
+          </ac:spMkLst>
+        </pc:spChg>
+        <pc:spChg chg="del mod">
+          <ac:chgData name="Fatima Pillosu" userId="a6295d4dc9e22643" providerId="LiveId" clId="{0756FD03-1706-4472-A4C9-E6951E3B5C4C}" dt="2023-11-29T09:37:33.019" v="49" actId="21"/>
+          <ac:spMkLst>
+            <pc:docMk/>
+            <pc:sldMk cId="1072346714" sldId="256"/>
+            <ac:spMk id="50" creationId="{766938A5-4E33-9EEA-7BC6-2645316AC3A4}"/>
+          </ac:spMkLst>
+        </pc:spChg>
+        <pc:spChg chg="del mod">
+          <ac:chgData name="Fatima Pillosu" userId="a6295d4dc9e22643" providerId="LiveId" clId="{0756FD03-1706-4472-A4C9-E6951E3B5C4C}" dt="2023-11-29T09:37:33.019" v="49" actId="21"/>
+          <ac:spMkLst>
+            <pc:docMk/>
+            <pc:sldMk cId="1072346714" sldId="256"/>
+            <ac:spMk id="51" creationId="{676F60C1-93DC-03F5-E632-0CE4750575A4}"/>
+          </ac:spMkLst>
+        </pc:spChg>
+        <pc:spChg chg="add del">
+          <ac:chgData name="Fatima Pillosu" userId="a6295d4dc9e22643" providerId="LiveId" clId="{0756FD03-1706-4472-A4C9-E6951E3B5C4C}" dt="2023-11-29T09:37:20.464" v="48" actId="478"/>
+          <ac:spMkLst>
+            <pc:docMk/>
+            <pc:sldMk cId="1072346714" sldId="256"/>
+            <ac:spMk id="52" creationId="{68B7249F-6B7F-8463-BFAB-6DF1A571F792}"/>
+          </ac:spMkLst>
+        </pc:spChg>
+        <pc:spChg chg="add mod">
+          <ac:chgData name="Fatima Pillosu" userId="a6295d4dc9e22643" providerId="LiveId" clId="{0756FD03-1706-4472-A4C9-E6951E3B5C4C}" dt="2023-11-29T09:37:54.207" v="50"/>
+          <ac:spMkLst>
+            <pc:docMk/>
+            <pc:sldMk cId="1072346714" sldId="256"/>
+            <ac:spMk id="57" creationId="{62474F9B-9549-98F4-5E8F-BBEAC7016D7F}"/>
+          </ac:spMkLst>
+        </pc:spChg>
+        <pc:spChg chg="add mod">
+          <ac:chgData name="Fatima Pillosu" userId="a6295d4dc9e22643" providerId="LiveId" clId="{0756FD03-1706-4472-A4C9-E6951E3B5C4C}" dt="2023-11-29T09:37:54.207" v="50"/>
+          <ac:spMkLst>
+            <pc:docMk/>
+            <pc:sldMk cId="1072346714" sldId="256"/>
+            <ac:spMk id="58" creationId="{230FF514-E474-F3B0-E4CA-E17B20299031}"/>
+          </ac:spMkLst>
+        </pc:spChg>
+        <pc:spChg chg="add mod">
+          <ac:chgData name="Fatima Pillosu" userId="a6295d4dc9e22643" providerId="LiveId" clId="{0756FD03-1706-4472-A4C9-E6951E3B5C4C}" dt="2023-11-29T09:37:54.207" v="50"/>
+          <ac:spMkLst>
+            <pc:docMk/>
+            <pc:sldMk cId="1072346714" sldId="256"/>
+            <ac:spMk id="59" creationId="{60EFB212-C205-78DB-7709-6791A8193261}"/>
+          </ac:spMkLst>
+        </pc:spChg>
+        <pc:spChg chg="add mod">
+          <ac:chgData name="Fatima Pillosu" userId="a6295d4dc9e22643" providerId="LiveId" clId="{0756FD03-1706-4472-A4C9-E6951E3B5C4C}" dt="2023-11-29T09:37:54.207" v="50"/>
+          <ac:spMkLst>
+            <pc:docMk/>
+            <pc:sldMk cId="1072346714" sldId="256"/>
+            <ac:spMk id="60" creationId="{7376B85B-917A-079A-5132-DEDB5C5E7834}"/>
+          </ac:spMkLst>
+        </pc:spChg>
+        <pc:spChg chg="add mod">
+          <ac:chgData name="Fatima Pillosu" userId="a6295d4dc9e22643" providerId="LiveId" clId="{0756FD03-1706-4472-A4C9-E6951E3B5C4C}" dt="2023-11-29T09:38:00.207" v="52" actId="1036"/>
+          <ac:spMkLst>
+            <pc:docMk/>
+            <pc:sldMk cId="1072346714" sldId="256"/>
+            <ac:spMk id="61" creationId="{A9ADF02B-2B10-FE58-83FB-270E1B72F374}"/>
+          </ac:spMkLst>
+        </pc:spChg>
+        <pc:spChg chg="mod">
+          <ac:chgData name="Fatima Pillosu" userId="a6295d4dc9e22643" providerId="LiveId" clId="{0756FD03-1706-4472-A4C9-E6951E3B5C4C}" dt="2023-11-29T09:37:54.207" v="50"/>
+          <ac:spMkLst>
+            <pc:docMk/>
+            <pc:sldMk cId="1072346714" sldId="256"/>
+            <ac:spMk id="64" creationId="{21139AFA-61F8-7687-C77E-BFDBF491ED17}"/>
+          </ac:spMkLst>
+        </pc:spChg>
+        <pc:spChg chg="add mod">
+          <ac:chgData name="Fatima Pillosu" userId="a6295d4dc9e22643" providerId="LiveId" clId="{0756FD03-1706-4472-A4C9-E6951E3B5C4C}" dt="2023-11-29T09:37:54.207" v="50"/>
+          <ac:spMkLst>
+            <pc:docMk/>
+            <pc:sldMk cId="1072346714" sldId="256"/>
+            <ac:spMk id="65" creationId="{C3AB6EEE-A212-6219-4457-D0464EB0CCAE}"/>
+          </ac:spMkLst>
+        </pc:spChg>
+        <pc:spChg chg="add mod">
+          <ac:chgData name="Fatima Pillosu" userId="a6295d4dc9e22643" providerId="LiveId" clId="{0756FD03-1706-4472-A4C9-E6951E3B5C4C}" dt="2023-11-29T09:37:54.207" v="50"/>
+          <ac:spMkLst>
+            <pc:docMk/>
+            <pc:sldMk cId="1072346714" sldId="256"/>
+            <ac:spMk id="66" creationId="{28F2E26B-47E5-8BA5-47B6-5E6D88369717}"/>
+          </ac:spMkLst>
+        </pc:spChg>
+        <pc:spChg chg="add mod">
+          <ac:chgData name="Fatima Pillosu" userId="a6295d4dc9e22643" providerId="LiveId" clId="{0756FD03-1706-4472-A4C9-E6951E3B5C4C}" dt="2023-11-29T09:37:54.207" v="50"/>
+          <ac:spMkLst>
+            <pc:docMk/>
+            <pc:sldMk cId="1072346714" sldId="256"/>
+            <ac:spMk id="67" creationId="{DB00622D-EFA4-873C-60A9-8D8057632DA8}"/>
+          </ac:spMkLst>
+        </pc:spChg>
+        <pc:spChg chg="add mod">
+          <ac:chgData name="Fatima Pillosu" userId="a6295d4dc9e22643" providerId="LiveId" clId="{0756FD03-1706-4472-A4C9-E6951E3B5C4C}" dt="2023-11-29T09:37:54.207" v="50"/>
+          <ac:spMkLst>
+            <pc:docMk/>
+            <pc:sldMk cId="1072346714" sldId="256"/>
+            <ac:spMk id="68" creationId="{4DC2DACD-FD0F-3B6F-1271-24B1715E8415}"/>
+          </ac:spMkLst>
+        </pc:spChg>
+        <pc:spChg chg="add mod">
+          <ac:chgData name="Fatima Pillosu" userId="a6295d4dc9e22643" providerId="LiveId" clId="{0756FD03-1706-4472-A4C9-E6951E3B5C4C}" dt="2023-11-29T09:37:54.207" v="50"/>
+          <ac:spMkLst>
+            <pc:docMk/>
+            <pc:sldMk cId="1072346714" sldId="256"/>
+            <ac:spMk id="69" creationId="{3D7E1B29-F647-CFAB-E0D7-3C9F7A2144FC}"/>
+          </ac:spMkLst>
+        </pc:spChg>
+        <pc:spChg chg="add mod">
+          <ac:chgData name="Fatima Pillosu" userId="a6295d4dc9e22643" providerId="LiveId" clId="{0756FD03-1706-4472-A4C9-E6951E3B5C4C}" dt="2023-11-29T09:37:54.207" v="50"/>
+          <ac:spMkLst>
+            <pc:docMk/>
+            <pc:sldMk cId="1072346714" sldId="256"/>
+            <ac:spMk id="70" creationId="{CB0F925A-BE4F-BA21-B616-81D1EE21A5D3}"/>
+          </ac:spMkLst>
+        </pc:spChg>
+        <pc:spChg chg="add mod">
+          <ac:chgData name="Fatima Pillosu" userId="a6295d4dc9e22643" providerId="LiveId" clId="{0756FD03-1706-4472-A4C9-E6951E3B5C4C}" dt="2023-11-29T09:37:54.207" v="50"/>
+          <ac:spMkLst>
+            <pc:docMk/>
+            <pc:sldMk cId="1072346714" sldId="256"/>
+            <ac:spMk id="71" creationId="{87594D03-4FC2-F597-40DD-0BC8E77ADAB0}"/>
+          </ac:spMkLst>
+        </pc:spChg>
+        <pc:spChg chg="add mod">
+          <ac:chgData name="Fatima Pillosu" userId="a6295d4dc9e22643" providerId="LiveId" clId="{0756FD03-1706-4472-A4C9-E6951E3B5C4C}" dt="2023-11-29T09:37:54.207" v="50"/>
+          <ac:spMkLst>
+            <pc:docMk/>
+            <pc:sldMk cId="1072346714" sldId="256"/>
+            <ac:spMk id="72" creationId="{B4A9E0F8-A058-E30E-B39A-661259D970B7}"/>
+          </ac:spMkLst>
+        </pc:spChg>
+        <pc:spChg chg="add mod">
+          <ac:chgData name="Fatima Pillosu" userId="a6295d4dc9e22643" providerId="LiveId" clId="{0756FD03-1706-4472-A4C9-E6951E3B5C4C}" dt="2023-11-29T09:37:54.207" v="50"/>
+          <ac:spMkLst>
+            <pc:docMk/>
+            <pc:sldMk cId="1072346714" sldId="256"/>
+            <ac:spMk id="73" creationId="{CB9643F3-7AEE-4154-7560-89FF50440D39}"/>
+          </ac:spMkLst>
+        </pc:spChg>
+        <pc:spChg chg="add mod">
+          <ac:chgData name="Fatima Pillosu" userId="a6295d4dc9e22643" providerId="LiveId" clId="{0756FD03-1706-4472-A4C9-E6951E3B5C4C}" dt="2023-11-29T09:37:54.207" v="50"/>
+          <ac:spMkLst>
+            <pc:docMk/>
+            <pc:sldMk cId="1072346714" sldId="256"/>
+            <ac:spMk id="74" creationId="{DC3ED00A-8225-F3DF-6AFC-3E3B416AF7A2}"/>
+          </ac:spMkLst>
+        </pc:spChg>
+        <pc:spChg chg="add mod">
+          <ac:chgData name="Fatima Pillosu" userId="a6295d4dc9e22643" providerId="LiveId" clId="{0756FD03-1706-4472-A4C9-E6951E3B5C4C}" dt="2023-11-29T09:37:54.207" v="50"/>
+          <ac:spMkLst>
+            <pc:docMk/>
+            <pc:sldMk cId="1072346714" sldId="256"/>
+            <ac:spMk id="75" creationId="{93DD7934-4D1F-203F-115A-8CD30267714B}"/>
+          </ac:spMkLst>
+        </pc:spChg>
+        <pc:spChg chg="add mod">
+          <ac:chgData name="Fatima Pillosu" userId="a6295d4dc9e22643" providerId="LiveId" clId="{0756FD03-1706-4472-A4C9-E6951E3B5C4C}" dt="2023-11-29T09:37:54.207" v="50"/>
+          <ac:spMkLst>
+            <pc:docMk/>
+            <pc:sldMk cId="1072346714" sldId="256"/>
+            <ac:spMk id="76" creationId="{E612E97C-EBA3-3FE1-2037-0B88C943A875}"/>
+          </ac:spMkLst>
+        </pc:spChg>
+        <pc:spChg chg="add mod">
+          <ac:chgData name="Fatima Pillosu" userId="a6295d4dc9e22643" providerId="LiveId" clId="{0756FD03-1706-4472-A4C9-E6951E3B5C4C}" dt="2023-11-29T09:37:54.207" v="50"/>
+          <ac:spMkLst>
+            <pc:docMk/>
+            <pc:sldMk cId="1072346714" sldId="256"/>
+            <ac:spMk id="77" creationId="{F7686D95-1D1B-55FE-328A-3A54FDE4131B}"/>
+          </ac:spMkLst>
+        </pc:spChg>
+        <pc:spChg chg="add mod">
+          <ac:chgData name="Fatima Pillosu" userId="a6295d4dc9e22643" providerId="LiveId" clId="{0756FD03-1706-4472-A4C9-E6951E3B5C4C}" dt="2023-11-29T09:37:54.207" v="50"/>
+          <ac:spMkLst>
+            <pc:docMk/>
+            <pc:sldMk cId="1072346714" sldId="256"/>
+            <ac:spMk id="78" creationId="{76399EE0-F8AF-AE62-22B7-3A25E5005060}"/>
+          </ac:spMkLst>
+        </pc:spChg>
+        <pc:spChg chg="add mod">
+          <ac:chgData name="Fatima Pillosu" userId="a6295d4dc9e22643" providerId="LiveId" clId="{0756FD03-1706-4472-A4C9-E6951E3B5C4C}" dt="2023-11-29T09:37:54.207" v="50"/>
+          <ac:spMkLst>
+            <pc:docMk/>
+            <pc:sldMk cId="1072346714" sldId="256"/>
+            <ac:spMk id="79" creationId="{38AC4AC0-A304-DFA2-F0FA-E536DBD37F81}"/>
+          </ac:spMkLst>
+        </pc:spChg>
+        <pc:spChg chg="add mod">
+          <ac:chgData name="Fatima Pillosu" userId="a6295d4dc9e22643" providerId="LiveId" clId="{0756FD03-1706-4472-A4C9-E6951E3B5C4C}" dt="2023-11-29T09:37:54.207" v="50"/>
+          <ac:spMkLst>
+            <pc:docMk/>
+            <pc:sldMk cId="1072346714" sldId="256"/>
+            <ac:spMk id="80" creationId="{5AD677FE-FC0E-E649-098B-C7FB7F847778}"/>
+          </ac:spMkLst>
+        </pc:spChg>
+        <pc:spChg chg="add mod">
+          <ac:chgData name="Fatima Pillosu" userId="a6295d4dc9e22643" providerId="LiveId" clId="{0756FD03-1706-4472-A4C9-E6951E3B5C4C}" dt="2023-11-29T09:37:54.207" v="50"/>
+          <ac:spMkLst>
+            <pc:docMk/>
+            <pc:sldMk cId="1072346714" sldId="256"/>
+            <ac:spMk id="81" creationId="{FDD119F1-B8C4-D451-4D83-B8285C2FADE4}"/>
+          </ac:spMkLst>
+        </pc:spChg>
+        <pc:spChg chg="add mod">
+          <ac:chgData name="Fatima Pillosu" userId="a6295d4dc9e22643" providerId="LiveId" clId="{0756FD03-1706-4472-A4C9-E6951E3B5C4C}" dt="2023-11-29T09:37:54.207" v="50"/>
+          <ac:spMkLst>
+            <pc:docMk/>
+            <pc:sldMk cId="1072346714" sldId="256"/>
+            <ac:spMk id="82" creationId="{A86C750C-FB98-9351-A067-610D39232C45}"/>
+          </ac:spMkLst>
+        </pc:spChg>
+        <pc:grpChg chg="del mod">
+          <ac:chgData name="Fatima Pillosu" userId="a6295d4dc9e22643" providerId="LiveId" clId="{0756FD03-1706-4472-A4C9-E6951E3B5C4C}" dt="2023-11-29T09:37:33.019" v="49" actId="21"/>
+          <ac:grpSpMkLst>
+            <pc:docMk/>
+            <pc:sldMk cId="1072346714" sldId="256"/>
+            <ac:grpSpMk id="31" creationId="{C99970EB-0759-371E-60E8-38F5FEFC5971}"/>
+          </ac:grpSpMkLst>
+        </pc:grpChg>
+        <pc:grpChg chg="add mod">
+          <ac:chgData name="Fatima Pillosu" userId="a6295d4dc9e22643" providerId="LiveId" clId="{0756FD03-1706-4472-A4C9-E6951E3B5C4C}" dt="2023-11-29T09:37:54.207" v="50"/>
+          <ac:grpSpMkLst>
+            <pc:docMk/>
+            <pc:sldMk cId="1072346714" sldId="256"/>
+            <ac:grpSpMk id="62" creationId="{610E7790-8E02-B443-1264-38F59A3D3E2B}"/>
+          </ac:grpSpMkLst>
+        </pc:grpChg>
+        <pc:picChg chg="del mod">
+          <ac:chgData name="Fatima Pillosu" userId="a6295d4dc9e22643" providerId="LiveId" clId="{0756FD03-1706-4472-A4C9-E6951E3B5C4C}" dt="2023-11-29T09:37:33.019" v="49" actId="21"/>
+          <ac:picMkLst>
+            <pc:docMk/>
+            <pc:sldMk cId="1072346714" sldId="256"/>
+            <ac:picMk id="22" creationId="{671F6A74-7242-B4F8-81C5-EB111E195B51}"/>
+          </ac:picMkLst>
+        </pc:picChg>
+        <pc:picChg chg="del mod">
+          <ac:chgData name="Fatima Pillosu" userId="a6295d4dc9e22643" providerId="LiveId" clId="{0756FD03-1706-4472-A4C9-E6951E3B5C4C}" dt="2023-11-29T09:37:33.019" v="49" actId="21"/>
+          <ac:picMkLst>
+            <pc:docMk/>
+            <pc:sldMk cId="1072346714" sldId="256"/>
+            <ac:picMk id="23" creationId="{1AE1E841-1645-BFD3-3EE5-C8880A8F1C4F}"/>
+          </ac:picMkLst>
+        </pc:picChg>
+        <pc:picChg chg="del mod">
+          <ac:chgData name="Fatima Pillosu" userId="a6295d4dc9e22643" providerId="LiveId" clId="{0756FD03-1706-4472-A4C9-E6951E3B5C4C}" dt="2023-11-29T09:37:33.019" v="49" actId="21"/>
+          <ac:picMkLst>
+            <pc:docMk/>
+            <pc:sldMk cId="1072346714" sldId="256"/>
+            <ac:picMk id="24" creationId="{C33C068E-1BBA-5EF5-F3D2-8D0CFC725CBD}"/>
+          </ac:picMkLst>
+        </pc:picChg>
+        <pc:picChg chg="del mod">
+          <ac:chgData name="Fatima Pillosu" userId="a6295d4dc9e22643" providerId="LiveId" clId="{0756FD03-1706-4472-A4C9-E6951E3B5C4C}" dt="2023-11-29T09:37:33.019" v="49" actId="21"/>
+          <ac:picMkLst>
+            <pc:docMk/>
+            <pc:sldMk cId="1072346714" sldId="256"/>
+            <ac:picMk id="25" creationId="{BDFA06AF-5E33-11D6-CFA8-257E7EAE5711}"/>
+          </ac:picMkLst>
+        </pc:picChg>
+        <pc:picChg chg="add mod">
+          <ac:chgData name="Fatima Pillosu" userId="a6295d4dc9e22643" providerId="LiveId" clId="{0756FD03-1706-4472-A4C9-E6951E3B5C4C}" dt="2023-11-29T09:37:54.207" v="50"/>
+          <ac:picMkLst>
+            <pc:docMk/>
+            <pc:sldMk cId="1072346714" sldId="256"/>
+            <ac:picMk id="53" creationId="{C1A28376-AEBE-2CB6-3202-C9AB2EB83169}"/>
+          </ac:picMkLst>
+        </pc:picChg>
+        <pc:picChg chg="add mod">
+          <ac:chgData name="Fatima Pillosu" userId="a6295d4dc9e22643" providerId="LiveId" clId="{0756FD03-1706-4472-A4C9-E6951E3B5C4C}" dt="2023-11-29T09:37:54.207" v="50"/>
+          <ac:picMkLst>
+            <pc:docMk/>
+            <pc:sldMk cId="1072346714" sldId="256"/>
+            <ac:picMk id="54" creationId="{D231E065-ED8C-1E5A-E34B-9EF2993E163D}"/>
+          </ac:picMkLst>
+        </pc:picChg>
+        <pc:picChg chg="add mod">
+          <ac:chgData name="Fatima Pillosu" userId="a6295d4dc9e22643" providerId="LiveId" clId="{0756FD03-1706-4472-A4C9-E6951E3B5C4C}" dt="2023-11-29T09:37:54.207" v="50"/>
+          <ac:picMkLst>
+            <pc:docMk/>
+            <pc:sldMk cId="1072346714" sldId="256"/>
+            <ac:picMk id="55" creationId="{1C20D923-F680-860A-8430-00CFCD2244D4}"/>
+          </ac:picMkLst>
+        </pc:picChg>
+        <pc:picChg chg="add mod">
+          <ac:chgData name="Fatima Pillosu" userId="a6295d4dc9e22643" providerId="LiveId" clId="{0756FD03-1706-4472-A4C9-E6951E3B5C4C}" dt="2023-11-29T09:37:54.207" v="50"/>
+          <ac:picMkLst>
+            <pc:docMk/>
+            <pc:sldMk cId="1072346714" sldId="256"/>
+            <ac:picMk id="56" creationId="{F3233E7D-C036-A735-6A90-2B99E9642804}"/>
+          </ac:picMkLst>
+        </pc:picChg>
+        <pc:picChg chg="mod">
+          <ac:chgData name="Fatima Pillosu" userId="a6295d4dc9e22643" providerId="LiveId" clId="{0756FD03-1706-4472-A4C9-E6951E3B5C4C}" dt="2023-11-29T09:37:54.207" v="50"/>
+          <ac:picMkLst>
+            <pc:docMk/>
+            <pc:sldMk cId="1072346714" sldId="256"/>
+            <ac:picMk id="63" creationId="{9D6B798F-5A41-F5C5-8448-FECDF45F68EE}"/>
+          </ac:picMkLst>
+        </pc:picChg>
+      </pc:sldChg>
+    </pc:docChg>
+  </pc:docChgLst>
+  <pc:docChgLst>
     <pc:chgData name="Fatima Pillosu" userId="a6295d4dc9e22643" providerId="LiveId" clId="{8A0A920E-B6E7-4924-87BF-0D5A6B2D1958}"/>
     <pc:docChg chg="undo redo custSel modSld">
       <pc:chgData name="Fatima Pillosu" userId="a6295d4dc9e22643" providerId="LiveId" clId="{8A0A920E-B6E7-4924-87BF-0D5A6B2D1958}" dt="2023-12-21T14:03:20.179" v="613" actId="1036"/>
@@ -823,494 +1311,6 @@
             <ac:cxnSpMk id="90" creationId="{6BC775DB-29E5-8334-F642-4D662BBC5BEC}"/>
           </ac:cxnSpMkLst>
         </pc:cxnChg>
-      </pc:sldChg>
-    </pc:docChg>
-  </pc:docChgLst>
-  <pc:docChgLst>
-    <pc:chgData name="Fatima Pillosu" userId="a6295d4dc9e22643" providerId="LiveId" clId="{0756FD03-1706-4472-A4C9-E6951E3B5C4C}"/>
-    <pc:docChg chg="custSel modSld">
-      <pc:chgData name="Fatima Pillosu" userId="a6295d4dc9e22643" providerId="LiveId" clId="{0756FD03-1706-4472-A4C9-E6951E3B5C4C}" dt="2023-11-29T09:38:00.207" v="52" actId="1036"/>
-      <pc:docMkLst>
-        <pc:docMk/>
-      </pc:docMkLst>
-      <pc:sldChg chg="addSp delSp modSp mod">
-        <pc:chgData name="Fatima Pillosu" userId="a6295d4dc9e22643" providerId="LiveId" clId="{0756FD03-1706-4472-A4C9-E6951E3B5C4C}" dt="2023-11-29T09:38:00.207" v="52" actId="1036"/>
-        <pc:sldMkLst>
-          <pc:docMk/>
-          <pc:sldMk cId="1072346714" sldId="256"/>
-        </pc:sldMkLst>
-        <pc:spChg chg="del mod">
-          <ac:chgData name="Fatima Pillosu" userId="a6295d4dc9e22643" providerId="LiveId" clId="{0756FD03-1706-4472-A4C9-E6951E3B5C4C}" dt="2023-11-29T09:37:33.019" v="49" actId="21"/>
-          <ac:spMkLst>
-            <pc:docMk/>
-            <pc:sldMk cId="1072346714" sldId="256"/>
-            <ac:spMk id="26" creationId="{4D6BD6C7-6D5D-3367-95B6-7A5399D42A36}"/>
-          </ac:spMkLst>
-        </pc:spChg>
-        <pc:spChg chg="del mod">
-          <ac:chgData name="Fatima Pillosu" userId="a6295d4dc9e22643" providerId="LiveId" clId="{0756FD03-1706-4472-A4C9-E6951E3B5C4C}" dt="2023-11-29T09:37:33.019" v="49" actId="21"/>
-          <ac:spMkLst>
-            <pc:docMk/>
-            <pc:sldMk cId="1072346714" sldId="256"/>
-            <ac:spMk id="27" creationId="{33D724CA-F564-BB24-4C21-3B17DB159837}"/>
-          </ac:spMkLst>
-        </pc:spChg>
-        <pc:spChg chg="del mod">
-          <ac:chgData name="Fatima Pillosu" userId="a6295d4dc9e22643" providerId="LiveId" clId="{0756FD03-1706-4472-A4C9-E6951E3B5C4C}" dt="2023-11-29T09:37:33.019" v="49" actId="21"/>
-          <ac:spMkLst>
-            <pc:docMk/>
-            <pc:sldMk cId="1072346714" sldId="256"/>
-            <ac:spMk id="28" creationId="{FADEB154-1E14-E07E-AE86-1E1B57D9D799}"/>
-          </ac:spMkLst>
-        </pc:spChg>
-        <pc:spChg chg="del mod">
-          <ac:chgData name="Fatima Pillosu" userId="a6295d4dc9e22643" providerId="LiveId" clId="{0756FD03-1706-4472-A4C9-E6951E3B5C4C}" dt="2023-11-29T09:37:33.019" v="49" actId="21"/>
-          <ac:spMkLst>
-            <pc:docMk/>
-            <pc:sldMk cId="1072346714" sldId="256"/>
-            <ac:spMk id="29" creationId="{4D64AC32-9D89-42AB-CA47-4E37B5E9C371}"/>
-          </ac:spMkLst>
-        </pc:spChg>
-        <pc:spChg chg="del mod">
-          <ac:chgData name="Fatima Pillosu" userId="a6295d4dc9e22643" providerId="LiveId" clId="{0756FD03-1706-4472-A4C9-E6951E3B5C4C}" dt="2023-11-29T09:37:33.019" v="49" actId="21"/>
-          <ac:spMkLst>
-            <pc:docMk/>
-            <pc:sldMk cId="1072346714" sldId="256"/>
-            <ac:spMk id="30" creationId="{C0E4CF8B-2B7D-3A99-C2A0-B902715DC82D}"/>
-          </ac:spMkLst>
-        </pc:spChg>
-        <pc:spChg chg="del mod">
-          <ac:chgData name="Fatima Pillosu" userId="a6295d4dc9e22643" providerId="LiveId" clId="{0756FD03-1706-4472-A4C9-E6951E3B5C4C}" dt="2023-11-29T09:37:33.019" v="49" actId="21"/>
-          <ac:spMkLst>
-            <pc:docMk/>
-            <pc:sldMk cId="1072346714" sldId="256"/>
-            <ac:spMk id="34" creationId="{6A0CAB05-3A1A-545D-00E5-C520ADE2DE98}"/>
-          </ac:spMkLst>
-        </pc:spChg>
-        <pc:spChg chg="del mod">
-          <ac:chgData name="Fatima Pillosu" userId="a6295d4dc9e22643" providerId="LiveId" clId="{0756FD03-1706-4472-A4C9-E6951E3B5C4C}" dt="2023-11-29T09:37:33.019" v="49" actId="21"/>
-          <ac:spMkLst>
-            <pc:docMk/>
-            <pc:sldMk cId="1072346714" sldId="256"/>
-            <ac:spMk id="35" creationId="{DB0EAE5B-B91F-04EC-7FD5-6281E2FC4C6C}"/>
-          </ac:spMkLst>
-        </pc:spChg>
-        <pc:spChg chg="del mod">
-          <ac:chgData name="Fatima Pillosu" userId="a6295d4dc9e22643" providerId="LiveId" clId="{0756FD03-1706-4472-A4C9-E6951E3B5C4C}" dt="2023-11-29T09:37:33.019" v="49" actId="21"/>
-          <ac:spMkLst>
-            <pc:docMk/>
-            <pc:sldMk cId="1072346714" sldId="256"/>
-            <ac:spMk id="36" creationId="{5F68747B-853A-30C8-389E-AA4F4C616EC8}"/>
-          </ac:spMkLst>
-        </pc:spChg>
-        <pc:spChg chg="del mod">
-          <ac:chgData name="Fatima Pillosu" userId="a6295d4dc9e22643" providerId="LiveId" clId="{0756FD03-1706-4472-A4C9-E6951E3B5C4C}" dt="2023-11-29T09:37:33.019" v="49" actId="21"/>
-          <ac:spMkLst>
-            <pc:docMk/>
-            <pc:sldMk cId="1072346714" sldId="256"/>
-            <ac:spMk id="37" creationId="{C4FCC9A3-D86A-1A5F-B937-22E313A502C5}"/>
-          </ac:spMkLst>
-        </pc:spChg>
-        <pc:spChg chg="del mod">
-          <ac:chgData name="Fatima Pillosu" userId="a6295d4dc9e22643" providerId="LiveId" clId="{0756FD03-1706-4472-A4C9-E6951E3B5C4C}" dt="2023-11-29T09:37:33.019" v="49" actId="21"/>
-          <ac:spMkLst>
-            <pc:docMk/>
-            <pc:sldMk cId="1072346714" sldId="256"/>
-            <ac:spMk id="38" creationId="{1F0DCFE1-BA5A-8CF0-68A5-5AF9DF122315}"/>
-          </ac:spMkLst>
-        </pc:spChg>
-        <pc:spChg chg="del mod">
-          <ac:chgData name="Fatima Pillosu" userId="a6295d4dc9e22643" providerId="LiveId" clId="{0756FD03-1706-4472-A4C9-E6951E3B5C4C}" dt="2023-11-29T09:37:33.019" v="49" actId="21"/>
-          <ac:spMkLst>
-            <pc:docMk/>
-            <pc:sldMk cId="1072346714" sldId="256"/>
-            <ac:spMk id="39" creationId="{2E377314-5496-12AD-8BDF-90A42DD8E8F4}"/>
-          </ac:spMkLst>
-        </pc:spChg>
-        <pc:spChg chg="del mod">
-          <ac:chgData name="Fatima Pillosu" userId="a6295d4dc9e22643" providerId="LiveId" clId="{0756FD03-1706-4472-A4C9-E6951E3B5C4C}" dt="2023-11-29T09:37:33.019" v="49" actId="21"/>
-          <ac:spMkLst>
-            <pc:docMk/>
-            <pc:sldMk cId="1072346714" sldId="256"/>
-            <ac:spMk id="40" creationId="{B2A63B25-69CE-4281-940E-8AA360570CD0}"/>
-          </ac:spMkLst>
-        </pc:spChg>
-        <pc:spChg chg="del mod">
-          <ac:chgData name="Fatima Pillosu" userId="a6295d4dc9e22643" providerId="LiveId" clId="{0756FD03-1706-4472-A4C9-E6951E3B5C4C}" dt="2023-11-29T09:37:33.019" v="49" actId="21"/>
-          <ac:spMkLst>
-            <pc:docMk/>
-            <pc:sldMk cId="1072346714" sldId="256"/>
-            <ac:spMk id="41" creationId="{B7E954CF-847A-5202-4A7E-21E743CEE0EC}"/>
-          </ac:spMkLst>
-        </pc:spChg>
-        <pc:spChg chg="del mod">
-          <ac:chgData name="Fatima Pillosu" userId="a6295d4dc9e22643" providerId="LiveId" clId="{0756FD03-1706-4472-A4C9-E6951E3B5C4C}" dt="2023-11-29T09:37:33.019" v="49" actId="21"/>
-          <ac:spMkLst>
-            <pc:docMk/>
-            <pc:sldMk cId="1072346714" sldId="256"/>
-            <ac:spMk id="42" creationId="{A466677D-E070-FE73-93B9-CD8A8623DA35}"/>
-          </ac:spMkLst>
-        </pc:spChg>
-        <pc:spChg chg="del mod">
-          <ac:chgData name="Fatima Pillosu" userId="a6295d4dc9e22643" providerId="LiveId" clId="{0756FD03-1706-4472-A4C9-E6951E3B5C4C}" dt="2023-11-29T09:37:33.019" v="49" actId="21"/>
-          <ac:spMkLst>
-            <pc:docMk/>
-            <pc:sldMk cId="1072346714" sldId="256"/>
-            <ac:spMk id="43" creationId="{7743BAD9-1439-F899-912D-2D4812D5D5C8}"/>
-          </ac:spMkLst>
-        </pc:spChg>
-        <pc:spChg chg="del mod">
-          <ac:chgData name="Fatima Pillosu" userId="a6295d4dc9e22643" providerId="LiveId" clId="{0756FD03-1706-4472-A4C9-E6951E3B5C4C}" dt="2023-11-29T09:37:33.019" v="49" actId="21"/>
-          <ac:spMkLst>
-            <pc:docMk/>
-            <pc:sldMk cId="1072346714" sldId="256"/>
-            <ac:spMk id="44" creationId="{810A7679-63A0-270B-D9A3-1587B7A0592D}"/>
-          </ac:spMkLst>
-        </pc:spChg>
-        <pc:spChg chg="del mod">
-          <ac:chgData name="Fatima Pillosu" userId="a6295d4dc9e22643" providerId="LiveId" clId="{0756FD03-1706-4472-A4C9-E6951E3B5C4C}" dt="2023-11-29T09:37:33.019" v="49" actId="21"/>
-          <ac:spMkLst>
-            <pc:docMk/>
-            <pc:sldMk cId="1072346714" sldId="256"/>
-            <ac:spMk id="45" creationId="{BAE5F748-D858-F541-E783-B26433165740}"/>
-          </ac:spMkLst>
-        </pc:spChg>
-        <pc:spChg chg="del mod">
-          <ac:chgData name="Fatima Pillosu" userId="a6295d4dc9e22643" providerId="LiveId" clId="{0756FD03-1706-4472-A4C9-E6951E3B5C4C}" dt="2023-11-29T09:37:33.019" v="49" actId="21"/>
-          <ac:spMkLst>
-            <pc:docMk/>
-            <pc:sldMk cId="1072346714" sldId="256"/>
-            <ac:spMk id="46" creationId="{18FED8DD-8957-CF93-A4D5-2B74A0368F2E}"/>
-          </ac:spMkLst>
-        </pc:spChg>
-        <pc:spChg chg="del mod">
-          <ac:chgData name="Fatima Pillosu" userId="a6295d4dc9e22643" providerId="LiveId" clId="{0756FD03-1706-4472-A4C9-E6951E3B5C4C}" dt="2023-11-29T09:37:33.019" v="49" actId="21"/>
-          <ac:spMkLst>
-            <pc:docMk/>
-            <pc:sldMk cId="1072346714" sldId="256"/>
-            <ac:spMk id="47" creationId="{334882D8-1A9D-CC8A-06CF-488A793CF256}"/>
-          </ac:spMkLst>
-        </pc:spChg>
-        <pc:spChg chg="del mod">
-          <ac:chgData name="Fatima Pillosu" userId="a6295d4dc9e22643" providerId="LiveId" clId="{0756FD03-1706-4472-A4C9-E6951E3B5C4C}" dt="2023-11-29T09:37:33.019" v="49" actId="21"/>
-          <ac:spMkLst>
-            <pc:docMk/>
-            <pc:sldMk cId="1072346714" sldId="256"/>
-            <ac:spMk id="48" creationId="{F6A8E961-9243-0767-D3AA-AB18C84ADE56}"/>
-          </ac:spMkLst>
-        </pc:spChg>
-        <pc:spChg chg="del mod">
-          <ac:chgData name="Fatima Pillosu" userId="a6295d4dc9e22643" providerId="LiveId" clId="{0756FD03-1706-4472-A4C9-E6951E3B5C4C}" dt="2023-11-29T09:37:33.019" v="49" actId="21"/>
-          <ac:spMkLst>
-            <pc:docMk/>
-            <pc:sldMk cId="1072346714" sldId="256"/>
-            <ac:spMk id="49" creationId="{C4F5BF5B-44D1-F769-4A52-FEEA32A1D3C7}"/>
-          </ac:spMkLst>
-        </pc:spChg>
-        <pc:spChg chg="del mod">
-          <ac:chgData name="Fatima Pillosu" userId="a6295d4dc9e22643" providerId="LiveId" clId="{0756FD03-1706-4472-A4C9-E6951E3B5C4C}" dt="2023-11-29T09:37:33.019" v="49" actId="21"/>
-          <ac:spMkLst>
-            <pc:docMk/>
-            <pc:sldMk cId="1072346714" sldId="256"/>
-            <ac:spMk id="50" creationId="{766938A5-4E33-9EEA-7BC6-2645316AC3A4}"/>
-          </ac:spMkLst>
-        </pc:spChg>
-        <pc:spChg chg="del mod">
-          <ac:chgData name="Fatima Pillosu" userId="a6295d4dc9e22643" providerId="LiveId" clId="{0756FD03-1706-4472-A4C9-E6951E3B5C4C}" dt="2023-11-29T09:37:33.019" v="49" actId="21"/>
-          <ac:spMkLst>
-            <pc:docMk/>
-            <pc:sldMk cId="1072346714" sldId="256"/>
-            <ac:spMk id="51" creationId="{676F60C1-93DC-03F5-E632-0CE4750575A4}"/>
-          </ac:spMkLst>
-        </pc:spChg>
-        <pc:spChg chg="add del">
-          <ac:chgData name="Fatima Pillosu" userId="a6295d4dc9e22643" providerId="LiveId" clId="{0756FD03-1706-4472-A4C9-E6951E3B5C4C}" dt="2023-11-29T09:37:20.464" v="48" actId="478"/>
-          <ac:spMkLst>
-            <pc:docMk/>
-            <pc:sldMk cId="1072346714" sldId="256"/>
-            <ac:spMk id="52" creationId="{68B7249F-6B7F-8463-BFAB-6DF1A571F792}"/>
-          </ac:spMkLst>
-        </pc:spChg>
-        <pc:spChg chg="add mod">
-          <ac:chgData name="Fatima Pillosu" userId="a6295d4dc9e22643" providerId="LiveId" clId="{0756FD03-1706-4472-A4C9-E6951E3B5C4C}" dt="2023-11-29T09:37:54.207" v="50"/>
-          <ac:spMkLst>
-            <pc:docMk/>
-            <pc:sldMk cId="1072346714" sldId="256"/>
-            <ac:spMk id="57" creationId="{62474F9B-9549-98F4-5E8F-BBEAC7016D7F}"/>
-          </ac:spMkLst>
-        </pc:spChg>
-        <pc:spChg chg="add mod">
-          <ac:chgData name="Fatima Pillosu" userId="a6295d4dc9e22643" providerId="LiveId" clId="{0756FD03-1706-4472-A4C9-E6951E3B5C4C}" dt="2023-11-29T09:37:54.207" v="50"/>
-          <ac:spMkLst>
-            <pc:docMk/>
-            <pc:sldMk cId="1072346714" sldId="256"/>
-            <ac:spMk id="58" creationId="{230FF514-E474-F3B0-E4CA-E17B20299031}"/>
-          </ac:spMkLst>
-        </pc:spChg>
-        <pc:spChg chg="add mod">
-          <ac:chgData name="Fatima Pillosu" userId="a6295d4dc9e22643" providerId="LiveId" clId="{0756FD03-1706-4472-A4C9-E6951E3B5C4C}" dt="2023-11-29T09:37:54.207" v="50"/>
-          <ac:spMkLst>
-            <pc:docMk/>
-            <pc:sldMk cId="1072346714" sldId="256"/>
-            <ac:spMk id="59" creationId="{60EFB212-C205-78DB-7709-6791A8193261}"/>
-          </ac:spMkLst>
-        </pc:spChg>
-        <pc:spChg chg="add mod">
-          <ac:chgData name="Fatima Pillosu" userId="a6295d4dc9e22643" providerId="LiveId" clId="{0756FD03-1706-4472-A4C9-E6951E3B5C4C}" dt="2023-11-29T09:37:54.207" v="50"/>
-          <ac:spMkLst>
-            <pc:docMk/>
-            <pc:sldMk cId="1072346714" sldId="256"/>
-            <ac:spMk id="60" creationId="{7376B85B-917A-079A-5132-DEDB5C5E7834}"/>
-          </ac:spMkLst>
-        </pc:spChg>
-        <pc:spChg chg="add mod">
-          <ac:chgData name="Fatima Pillosu" userId="a6295d4dc9e22643" providerId="LiveId" clId="{0756FD03-1706-4472-A4C9-E6951E3B5C4C}" dt="2023-11-29T09:38:00.207" v="52" actId="1036"/>
-          <ac:spMkLst>
-            <pc:docMk/>
-            <pc:sldMk cId="1072346714" sldId="256"/>
-            <ac:spMk id="61" creationId="{A9ADF02B-2B10-FE58-83FB-270E1B72F374}"/>
-          </ac:spMkLst>
-        </pc:spChg>
-        <pc:spChg chg="mod">
-          <ac:chgData name="Fatima Pillosu" userId="a6295d4dc9e22643" providerId="LiveId" clId="{0756FD03-1706-4472-A4C9-E6951E3B5C4C}" dt="2023-11-29T09:37:54.207" v="50"/>
-          <ac:spMkLst>
-            <pc:docMk/>
-            <pc:sldMk cId="1072346714" sldId="256"/>
-            <ac:spMk id="64" creationId="{21139AFA-61F8-7687-C77E-BFDBF491ED17}"/>
-          </ac:spMkLst>
-        </pc:spChg>
-        <pc:spChg chg="add mod">
-          <ac:chgData name="Fatima Pillosu" userId="a6295d4dc9e22643" providerId="LiveId" clId="{0756FD03-1706-4472-A4C9-E6951E3B5C4C}" dt="2023-11-29T09:37:54.207" v="50"/>
-          <ac:spMkLst>
-            <pc:docMk/>
-            <pc:sldMk cId="1072346714" sldId="256"/>
-            <ac:spMk id="65" creationId="{C3AB6EEE-A212-6219-4457-D0464EB0CCAE}"/>
-          </ac:spMkLst>
-        </pc:spChg>
-        <pc:spChg chg="add mod">
-          <ac:chgData name="Fatima Pillosu" userId="a6295d4dc9e22643" providerId="LiveId" clId="{0756FD03-1706-4472-A4C9-E6951E3B5C4C}" dt="2023-11-29T09:37:54.207" v="50"/>
-          <ac:spMkLst>
-            <pc:docMk/>
-            <pc:sldMk cId="1072346714" sldId="256"/>
-            <ac:spMk id="66" creationId="{28F2E26B-47E5-8BA5-47B6-5E6D88369717}"/>
-          </ac:spMkLst>
-        </pc:spChg>
-        <pc:spChg chg="add mod">
-          <ac:chgData name="Fatima Pillosu" userId="a6295d4dc9e22643" providerId="LiveId" clId="{0756FD03-1706-4472-A4C9-E6951E3B5C4C}" dt="2023-11-29T09:37:54.207" v="50"/>
-          <ac:spMkLst>
-            <pc:docMk/>
-            <pc:sldMk cId="1072346714" sldId="256"/>
-            <ac:spMk id="67" creationId="{DB00622D-EFA4-873C-60A9-8D8057632DA8}"/>
-          </ac:spMkLst>
-        </pc:spChg>
-        <pc:spChg chg="add mod">
-          <ac:chgData name="Fatima Pillosu" userId="a6295d4dc9e22643" providerId="LiveId" clId="{0756FD03-1706-4472-A4C9-E6951E3B5C4C}" dt="2023-11-29T09:37:54.207" v="50"/>
-          <ac:spMkLst>
-            <pc:docMk/>
-            <pc:sldMk cId="1072346714" sldId="256"/>
-            <ac:spMk id="68" creationId="{4DC2DACD-FD0F-3B6F-1271-24B1715E8415}"/>
-          </ac:spMkLst>
-        </pc:spChg>
-        <pc:spChg chg="add mod">
-          <ac:chgData name="Fatima Pillosu" userId="a6295d4dc9e22643" providerId="LiveId" clId="{0756FD03-1706-4472-A4C9-E6951E3B5C4C}" dt="2023-11-29T09:37:54.207" v="50"/>
-          <ac:spMkLst>
-            <pc:docMk/>
-            <pc:sldMk cId="1072346714" sldId="256"/>
-            <ac:spMk id="69" creationId="{3D7E1B29-F647-CFAB-E0D7-3C9F7A2144FC}"/>
-          </ac:spMkLst>
-        </pc:spChg>
-        <pc:spChg chg="add mod">
-          <ac:chgData name="Fatima Pillosu" userId="a6295d4dc9e22643" providerId="LiveId" clId="{0756FD03-1706-4472-A4C9-E6951E3B5C4C}" dt="2023-11-29T09:37:54.207" v="50"/>
-          <ac:spMkLst>
-            <pc:docMk/>
-            <pc:sldMk cId="1072346714" sldId="256"/>
-            <ac:spMk id="70" creationId="{CB0F925A-BE4F-BA21-B616-81D1EE21A5D3}"/>
-          </ac:spMkLst>
-        </pc:spChg>
-        <pc:spChg chg="add mod">
-          <ac:chgData name="Fatima Pillosu" userId="a6295d4dc9e22643" providerId="LiveId" clId="{0756FD03-1706-4472-A4C9-E6951E3B5C4C}" dt="2023-11-29T09:37:54.207" v="50"/>
-          <ac:spMkLst>
-            <pc:docMk/>
-            <pc:sldMk cId="1072346714" sldId="256"/>
-            <ac:spMk id="71" creationId="{87594D03-4FC2-F597-40DD-0BC8E77ADAB0}"/>
-          </ac:spMkLst>
-        </pc:spChg>
-        <pc:spChg chg="add mod">
-          <ac:chgData name="Fatima Pillosu" userId="a6295d4dc9e22643" providerId="LiveId" clId="{0756FD03-1706-4472-A4C9-E6951E3B5C4C}" dt="2023-11-29T09:37:54.207" v="50"/>
-          <ac:spMkLst>
-            <pc:docMk/>
-            <pc:sldMk cId="1072346714" sldId="256"/>
-            <ac:spMk id="72" creationId="{B4A9E0F8-A058-E30E-B39A-661259D970B7}"/>
-          </ac:spMkLst>
-        </pc:spChg>
-        <pc:spChg chg="add mod">
-          <ac:chgData name="Fatima Pillosu" userId="a6295d4dc9e22643" providerId="LiveId" clId="{0756FD03-1706-4472-A4C9-E6951E3B5C4C}" dt="2023-11-29T09:37:54.207" v="50"/>
-          <ac:spMkLst>
-            <pc:docMk/>
-            <pc:sldMk cId="1072346714" sldId="256"/>
-            <ac:spMk id="73" creationId="{CB9643F3-7AEE-4154-7560-89FF50440D39}"/>
-          </ac:spMkLst>
-        </pc:spChg>
-        <pc:spChg chg="add mod">
-          <ac:chgData name="Fatima Pillosu" userId="a6295d4dc9e22643" providerId="LiveId" clId="{0756FD03-1706-4472-A4C9-E6951E3B5C4C}" dt="2023-11-29T09:37:54.207" v="50"/>
-          <ac:spMkLst>
-            <pc:docMk/>
-            <pc:sldMk cId="1072346714" sldId="256"/>
-            <ac:spMk id="74" creationId="{DC3ED00A-8225-F3DF-6AFC-3E3B416AF7A2}"/>
-          </ac:spMkLst>
-        </pc:spChg>
-        <pc:spChg chg="add mod">
-          <ac:chgData name="Fatima Pillosu" userId="a6295d4dc9e22643" providerId="LiveId" clId="{0756FD03-1706-4472-A4C9-E6951E3B5C4C}" dt="2023-11-29T09:37:54.207" v="50"/>
-          <ac:spMkLst>
-            <pc:docMk/>
-            <pc:sldMk cId="1072346714" sldId="256"/>
-            <ac:spMk id="75" creationId="{93DD7934-4D1F-203F-115A-8CD30267714B}"/>
-          </ac:spMkLst>
-        </pc:spChg>
-        <pc:spChg chg="add mod">
-          <ac:chgData name="Fatima Pillosu" userId="a6295d4dc9e22643" providerId="LiveId" clId="{0756FD03-1706-4472-A4C9-E6951E3B5C4C}" dt="2023-11-29T09:37:54.207" v="50"/>
-          <ac:spMkLst>
-            <pc:docMk/>
-            <pc:sldMk cId="1072346714" sldId="256"/>
-            <ac:spMk id="76" creationId="{E612E97C-EBA3-3FE1-2037-0B88C943A875}"/>
-          </ac:spMkLst>
-        </pc:spChg>
-        <pc:spChg chg="add mod">
-          <ac:chgData name="Fatima Pillosu" userId="a6295d4dc9e22643" providerId="LiveId" clId="{0756FD03-1706-4472-A4C9-E6951E3B5C4C}" dt="2023-11-29T09:37:54.207" v="50"/>
-          <ac:spMkLst>
-            <pc:docMk/>
-            <pc:sldMk cId="1072346714" sldId="256"/>
-            <ac:spMk id="77" creationId="{F7686D95-1D1B-55FE-328A-3A54FDE4131B}"/>
-          </ac:spMkLst>
-        </pc:spChg>
-        <pc:spChg chg="add mod">
-          <ac:chgData name="Fatima Pillosu" userId="a6295d4dc9e22643" providerId="LiveId" clId="{0756FD03-1706-4472-A4C9-E6951E3B5C4C}" dt="2023-11-29T09:37:54.207" v="50"/>
-          <ac:spMkLst>
-            <pc:docMk/>
-            <pc:sldMk cId="1072346714" sldId="256"/>
-            <ac:spMk id="78" creationId="{76399EE0-F8AF-AE62-22B7-3A25E5005060}"/>
-          </ac:spMkLst>
-        </pc:spChg>
-        <pc:spChg chg="add mod">
-          <ac:chgData name="Fatima Pillosu" userId="a6295d4dc9e22643" providerId="LiveId" clId="{0756FD03-1706-4472-A4C9-E6951E3B5C4C}" dt="2023-11-29T09:37:54.207" v="50"/>
-          <ac:spMkLst>
-            <pc:docMk/>
-            <pc:sldMk cId="1072346714" sldId="256"/>
-            <ac:spMk id="79" creationId="{38AC4AC0-A304-DFA2-F0FA-E536DBD37F81}"/>
-          </ac:spMkLst>
-        </pc:spChg>
-        <pc:spChg chg="add mod">
-          <ac:chgData name="Fatima Pillosu" userId="a6295d4dc9e22643" providerId="LiveId" clId="{0756FD03-1706-4472-A4C9-E6951E3B5C4C}" dt="2023-11-29T09:37:54.207" v="50"/>
-          <ac:spMkLst>
-            <pc:docMk/>
-            <pc:sldMk cId="1072346714" sldId="256"/>
-            <ac:spMk id="80" creationId="{5AD677FE-FC0E-E649-098B-C7FB7F847778}"/>
-          </ac:spMkLst>
-        </pc:spChg>
-        <pc:spChg chg="add mod">
-          <ac:chgData name="Fatima Pillosu" userId="a6295d4dc9e22643" providerId="LiveId" clId="{0756FD03-1706-4472-A4C9-E6951E3B5C4C}" dt="2023-11-29T09:37:54.207" v="50"/>
-          <ac:spMkLst>
-            <pc:docMk/>
-            <pc:sldMk cId="1072346714" sldId="256"/>
-            <ac:spMk id="81" creationId="{FDD119F1-B8C4-D451-4D83-B8285C2FADE4}"/>
-          </ac:spMkLst>
-        </pc:spChg>
-        <pc:spChg chg="add mod">
-          <ac:chgData name="Fatima Pillosu" userId="a6295d4dc9e22643" providerId="LiveId" clId="{0756FD03-1706-4472-A4C9-E6951E3B5C4C}" dt="2023-11-29T09:37:54.207" v="50"/>
-          <ac:spMkLst>
-            <pc:docMk/>
-            <pc:sldMk cId="1072346714" sldId="256"/>
-            <ac:spMk id="82" creationId="{A86C750C-FB98-9351-A067-610D39232C45}"/>
-          </ac:spMkLst>
-        </pc:spChg>
-        <pc:grpChg chg="del mod">
-          <ac:chgData name="Fatima Pillosu" userId="a6295d4dc9e22643" providerId="LiveId" clId="{0756FD03-1706-4472-A4C9-E6951E3B5C4C}" dt="2023-11-29T09:37:33.019" v="49" actId="21"/>
-          <ac:grpSpMkLst>
-            <pc:docMk/>
-            <pc:sldMk cId="1072346714" sldId="256"/>
-            <ac:grpSpMk id="31" creationId="{C99970EB-0759-371E-60E8-38F5FEFC5971}"/>
-          </ac:grpSpMkLst>
-        </pc:grpChg>
-        <pc:grpChg chg="add mod">
-          <ac:chgData name="Fatima Pillosu" userId="a6295d4dc9e22643" providerId="LiveId" clId="{0756FD03-1706-4472-A4C9-E6951E3B5C4C}" dt="2023-11-29T09:37:54.207" v="50"/>
-          <ac:grpSpMkLst>
-            <pc:docMk/>
-            <pc:sldMk cId="1072346714" sldId="256"/>
-            <ac:grpSpMk id="62" creationId="{610E7790-8E02-B443-1264-38F59A3D3E2B}"/>
-          </ac:grpSpMkLst>
-        </pc:grpChg>
-        <pc:picChg chg="del mod">
-          <ac:chgData name="Fatima Pillosu" userId="a6295d4dc9e22643" providerId="LiveId" clId="{0756FD03-1706-4472-A4C9-E6951E3B5C4C}" dt="2023-11-29T09:37:33.019" v="49" actId="21"/>
-          <ac:picMkLst>
-            <pc:docMk/>
-            <pc:sldMk cId="1072346714" sldId="256"/>
-            <ac:picMk id="22" creationId="{671F6A74-7242-B4F8-81C5-EB111E195B51}"/>
-          </ac:picMkLst>
-        </pc:picChg>
-        <pc:picChg chg="del mod">
-          <ac:chgData name="Fatima Pillosu" userId="a6295d4dc9e22643" providerId="LiveId" clId="{0756FD03-1706-4472-A4C9-E6951E3B5C4C}" dt="2023-11-29T09:37:33.019" v="49" actId="21"/>
-          <ac:picMkLst>
-            <pc:docMk/>
-            <pc:sldMk cId="1072346714" sldId="256"/>
-            <ac:picMk id="23" creationId="{1AE1E841-1645-BFD3-3EE5-C8880A8F1C4F}"/>
-          </ac:picMkLst>
-        </pc:picChg>
-        <pc:picChg chg="del mod">
-          <ac:chgData name="Fatima Pillosu" userId="a6295d4dc9e22643" providerId="LiveId" clId="{0756FD03-1706-4472-A4C9-E6951E3B5C4C}" dt="2023-11-29T09:37:33.019" v="49" actId="21"/>
-          <ac:picMkLst>
-            <pc:docMk/>
-            <pc:sldMk cId="1072346714" sldId="256"/>
-            <ac:picMk id="24" creationId="{C33C068E-1BBA-5EF5-F3D2-8D0CFC725CBD}"/>
-          </ac:picMkLst>
-        </pc:picChg>
-        <pc:picChg chg="del mod">
-          <ac:chgData name="Fatima Pillosu" userId="a6295d4dc9e22643" providerId="LiveId" clId="{0756FD03-1706-4472-A4C9-E6951E3B5C4C}" dt="2023-11-29T09:37:33.019" v="49" actId="21"/>
-          <ac:picMkLst>
-            <pc:docMk/>
-            <pc:sldMk cId="1072346714" sldId="256"/>
-            <ac:picMk id="25" creationId="{BDFA06AF-5E33-11D6-CFA8-257E7EAE5711}"/>
-          </ac:picMkLst>
-        </pc:picChg>
-        <pc:picChg chg="add mod">
-          <ac:chgData name="Fatima Pillosu" userId="a6295d4dc9e22643" providerId="LiveId" clId="{0756FD03-1706-4472-A4C9-E6951E3B5C4C}" dt="2023-11-29T09:37:54.207" v="50"/>
-          <ac:picMkLst>
-            <pc:docMk/>
-            <pc:sldMk cId="1072346714" sldId="256"/>
-            <ac:picMk id="53" creationId="{C1A28376-AEBE-2CB6-3202-C9AB2EB83169}"/>
-          </ac:picMkLst>
-        </pc:picChg>
-        <pc:picChg chg="add mod">
-          <ac:chgData name="Fatima Pillosu" userId="a6295d4dc9e22643" providerId="LiveId" clId="{0756FD03-1706-4472-A4C9-E6951E3B5C4C}" dt="2023-11-29T09:37:54.207" v="50"/>
-          <ac:picMkLst>
-            <pc:docMk/>
-            <pc:sldMk cId="1072346714" sldId="256"/>
-            <ac:picMk id="54" creationId="{D231E065-ED8C-1E5A-E34B-9EF2993E163D}"/>
-          </ac:picMkLst>
-        </pc:picChg>
-        <pc:picChg chg="add mod">
-          <ac:chgData name="Fatima Pillosu" userId="a6295d4dc9e22643" providerId="LiveId" clId="{0756FD03-1706-4472-A4C9-E6951E3B5C4C}" dt="2023-11-29T09:37:54.207" v="50"/>
-          <ac:picMkLst>
-            <pc:docMk/>
-            <pc:sldMk cId="1072346714" sldId="256"/>
-            <ac:picMk id="55" creationId="{1C20D923-F680-860A-8430-00CFCD2244D4}"/>
-          </ac:picMkLst>
-        </pc:picChg>
-        <pc:picChg chg="add mod">
-          <ac:chgData name="Fatima Pillosu" userId="a6295d4dc9e22643" providerId="LiveId" clId="{0756FD03-1706-4472-A4C9-E6951E3B5C4C}" dt="2023-11-29T09:37:54.207" v="50"/>
-          <ac:picMkLst>
-            <pc:docMk/>
-            <pc:sldMk cId="1072346714" sldId="256"/>
-            <ac:picMk id="56" creationId="{F3233E7D-C036-A735-6A90-2B99E9642804}"/>
-          </ac:picMkLst>
-        </pc:picChg>
-        <pc:picChg chg="mod">
-          <ac:chgData name="Fatima Pillosu" userId="a6295d4dc9e22643" providerId="LiveId" clId="{0756FD03-1706-4472-A4C9-E6951E3B5C4C}" dt="2023-11-29T09:37:54.207" v="50"/>
-          <ac:picMkLst>
-            <pc:docMk/>
-            <pc:sldMk cId="1072346714" sldId="256"/>
-            <ac:picMk id="63" creationId="{9D6B798F-5A41-F5C5-8448-FECDF45F68EE}"/>
-          </ac:picMkLst>
-        </pc:picChg>
       </pc:sldChg>
     </pc:docChg>
   </pc:docChgLst>
@@ -1448,7 +1448,7 @@
           <a:p>
             <a:fld id="{7058D181-6ACD-4703-8678-938650DF8C40}" type="datetimeFigureOut">
               <a:rPr lang="en-GB" smtClean="0"/>
-              <a:t>21/12/2023</a:t>
+              <a:t>28/12/2023</a:t>
             </a:fld>
             <a:endParaRPr lang="en-GB"/>
           </a:p>
@@ -1618,7 +1618,7 @@
           <a:p>
             <a:fld id="{7058D181-6ACD-4703-8678-938650DF8C40}" type="datetimeFigureOut">
               <a:rPr lang="en-GB" smtClean="0"/>
-              <a:t>21/12/2023</a:t>
+              <a:t>28/12/2023</a:t>
             </a:fld>
             <a:endParaRPr lang="en-GB"/>
           </a:p>
@@ -1798,7 +1798,7 @@
           <a:p>
             <a:fld id="{7058D181-6ACD-4703-8678-938650DF8C40}" type="datetimeFigureOut">
               <a:rPr lang="en-GB" smtClean="0"/>
-              <a:t>21/12/2023</a:t>
+              <a:t>28/12/2023</a:t>
             </a:fld>
             <a:endParaRPr lang="en-GB"/>
           </a:p>
@@ -1968,7 +1968,7 @@
           <a:p>
             <a:fld id="{7058D181-6ACD-4703-8678-938650DF8C40}" type="datetimeFigureOut">
               <a:rPr lang="en-GB" smtClean="0"/>
-              <a:t>21/12/2023</a:t>
+              <a:t>28/12/2023</a:t>
             </a:fld>
             <a:endParaRPr lang="en-GB"/>
           </a:p>
@@ -2214,7 +2214,7 @@
           <a:p>
             <a:fld id="{7058D181-6ACD-4703-8678-938650DF8C40}" type="datetimeFigureOut">
               <a:rPr lang="en-GB" smtClean="0"/>
-              <a:t>21/12/2023</a:t>
+              <a:t>28/12/2023</a:t>
             </a:fld>
             <a:endParaRPr lang="en-GB"/>
           </a:p>
@@ -2446,7 +2446,7 @@
           <a:p>
             <a:fld id="{7058D181-6ACD-4703-8678-938650DF8C40}" type="datetimeFigureOut">
               <a:rPr lang="en-GB" smtClean="0"/>
-              <a:t>21/12/2023</a:t>
+              <a:t>28/12/2023</a:t>
             </a:fld>
             <a:endParaRPr lang="en-GB"/>
           </a:p>
@@ -2813,7 +2813,7 @@
           <a:p>
             <a:fld id="{7058D181-6ACD-4703-8678-938650DF8C40}" type="datetimeFigureOut">
               <a:rPr lang="en-GB" smtClean="0"/>
-              <a:t>21/12/2023</a:t>
+              <a:t>28/12/2023</a:t>
             </a:fld>
             <a:endParaRPr lang="en-GB"/>
           </a:p>
@@ -2931,7 +2931,7 @@
           <a:p>
             <a:fld id="{7058D181-6ACD-4703-8678-938650DF8C40}" type="datetimeFigureOut">
               <a:rPr lang="en-GB" smtClean="0"/>
-              <a:t>21/12/2023</a:t>
+              <a:t>28/12/2023</a:t>
             </a:fld>
             <a:endParaRPr lang="en-GB"/>
           </a:p>
@@ -3026,7 +3026,7 @@
           <a:p>
             <a:fld id="{7058D181-6ACD-4703-8678-938650DF8C40}" type="datetimeFigureOut">
               <a:rPr lang="en-GB" smtClean="0"/>
-              <a:t>21/12/2023</a:t>
+              <a:t>28/12/2023</a:t>
             </a:fld>
             <a:endParaRPr lang="en-GB"/>
           </a:p>
@@ -3303,7 +3303,7 @@
           <a:p>
             <a:fld id="{7058D181-6ACD-4703-8678-938650DF8C40}" type="datetimeFigureOut">
               <a:rPr lang="en-GB" smtClean="0"/>
-              <a:t>21/12/2023</a:t>
+              <a:t>28/12/2023</a:t>
             </a:fld>
             <a:endParaRPr lang="en-GB"/>
           </a:p>
@@ -3560,7 +3560,7 @@
           <a:p>
             <a:fld id="{7058D181-6ACD-4703-8678-938650DF8C40}" type="datetimeFigureOut">
               <a:rPr lang="en-GB" smtClean="0"/>
-              <a:t>21/12/2023</a:t>
+              <a:t>28/12/2023</a:t>
             </a:fld>
             <a:endParaRPr lang="en-GB"/>
           </a:p>
@@ -3773,7 +3773,7 @@
           <a:p>
             <a:fld id="{7058D181-6ACD-4703-8678-938650DF8C40}" type="datetimeFigureOut">
               <a:rPr lang="en-GB" smtClean="0"/>
-              <a:t>21/12/2023</a:t>
+              <a:t>28/12/2023</a:t>
             </a:fld>
             <a:endParaRPr lang="en-GB"/>
           </a:p>
@@ -4180,10 +4180,10 @@
       </p:grpSpPr>
       <p:pic>
         <p:nvPicPr>
-          <p:cNvPr id="52" name="Picture 51" descr="A map of the world&#10;&#10;Description automatically generated">
+          <p:cNvPr id="5" name="Immagine 4">
             <a:extLst>
               <a:ext uri="{FF2B5EF4-FFF2-40B4-BE49-F238E27FC236}">
-                <a16:creationId xmlns:a16="http://schemas.microsoft.com/office/drawing/2014/main" id="{0876C303-8D9E-352E-02B3-65CEEB96503A}"/>
+                <a16:creationId xmlns:a16="http://schemas.microsoft.com/office/drawing/2014/main" id="{4985DDCB-5CB6-5BC9-0056-C09A0C7C5A32}"/>
               </a:ext>
             </a:extLst>
           </p:cNvPr>
@@ -4200,13 +4200,13 @@
               </a:ext>
             </a:extLst>
           </a:blip>
-          <a:srcRect l="7442" t="33981" r="7112" b="1918"/>
+          <a:srcRect l="7240" t="34444" r="7285" b="4764"/>
           <a:stretch/>
         </p:blipFill>
         <p:spPr>
           <a:xfrm>
-            <a:off x="3355771" y="2190050"/>
-            <a:ext cx="3191882" cy="1694116"/>
+            <a:off x="3337809" y="2247102"/>
+            <a:ext cx="3240000" cy="1630341"/>
           </a:xfrm>
           <a:prstGeom prst="rect">
             <a:avLst/>
@@ -4215,10 +4215,10 @@
       </p:pic>
       <p:pic>
         <p:nvPicPr>
-          <p:cNvPr id="83" name="Picture 82" descr="A map of the world&#10;&#10;Description automatically generated">
+          <p:cNvPr id="7" name="Immagine 6">
             <a:extLst>
               <a:ext uri="{FF2B5EF4-FFF2-40B4-BE49-F238E27FC236}">
-                <a16:creationId xmlns:a16="http://schemas.microsoft.com/office/drawing/2014/main" id="{EF5AD2E6-6072-55E3-55E7-E208E4133C12}"/>
+                <a16:creationId xmlns:a16="http://schemas.microsoft.com/office/drawing/2014/main" id="{871E9F37-2633-C94D-7124-C052F7F3446C}"/>
               </a:ext>
             </a:extLst>
           </p:cNvPr>
@@ -4235,13 +4235,13 @@
               </a:ext>
             </a:extLst>
           </a:blip>
-          <a:srcRect l="3972" t="34580" r="7112" b="4722"/>
+          <a:srcRect l="7240" t="34444" r="7285" b="4764"/>
           <a:stretch/>
         </p:blipFill>
         <p:spPr>
           <a:xfrm>
-            <a:off x="4123" y="566577"/>
-            <a:ext cx="3321499" cy="1604172"/>
+            <a:off x="9994" y="2247102"/>
+            <a:ext cx="3240000" cy="1630341"/>
           </a:xfrm>
           <a:prstGeom prst="rect">
             <a:avLst/>
@@ -4250,10 +4250,10 @@
       </p:pic>
       <p:pic>
         <p:nvPicPr>
-          <p:cNvPr id="84" name="Picture 83" descr="A map of the world&#10;&#10;Description automatically generated">
+          <p:cNvPr id="9" name="Immagine 8">
             <a:extLst>
               <a:ext uri="{FF2B5EF4-FFF2-40B4-BE49-F238E27FC236}">
-                <a16:creationId xmlns:a16="http://schemas.microsoft.com/office/drawing/2014/main" id="{E01CAB92-2E26-F918-57CF-5979FD2E86F0}"/>
+                <a16:creationId xmlns:a16="http://schemas.microsoft.com/office/drawing/2014/main" id="{7C33DA90-2417-8085-3430-0F83A0257B0B}"/>
               </a:ext>
             </a:extLst>
           </p:cNvPr>
@@ -4270,13 +4270,13 @@
               </a:ext>
             </a:extLst>
           </a:blip>
-          <a:srcRect l="3861" t="33981" r="7113" b="1918"/>
+          <a:srcRect l="7240" t="34444" r="7285" b="4764"/>
           <a:stretch/>
         </p:blipFill>
         <p:spPr>
           <a:xfrm>
-            <a:off x="0" y="2190050"/>
-            <a:ext cx="3325622" cy="1694116"/>
+            <a:off x="3337809" y="529652"/>
+            <a:ext cx="3240000" cy="1630341"/>
           </a:xfrm>
           <a:prstGeom prst="rect">
             <a:avLst/>
@@ -4285,10 +4285,10 @@
       </p:pic>
       <p:pic>
         <p:nvPicPr>
-          <p:cNvPr id="85" name="Picture 84" descr="A map of the world&#10;&#10;Description automatically generated">
+          <p:cNvPr id="11" name="Immagine 10">
             <a:extLst>
               <a:ext uri="{FF2B5EF4-FFF2-40B4-BE49-F238E27FC236}">
-                <a16:creationId xmlns:a16="http://schemas.microsoft.com/office/drawing/2014/main" id="{2A749E4E-DDFC-DE91-FC81-7F57E5B31A68}"/>
+                <a16:creationId xmlns:a16="http://schemas.microsoft.com/office/drawing/2014/main" id="{E2ACEC1D-E5D1-9F10-A5BC-51A2C4D077AE}"/>
               </a:ext>
             </a:extLst>
           </p:cNvPr>
@@ -4305,208 +4305,25 @@
               </a:ext>
             </a:extLst>
           </a:blip>
-          <a:srcRect l="7442" t="34587" r="7112" b="4721"/>
+          <a:srcRect l="7240" t="34444" r="7285" b="4764"/>
           <a:stretch/>
         </p:blipFill>
         <p:spPr>
           <a:xfrm>
-            <a:off x="3355772" y="566743"/>
-            <a:ext cx="3191881" cy="1604006"/>
+            <a:off x="9994" y="529652"/>
+            <a:ext cx="3240000" cy="1630341"/>
           </a:xfrm>
           <a:prstGeom prst="rect">
             <a:avLst/>
           </a:prstGeom>
         </p:spPr>
       </p:pic>
-      <p:sp>
-        <p:nvSpPr>
-          <p:cNvPr id="86" name="TextBox 85">
+      <p:cxnSp>
+        <p:nvCxnSpPr>
+          <p:cNvPr id="12" name="Straight Connector 88">
             <a:extLst>
               <a:ext uri="{FF2B5EF4-FFF2-40B4-BE49-F238E27FC236}">
-                <a16:creationId xmlns:a16="http://schemas.microsoft.com/office/drawing/2014/main" id="{90F5CDF3-FDC3-0090-6CB7-42A9120D59C7}"/>
-              </a:ext>
-            </a:extLst>
-          </p:cNvPr>
-          <p:cNvSpPr txBox="1"/>
-          <p:nvPr/>
-        </p:nvSpPr>
-        <p:spPr>
-          <a:xfrm>
-            <a:off x="5680666" y="2247470"/>
-            <a:ext cx="824125" cy="184666"/>
-          </a:xfrm>
-          <a:prstGeom prst="rect">
-            <a:avLst/>
-          </a:prstGeom>
-          <a:solidFill>
-            <a:schemeClr val="bg1"/>
-          </a:solidFill>
-          <a:ln w="3175">
-            <a:solidFill>
-              <a:schemeClr val="tx1">
-                <a:lumMod val="65000"/>
-                <a:lumOff val="35000"/>
-              </a:schemeClr>
-            </a:solidFill>
-          </a:ln>
-        </p:spPr>
-        <p:txBody>
-          <a:bodyPr wrap="square" rtlCol="0">
-            <a:spAutoFit/>
-          </a:bodyPr>
-          <a:lstStyle/>
-          <a:p>
-            <a:pPr algn="ctr"/>
-            <a:r>
-              <a:rPr lang="en-US" sz="600" dirty="0">
-                <a:solidFill>
-                  <a:schemeClr val="tx1">
-                    <a:lumMod val="65000"/>
-                    <a:lumOff val="35000"/>
-                  </a:schemeClr>
-                </a:solidFill>
-              </a:rPr>
-              <a:t>Single-WT ecPoint</a:t>
-            </a:r>
-            <a:endParaRPr lang="en-GB" sz="600" dirty="0">
-              <a:solidFill>
-                <a:schemeClr val="tx1">
-                  <a:lumMod val="65000"/>
-                  <a:lumOff val="35000"/>
-                </a:schemeClr>
-              </a:solidFill>
-            </a:endParaRPr>
-          </a:p>
-        </p:txBody>
-      </p:sp>
-      <p:sp>
-        <p:nvSpPr>
-          <p:cNvPr id="87" name="TextBox 86">
-            <a:extLst>
-              <a:ext uri="{FF2B5EF4-FFF2-40B4-BE49-F238E27FC236}">
-                <a16:creationId xmlns:a16="http://schemas.microsoft.com/office/drawing/2014/main" id="{5C6DCF59-1370-8F32-FD27-7CCD8C8F523D}"/>
-              </a:ext>
-            </a:extLst>
-          </p:cNvPr>
-          <p:cNvSpPr txBox="1"/>
-          <p:nvPr/>
-        </p:nvSpPr>
-        <p:spPr>
-          <a:xfrm>
-            <a:off x="2451839" y="2247470"/>
-            <a:ext cx="824125" cy="184666"/>
-          </a:xfrm>
-          <a:prstGeom prst="rect">
-            <a:avLst/>
-          </a:prstGeom>
-          <a:solidFill>
-            <a:schemeClr val="bg1"/>
-          </a:solidFill>
-          <a:ln w="3175">
-            <a:solidFill>
-              <a:schemeClr val="tx1">
-                <a:lumMod val="65000"/>
-                <a:lumOff val="35000"/>
-              </a:schemeClr>
-            </a:solidFill>
-          </a:ln>
-        </p:spPr>
-        <p:txBody>
-          <a:bodyPr wrap="square" rtlCol="0">
-            <a:spAutoFit/>
-          </a:bodyPr>
-          <a:lstStyle/>
-          <a:p>
-            <a:pPr algn="ctr"/>
-            <a:r>
-              <a:rPr lang="en-US" sz="600" dirty="0">
-                <a:solidFill>
-                  <a:schemeClr val="tx1">
-                    <a:lumMod val="65000"/>
-                    <a:lumOff val="35000"/>
-                  </a:schemeClr>
-                </a:solidFill>
-              </a:rPr>
-              <a:t>Multiple-WT ecPoint</a:t>
-            </a:r>
-            <a:endParaRPr lang="en-GB" sz="600" dirty="0">
-              <a:solidFill>
-                <a:schemeClr val="tx1">
-                  <a:lumMod val="65000"/>
-                  <a:lumOff val="35000"/>
-                </a:schemeClr>
-              </a:solidFill>
-            </a:endParaRPr>
-          </a:p>
-        </p:txBody>
-      </p:sp>
-      <p:sp>
-        <p:nvSpPr>
-          <p:cNvPr id="88" name="TextBox 87">
-            <a:extLst>
-              <a:ext uri="{FF2B5EF4-FFF2-40B4-BE49-F238E27FC236}">
-                <a16:creationId xmlns:a16="http://schemas.microsoft.com/office/drawing/2014/main" id="{20A5843F-B0F2-BBC1-325D-115B55EA1230}"/>
-              </a:ext>
-            </a:extLst>
-          </p:cNvPr>
-          <p:cNvSpPr txBox="1"/>
-          <p:nvPr/>
-        </p:nvSpPr>
-        <p:spPr>
-          <a:xfrm>
-            <a:off x="5680665" y="605747"/>
-            <a:ext cx="824125" cy="184666"/>
-          </a:xfrm>
-          <a:prstGeom prst="rect">
-            <a:avLst/>
-          </a:prstGeom>
-          <a:solidFill>
-            <a:schemeClr val="bg1"/>
-          </a:solidFill>
-          <a:ln w="3175">
-            <a:solidFill>
-              <a:schemeClr val="tx1">
-                <a:lumMod val="65000"/>
-                <a:lumOff val="35000"/>
-              </a:schemeClr>
-            </a:solidFill>
-          </a:ln>
-        </p:spPr>
-        <p:txBody>
-          <a:bodyPr wrap="square" rtlCol="0">
-            <a:spAutoFit/>
-          </a:bodyPr>
-          <a:lstStyle/>
-          <a:p>
-            <a:pPr algn="ctr"/>
-            <a:r>
-              <a:rPr lang="en-US" sz="600" dirty="0">
-                <a:solidFill>
-                  <a:schemeClr val="tx1">
-                    <a:lumMod val="65000"/>
-                    <a:lumOff val="35000"/>
-                  </a:schemeClr>
-                </a:solidFill>
-              </a:rPr>
-              <a:t>ENS</a:t>
-            </a:r>
-            <a:endParaRPr lang="en-GB" sz="600" dirty="0">
-              <a:solidFill>
-                <a:schemeClr val="tx1">
-                  <a:lumMod val="65000"/>
-                  <a:lumOff val="35000"/>
-                </a:schemeClr>
-              </a:solidFill>
-            </a:endParaRPr>
-          </a:p>
-        </p:txBody>
-      </p:sp>
-      <p:cxnSp>
-        <p:nvCxnSpPr>
-          <p:cNvPr id="89" name="Straight Connector 88">
-            <a:extLst>
-              <a:ext uri="{FF2B5EF4-FFF2-40B4-BE49-F238E27FC236}">
-                <a16:creationId xmlns:a16="http://schemas.microsoft.com/office/drawing/2014/main" id="{EE3BDC6D-AA05-37D9-9179-93AF0CC6709A}"/>
+                <a16:creationId xmlns:a16="http://schemas.microsoft.com/office/drawing/2014/main" id="{3A0FA579-A86B-403C-BB7E-7C40FE7275E3}"/>
               </a:ext>
             </a:extLst>
           </p:cNvPr>
@@ -4517,8 +4334,8 @@
         </p:nvCxnSpPr>
         <p:spPr>
           <a:xfrm>
-            <a:off x="3325622" y="0"/>
-            <a:ext cx="7141" cy="2189801"/>
+            <a:off x="3292787" y="2202534"/>
+            <a:ext cx="0" cy="1685254"/>
           </a:xfrm>
           <a:prstGeom prst="line">
             <a:avLst/>
@@ -4546,10 +4363,10 @@
       </p:cxnSp>
       <p:cxnSp>
         <p:nvCxnSpPr>
-          <p:cNvPr id="90" name="Straight Connector 89">
+          <p:cNvPr id="13" name="Straight Connector 89">
             <a:extLst>
               <a:ext uri="{FF2B5EF4-FFF2-40B4-BE49-F238E27FC236}">
-                <a16:creationId xmlns:a16="http://schemas.microsoft.com/office/drawing/2014/main" id="{6BC775DB-29E5-8334-F642-4D662BBC5BEC}"/>
+                <a16:creationId xmlns:a16="http://schemas.microsoft.com/office/drawing/2014/main" id="{45FAEEA4-3AD6-6555-8095-FD58585F4512}"/>
               </a:ext>
             </a:extLst>
           </p:cNvPr>
@@ -4560,8 +4377,8 @@
         </p:nvCxnSpPr>
         <p:spPr>
           <a:xfrm>
-            <a:off x="0" y="2187543"/>
-            <a:ext cx="3332763" cy="2258"/>
+            <a:off x="3290341" y="2202534"/>
+            <a:ext cx="3287468" cy="0"/>
           </a:xfrm>
           <a:prstGeom prst="line">
             <a:avLst/>
@@ -4587,256 +4404,12 @@
           </a:fontRef>
         </p:style>
       </p:cxnSp>
-      <p:sp>
-        <p:nvSpPr>
-          <p:cNvPr id="91" name="TextBox 90">
+      <p:pic>
+        <p:nvPicPr>
+          <p:cNvPr id="8" name="Picture 7" descr="A map of the world&#10;&#10;Description automatically generated">
             <a:extLst>
               <a:ext uri="{FF2B5EF4-FFF2-40B4-BE49-F238E27FC236}">
-                <a16:creationId xmlns:a16="http://schemas.microsoft.com/office/drawing/2014/main" id="{A6A300DF-5000-8232-DECC-87531F49BB60}"/>
-              </a:ext>
-            </a:extLst>
-          </p:cNvPr>
-          <p:cNvSpPr txBox="1"/>
-          <p:nvPr/>
-        </p:nvSpPr>
-        <p:spPr>
-          <a:xfrm>
-            <a:off x="182243" y="1940106"/>
-            <a:ext cx="180000" cy="180000"/>
-          </a:xfrm>
-          <a:prstGeom prst="rect">
-            <a:avLst/>
-          </a:prstGeom>
-          <a:solidFill>
-            <a:schemeClr val="bg1"/>
-          </a:solidFill>
-          <a:ln w="3175">
-            <a:solidFill>
-              <a:schemeClr val="tx1">
-                <a:lumMod val="65000"/>
-                <a:lumOff val="35000"/>
-              </a:schemeClr>
-            </a:solidFill>
-          </a:ln>
-        </p:spPr>
-        <p:txBody>
-          <a:bodyPr wrap="square" rtlCol="0">
-            <a:spAutoFit/>
-          </a:bodyPr>
-          <a:lstStyle/>
-          <a:p>
-            <a:pPr algn="ctr"/>
-            <a:r>
-              <a:rPr lang="en-US" sz="600" dirty="0">
-                <a:solidFill>
-                  <a:schemeClr val="tx1">
-                    <a:lumMod val="65000"/>
-                    <a:lumOff val="35000"/>
-                  </a:schemeClr>
-                </a:solidFill>
-              </a:rPr>
-              <a:t>a</a:t>
-            </a:r>
-            <a:endParaRPr lang="en-GB" sz="600" dirty="0">
-              <a:solidFill>
-                <a:schemeClr val="tx1">
-                  <a:lumMod val="65000"/>
-                  <a:lumOff val="35000"/>
-                </a:schemeClr>
-              </a:solidFill>
-            </a:endParaRPr>
-          </a:p>
-        </p:txBody>
-      </p:sp>
-      <p:sp>
-        <p:nvSpPr>
-          <p:cNvPr id="92" name="TextBox 91">
-            <a:extLst>
-              <a:ext uri="{FF2B5EF4-FFF2-40B4-BE49-F238E27FC236}">
-                <a16:creationId xmlns:a16="http://schemas.microsoft.com/office/drawing/2014/main" id="{0B6010B9-04B3-7D57-51D2-06629D869929}"/>
-              </a:ext>
-            </a:extLst>
-          </p:cNvPr>
-          <p:cNvSpPr txBox="1"/>
-          <p:nvPr/>
-        </p:nvSpPr>
-        <p:spPr>
-          <a:xfrm>
-            <a:off x="182243" y="3580821"/>
-            <a:ext cx="180000" cy="184666"/>
-          </a:xfrm>
-          <a:prstGeom prst="rect">
-            <a:avLst/>
-          </a:prstGeom>
-          <a:solidFill>
-            <a:schemeClr val="bg1"/>
-          </a:solidFill>
-          <a:ln w="3175">
-            <a:solidFill>
-              <a:schemeClr val="tx1">
-                <a:lumMod val="65000"/>
-                <a:lumOff val="35000"/>
-              </a:schemeClr>
-            </a:solidFill>
-          </a:ln>
-        </p:spPr>
-        <p:txBody>
-          <a:bodyPr wrap="square" rtlCol="0">
-            <a:spAutoFit/>
-          </a:bodyPr>
-          <a:lstStyle/>
-          <a:p>
-            <a:pPr algn="ctr"/>
-            <a:r>
-              <a:rPr lang="en-US" sz="600" dirty="0">
-                <a:solidFill>
-                  <a:schemeClr val="tx1">
-                    <a:lumMod val="65000"/>
-                    <a:lumOff val="35000"/>
-                  </a:schemeClr>
-                </a:solidFill>
-              </a:rPr>
-              <a:t>c</a:t>
-            </a:r>
-            <a:endParaRPr lang="en-GB" sz="600" dirty="0">
-              <a:solidFill>
-                <a:schemeClr val="tx1">
-                  <a:lumMod val="65000"/>
-                  <a:lumOff val="35000"/>
-                </a:schemeClr>
-              </a:solidFill>
-            </a:endParaRPr>
-          </a:p>
-        </p:txBody>
-      </p:sp>
-      <p:sp>
-        <p:nvSpPr>
-          <p:cNvPr id="93" name="TextBox 92">
-            <a:extLst>
-              <a:ext uri="{FF2B5EF4-FFF2-40B4-BE49-F238E27FC236}">
-                <a16:creationId xmlns:a16="http://schemas.microsoft.com/office/drawing/2014/main" id="{3BA227B9-82BF-6F6B-1C8D-5A3E3A44C34B}"/>
-              </a:ext>
-            </a:extLst>
-          </p:cNvPr>
-          <p:cNvSpPr txBox="1"/>
-          <p:nvPr/>
-        </p:nvSpPr>
-        <p:spPr>
-          <a:xfrm>
-            <a:off x="3402185" y="1940106"/>
-            <a:ext cx="180000" cy="184666"/>
-          </a:xfrm>
-          <a:prstGeom prst="rect">
-            <a:avLst/>
-          </a:prstGeom>
-          <a:solidFill>
-            <a:schemeClr val="bg1"/>
-          </a:solidFill>
-          <a:ln w="3175">
-            <a:solidFill>
-              <a:schemeClr val="tx1">
-                <a:lumMod val="65000"/>
-                <a:lumOff val="35000"/>
-              </a:schemeClr>
-            </a:solidFill>
-          </a:ln>
-        </p:spPr>
-        <p:txBody>
-          <a:bodyPr wrap="square" rtlCol="0">
-            <a:spAutoFit/>
-          </a:bodyPr>
-          <a:lstStyle/>
-          <a:p>
-            <a:pPr algn="ctr"/>
-            <a:r>
-              <a:rPr lang="en-US" sz="600" dirty="0">
-                <a:solidFill>
-                  <a:schemeClr val="tx1">
-                    <a:lumMod val="65000"/>
-                    <a:lumOff val="35000"/>
-                  </a:schemeClr>
-                </a:solidFill>
-              </a:rPr>
-              <a:t>b</a:t>
-            </a:r>
-            <a:endParaRPr lang="en-GB" sz="600" dirty="0">
-              <a:solidFill>
-                <a:schemeClr val="tx1">
-                  <a:lumMod val="65000"/>
-                  <a:lumOff val="35000"/>
-                </a:schemeClr>
-              </a:solidFill>
-            </a:endParaRPr>
-          </a:p>
-        </p:txBody>
-      </p:sp>
-      <p:sp>
-        <p:nvSpPr>
-          <p:cNvPr id="94" name="TextBox 93">
-            <a:extLst>
-              <a:ext uri="{FF2B5EF4-FFF2-40B4-BE49-F238E27FC236}">
-                <a16:creationId xmlns:a16="http://schemas.microsoft.com/office/drawing/2014/main" id="{AD254E99-063B-A2A1-AB50-596B1DB6D822}"/>
-              </a:ext>
-            </a:extLst>
-          </p:cNvPr>
-          <p:cNvSpPr txBox="1"/>
-          <p:nvPr/>
-        </p:nvSpPr>
-        <p:spPr>
-          <a:xfrm>
-            <a:off x="3402185" y="3580821"/>
-            <a:ext cx="180000" cy="184666"/>
-          </a:xfrm>
-          <a:prstGeom prst="rect">
-            <a:avLst/>
-          </a:prstGeom>
-          <a:solidFill>
-            <a:schemeClr val="bg1"/>
-          </a:solidFill>
-          <a:ln w="3175">
-            <a:solidFill>
-              <a:schemeClr val="tx1">
-                <a:lumMod val="65000"/>
-                <a:lumOff val="35000"/>
-              </a:schemeClr>
-            </a:solidFill>
-          </a:ln>
-        </p:spPr>
-        <p:txBody>
-          <a:bodyPr wrap="square" rtlCol="0">
-            <a:spAutoFit/>
-          </a:bodyPr>
-          <a:lstStyle/>
-          <a:p>
-            <a:pPr algn="ctr"/>
-            <a:r>
-              <a:rPr lang="en-US" sz="600" dirty="0">
-                <a:solidFill>
-                  <a:schemeClr val="tx1">
-                    <a:lumMod val="65000"/>
-                    <a:lumOff val="35000"/>
-                  </a:schemeClr>
-                </a:solidFill>
-              </a:rPr>
-              <a:t>d</a:t>
-            </a:r>
-            <a:endParaRPr lang="en-GB" sz="600" dirty="0">
-              <a:solidFill>
-                <a:schemeClr val="tx1">
-                  <a:lumMod val="65000"/>
-                  <a:lumOff val="35000"/>
-                </a:schemeClr>
-              </a:solidFill>
-            </a:endParaRPr>
-          </a:p>
-        </p:txBody>
-      </p:sp>
-      <p:pic>
-        <p:nvPicPr>
-          <p:cNvPr id="98" name="Picture 97" descr="A map of the world&#10;&#10;Description automatically generated">
-            <a:extLst>
-              <a:ext uri="{FF2B5EF4-FFF2-40B4-BE49-F238E27FC236}">
-                <a16:creationId xmlns:a16="http://schemas.microsoft.com/office/drawing/2014/main" id="{9016A233-A00D-D737-1D18-0E0E05B4DCD9}"/>
+                <a16:creationId xmlns:a16="http://schemas.microsoft.com/office/drawing/2014/main" id="{0C185AEB-FBDC-4979-6408-BB4819BD4C96}"/>
               </a:ext>
             </a:extLst>
           </p:cNvPr>
@@ -4858,8 +4431,8 @@
         </p:blipFill>
         <p:spPr>
           <a:xfrm>
-            <a:off x="3355771" y="195101"/>
-            <a:ext cx="3191881" cy="371476"/>
+            <a:off x="9995" y="158176"/>
+            <a:ext cx="3240000" cy="371476"/>
           </a:xfrm>
           <a:prstGeom prst="rect">
             <a:avLst/>
@@ -4868,10 +4441,10 @@
       </p:pic>
       <p:sp>
         <p:nvSpPr>
-          <p:cNvPr id="99" name="TextBox 98">
+          <p:cNvPr id="10" name="TextBox 9">
             <a:extLst>
               <a:ext uri="{FF2B5EF4-FFF2-40B4-BE49-F238E27FC236}">
-                <a16:creationId xmlns:a16="http://schemas.microsoft.com/office/drawing/2014/main" id="{DCA01C30-9EAD-56C6-94BD-03EC23530D1C}"/>
+                <a16:creationId xmlns:a16="http://schemas.microsoft.com/office/drawing/2014/main" id="{4FE095D0-F330-6D0B-8D62-E81D7A85EDDC}"/>
               </a:ext>
             </a:extLst>
           </p:cNvPr>
@@ -4880,8 +4453,8 @@
         </p:nvSpPr>
         <p:spPr>
           <a:xfrm>
-            <a:off x="3355771" y="-25637"/>
-            <a:ext cx="3191881" cy="215444"/>
+            <a:off x="50341" y="-43998"/>
+            <a:ext cx="3240000" cy="215444"/>
           </a:xfrm>
           <a:prstGeom prst="rect">
             <a:avLst/>
@@ -4919,10 +4492,10 @@
       </p:sp>
       <p:sp>
         <p:nvSpPr>
-          <p:cNvPr id="100" name="TextBox 99">
+          <p:cNvPr id="14" name="TextBox 13">
             <a:extLst>
               <a:ext uri="{FF2B5EF4-FFF2-40B4-BE49-F238E27FC236}">
-                <a16:creationId xmlns:a16="http://schemas.microsoft.com/office/drawing/2014/main" id="{19CECEBB-501C-0F74-922B-6C19353D4829}"/>
+                <a16:creationId xmlns:a16="http://schemas.microsoft.com/office/drawing/2014/main" id="{4F79B5CA-9846-C2A1-7E4D-ABD91AE0233C}"/>
               </a:ext>
             </a:extLst>
           </p:cNvPr>
@@ -4931,8 +4504,8 @@
         </p:nvSpPr>
         <p:spPr>
           <a:xfrm>
-            <a:off x="142875" y="232454"/>
-            <a:ext cx="3166879" cy="215444"/>
+            <a:off x="2382093" y="569600"/>
+            <a:ext cx="824125" cy="184666"/>
           </a:xfrm>
           <a:prstGeom prst="rect">
             <a:avLst/>
@@ -4940,6 +4513,197 @@
           <a:solidFill>
             <a:schemeClr val="bg1"/>
           </a:solidFill>
+          <a:ln w="3175">
+            <a:solidFill>
+              <a:schemeClr val="tx1">
+                <a:lumMod val="65000"/>
+                <a:lumOff val="35000"/>
+              </a:schemeClr>
+            </a:solidFill>
+          </a:ln>
+        </p:spPr>
+        <p:txBody>
+          <a:bodyPr wrap="square" rtlCol="0">
+            <a:spAutoFit/>
+          </a:bodyPr>
+          <a:lstStyle/>
+          <a:p>
+            <a:pPr algn="ctr"/>
+            <a:r>
+              <a:rPr lang="en-US" sz="600" dirty="0">
+                <a:solidFill>
+                  <a:schemeClr val="tx1">
+                    <a:lumMod val="65000"/>
+                    <a:lumOff val="35000"/>
+                  </a:schemeClr>
+                </a:solidFill>
+              </a:rPr>
+              <a:t>ENS</a:t>
+            </a:r>
+            <a:endParaRPr lang="en-GB" sz="600" dirty="0">
+              <a:solidFill>
+                <a:schemeClr val="tx1">
+                  <a:lumMod val="65000"/>
+                  <a:lumOff val="35000"/>
+                </a:schemeClr>
+              </a:solidFill>
+            </a:endParaRPr>
+          </a:p>
+        </p:txBody>
+      </p:sp>
+      <p:sp>
+        <p:nvSpPr>
+          <p:cNvPr id="15" name="TextBox 14">
+            <a:extLst>
+              <a:ext uri="{FF2B5EF4-FFF2-40B4-BE49-F238E27FC236}">
+                <a16:creationId xmlns:a16="http://schemas.microsoft.com/office/drawing/2014/main" id="{C48DEC25-43DE-3CB2-AF8A-3C2A97F8F4D1}"/>
+              </a:ext>
+            </a:extLst>
+          </p:cNvPr>
+          <p:cNvSpPr txBox="1"/>
+          <p:nvPr/>
+        </p:nvSpPr>
+        <p:spPr>
+          <a:xfrm>
+            <a:off x="2382093" y="2286739"/>
+            <a:ext cx="824125" cy="184666"/>
+          </a:xfrm>
+          <a:prstGeom prst="rect">
+            <a:avLst/>
+          </a:prstGeom>
+          <a:solidFill>
+            <a:schemeClr val="bg1"/>
+          </a:solidFill>
+          <a:ln w="3175">
+            <a:solidFill>
+              <a:schemeClr val="tx1">
+                <a:lumMod val="65000"/>
+                <a:lumOff val="35000"/>
+              </a:schemeClr>
+            </a:solidFill>
+          </a:ln>
+        </p:spPr>
+        <p:txBody>
+          <a:bodyPr wrap="square" rtlCol="0">
+            <a:spAutoFit/>
+          </a:bodyPr>
+          <a:lstStyle/>
+          <a:p>
+            <a:pPr algn="ctr"/>
+            <a:r>
+              <a:rPr lang="en-US" sz="600" dirty="0">
+                <a:solidFill>
+                  <a:schemeClr val="tx1">
+                    <a:lumMod val="65000"/>
+                    <a:lumOff val="35000"/>
+                  </a:schemeClr>
+                </a:solidFill>
+              </a:rPr>
+              <a:t>Multiple-WT ecPoint</a:t>
+            </a:r>
+            <a:endParaRPr lang="en-GB" sz="600" dirty="0">
+              <a:solidFill>
+                <a:schemeClr val="tx1">
+                  <a:lumMod val="65000"/>
+                  <a:lumOff val="35000"/>
+                </a:schemeClr>
+              </a:solidFill>
+            </a:endParaRPr>
+          </a:p>
+        </p:txBody>
+      </p:sp>
+      <p:sp>
+        <p:nvSpPr>
+          <p:cNvPr id="16" name="TextBox 15">
+            <a:extLst>
+              <a:ext uri="{FF2B5EF4-FFF2-40B4-BE49-F238E27FC236}">
+                <a16:creationId xmlns:a16="http://schemas.microsoft.com/office/drawing/2014/main" id="{7A140EFE-E9C2-3A10-FD69-64FE12C4CE44}"/>
+              </a:ext>
+            </a:extLst>
+          </p:cNvPr>
+          <p:cNvSpPr txBox="1"/>
+          <p:nvPr/>
+        </p:nvSpPr>
+        <p:spPr>
+          <a:xfrm>
+            <a:off x="5714325" y="569600"/>
+            <a:ext cx="824125" cy="184666"/>
+          </a:xfrm>
+          <a:prstGeom prst="rect">
+            <a:avLst/>
+          </a:prstGeom>
+          <a:solidFill>
+            <a:schemeClr val="bg1"/>
+          </a:solidFill>
+          <a:ln w="3175">
+            <a:solidFill>
+              <a:schemeClr val="tx1">
+                <a:lumMod val="65000"/>
+                <a:lumOff val="35000"/>
+              </a:schemeClr>
+            </a:solidFill>
+          </a:ln>
+        </p:spPr>
+        <p:txBody>
+          <a:bodyPr wrap="square" rtlCol="0">
+            <a:spAutoFit/>
+          </a:bodyPr>
+          <a:lstStyle/>
+          <a:p>
+            <a:pPr algn="ctr"/>
+            <a:r>
+              <a:rPr lang="en-US" sz="600" dirty="0">
+                <a:solidFill>
+                  <a:schemeClr val="tx1">
+                    <a:lumMod val="65000"/>
+                    <a:lumOff val="35000"/>
+                  </a:schemeClr>
+                </a:solidFill>
+              </a:rPr>
+              <a:t>Single-WT ecPoint</a:t>
+            </a:r>
+            <a:endParaRPr lang="en-GB" sz="600" dirty="0">
+              <a:solidFill>
+                <a:schemeClr val="tx1">
+                  <a:lumMod val="65000"/>
+                  <a:lumOff val="35000"/>
+                </a:schemeClr>
+              </a:solidFill>
+            </a:endParaRPr>
+          </a:p>
+        </p:txBody>
+      </p:sp>
+      <p:sp>
+        <p:nvSpPr>
+          <p:cNvPr id="17" name="TextBox 16">
+            <a:extLst>
+              <a:ext uri="{FF2B5EF4-FFF2-40B4-BE49-F238E27FC236}">
+                <a16:creationId xmlns:a16="http://schemas.microsoft.com/office/drawing/2014/main" id="{D9B8CD13-EBE6-3643-4AFB-D0DACE221007}"/>
+              </a:ext>
+            </a:extLst>
+          </p:cNvPr>
+          <p:cNvSpPr txBox="1"/>
+          <p:nvPr/>
+        </p:nvSpPr>
+        <p:spPr>
+          <a:xfrm>
+            <a:off x="5489212" y="3626393"/>
+            <a:ext cx="1054848" cy="215444"/>
+          </a:xfrm>
+          <a:prstGeom prst="rect">
+            <a:avLst/>
+          </a:prstGeom>
+          <a:solidFill>
+            <a:schemeClr val="bg1"/>
+          </a:solidFill>
+          <a:ln w="3175">
+            <a:solidFill>
+              <a:schemeClr val="tx1">
+                <a:lumMod val="65000"/>
+                <a:lumOff val="35000"/>
+              </a:schemeClr>
+            </a:solidFill>
+          </a:ln>
         </p:spPr>
         <p:txBody>
           <a:bodyPr wrap="square" rtlCol="0">
@@ -4970,10 +4734,254 @@
           </a:p>
         </p:txBody>
       </p:sp>
+      <p:sp>
+        <p:nvSpPr>
+          <p:cNvPr id="18" name="TextBox 17">
+            <a:extLst>
+              <a:ext uri="{FF2B5EF4-FFF2-40B4-BE49-F238E27FC236}">
+                <a16:creationId xmlns:a16="http://schemas.microsoft.com/office/drawing/2014/main" id="{EB584B3D-ED06-B266-CA62-9934C712A3F8}"/>
+              </a:ext>
+            </a:extLst>
+          </p:cNvPr>
+          <p:cNvSpPr txBox="1"/>
+          <p:nvPr/>
+        </p:nvSpPr>
+        <p:spPr>
+          <a:xfrm>
+            <a:off x="53555" y="1916822"/>
+            <a:ext cx="180000" cy="180000"/>
+          </a:xfrm>
+          <a:prstGeom prst="rect">
+            <a:avLst/>
+          </a:prstGeom>
+          <a:solidFill>
+            <a:schemeClr val="bg1"/>
+          </a:solidFill>
+          <a:ln w="3175">
+            <a:solidFill>
+              <a:schemeClr val="tx1">
+                <a:lumMod val="65000"/>
+                <a:lumOff val="35000"/>
+              </a:schemeClr>
+            </a:solidFill>
+          </a:ln>
+        </p:spPr>
+        <p:txBody>
+          <a:bodyPr wrap="square" rtlCol="0">
+            <a:spAutoFit/>
+          </a:bodyPr>
+          <a:lstStyle/>
+          <a:p>
+            <a:pPr algn="ctr"/>
+            <a:r>
+              <a:rPr lang="en-US" sz="600" dirty="0">
+                <a:solidFill>
+                  <a:schemeClr val="tx1">
+                    <a:lumMod val="65000"/>
+                    <a:lumOff val="35000"/>
+                  </a:schemeClr>
+                </a:solidFill>
+              </a:rPr>
+              <a:t>a</a:t>
+            </a:r>
+            <a:endParaRPr lang="en-GB" sz="600" dirty="0">
+              <a:solidFill>
+                <a:schemeClr val="tx1">
+                  <a:lumMod val="65000"/>
+                  <a:lumOff val="35000"/>
+                </a:schemeClr>
+              </a:solidFill>
+            </a:endParaRPr>
+          </a:p>
+        </p:txBody>
+      </p:sp>
+      <p:sp>
+        <p:nvSpPr>
+          <p:cNvPr id="19" name="TextBox 18">
+            <a:extLst>
+              <a:ext uri="{FF2B5EF4-FFF2-40B4-BE49-F238E27FC236}">
+                <a16:creationId xmlns:a16="http://schemas.microsoft.com/office/drawing/2014/main" id="{7E3CEC12-94E9-EB0F-1D95-91E649E86A7F}"/>
+              </a:ext>
+            </a:extLst>
+          </p:cNvPr>
+          <p:cNvSpPr txBox="1"/>
+          <p:nvPr/>
+        </p:nvSpPr>
+        <p:spPr>
+          <a:xfrm>
+            <a:off x="53555" y="3637279"/>
+            <a:ext cx="180000" cy="184666"/>
+          </a:xfrm>
+          <a:prstGeom prst="rect">
+            <a:avLst/>
+          </a:prstGeom>
+          <a:solidFill>
+            <a:schemeClr val="bg1"/>
+          </a:solidFill>
+          <a:ln w="3175">
+            <a:solidFill>
+              <a:schemeClr val="tx1">
+                <a:lumMod val="65000"/>
+                <a:lumOff val="35000"/>
+              </a:schemeClr>
+            </a:solidFill>
+          </a:ln>
+        </p:spPr>
+        <p:txBody>
+          <a:bodyPr wrap="square" rtlCol="0">
+            <a:spAutoFit/>
+          </a:bodyPr>
+          <a:lstStyle/>
+          <a:p>
+            <a:pPr algn="ctr"/>
+            <a:r>
+              <a:rPr lang="en-US" sz="600" dirty="0">
+                <a:solidFill>
+                  <a:schemeClr val="tx1">
+                    <a:lumMod val="65000"/>
+                    <a:lumOff val="35000"/>
+                  </a:schemeClr>
+                </a:solidFill>
+              </a:rPr>
+              <a:t>b</a:t>
+            </a:r>
+            <a:endParaRPr lang="en-GB" sz="600" dirty="0">
+              <a:solidFill>
+                <a:schemeClr val="tx1">
+                  <a:lumMod val="65000"/>
+                  <a:lumOff val="35000"/>
+                </a:schemeClr>
+              </a:solidFill>
+            </a:endParaRPr>
+          </a:p>
+        </p:txBody>
+      </p:sp>
+      <p:sp>
+        <p:nvSpPr>
+          <p:cNvPr id="20" name="TextBox 19">
+            <a:extLst>
+              <a:ext uri="{FF2B5EF4-FFF2-40B4-BE49-F238E27FC236}">
+                <a16:creationId xmlns:a16="http://schemas.microsoft.com/office/drawing/2014/main" id="{19FBFF87-0A12-838B-30AC-E0AE75911D4D}"/>
+              </a:ext>
+            </a:extLst>
+          </p:cNvPr>
+          <p:cNvSpPr txBox="1"/>
+          <p:nvPr/>
+        </p:nvSpPr>
+        <p:spPr>
+          <a:xfrm>
+            <a:off x="3385355" y="1910743"/>
+            <a:ext cx="180000" cy="184666"/>
+          </a:xfrm>
+          <a:prstGeom prst="rect">
+            <a:avLst/>
+          </a:prstGeom>
+          <a:solidFill>
+            <a:schemeClr val="bg1"/>
+          </a:solidFill>
+          <a:ln w="3175">
+            <a:solidFill>
+              <a:schemeClr val="tx1">
+                <a:lumMod val="65000"/>
+                <a:lumOff val="35000"/>
+              </a:schemeClr>
+            </a:solidFill>
+          </a:ln>
+        </p:spPr>
+        <p:txBody>
+          <a:bodyPr wrap="square" rtlCol="0">
+            <a:spAutoFit/>
+          </a:bodyPr>
+          <a:lstStyle/>
+          <a:p>
+            <a:pPr algn="ctr"/>
+            <a:r>
+              <a:rPr lang="en-US" sz="600" dirty="0">
+                <a:solidFill>
+                  <a:schemeClr val="tx1">
+                    <a:lumMod val="65000"/>
+                    <a:lumOff val="35000"/>
+                  </a:schemeClr>
+                </a:solidFill>
+              </a:rPr>
+              <a:t>c</a:t>
+            </a:r>
+            <a:endParaRPr lang="en-GB" sz="600" dirty="0">
+              <a:solidFill>
+                <a:schemeClr val="tx1">
+                  <a:lumMod val="65000"/>
+                  <a:lumOff val="35000"/>
+                </a:schemeClr>
+              </a:solidFill>
+            </a:endParaRPr>
+          </a:p>
+        </p:txBody>
+      </p:sp>
+      <p:sp>
+        <p:nvSpPr>
+          <p:cNvPr id="21" name="TextBox 20">
+            <a:extLst>
+              <a:ext uri="{FF2B5EF4-FFF2-40B4-BE49-F238E27FC236}">
+                <a16:creationId xmlns:a16="http://schemas.microsoft.com/office/drawing/2014/main" id="{24F131B5-43EF-80FE-3944-8BCAD68A7A72}"/>
+              </a:ext>
+            </a:extLst>
+          </p:cNvPr>
+          <p:cNvSpPr txBox="1"/>
+          <p:nvPr/>
+        </p:nvSpPr>
+        <p:spPr>
+          <a:xfrm>
+            <a:off x="3385355" y="3637279"/>
+            <a:ext cx="180000" cy="184666"/>
+          </a:xfrm>
+          <a:prstGeom prst="rect">
+            <a:avLst/>
+          </a:prstGeom>
+          <a:solidFill>
+            <a:schemeClr val="bg1"/>
+          </a:solidFill>
+          <a:ln w="3175">
+            <a:solidFill>
+              <a:schemeClr val="tx1">
+                <a:lumMod val="65000"/>
+                <a:lumOff val="35000"/>
+              </a:schemeClr>
+            </a:solidFill>
+          </a:ln>
+        </p:spPr>
+        <p:txBody>
+          <a:bodyPr wrap="square" rtlCol="0">
+            <a:spAutoFit/>
+          </a:bodyPr>
+          <a:lstStyle/>
+          <a:p>
+            <a:pPr algn="ctr"/>
+            <a:r>
+              <a:rPr lang="en-US" sz="600" dirty="0">
+                <a:solidFill>
+                  <a:schemeClr val="tx1">
+                    <a:lumMod val="65000"/>
+                    <a:lumOff val="35000"/>
+                  </a:schemeClr>
+                </a:solidFill>
+              </a:rPr>
+              <a:t>d</a:t>
+            </a:r>
+            <a:endParaRPr lang="en-GB" sz="600" dirty="0">
+              <a:solidFill>
+                <a:schemeClr val="tx1">
+                  <a:lumMod val="65000"/>
+                  <a:lumOff val="35000"/>
+                </a:schemeClr>
+              </a:solidFill>
+            </a:endParaRPr>
+          </a:p>
+        </p:txBody>
+      </p:sp>
     </p:spTree>
     <p:extLst>
       <p:ext uri="{BB962C8B-B14F-4D97-AF65-F5344CB8AC3E}">
-        <p14:creationId xmlns:p14="http://schemas.microsoft.com/office/powerpoint/2010/main" val="1072346714"/>
+        <p14:creationId xmlns:p14="http://schemas.microsoft.com/office/powerpoint/2010/main" val="3678187506"/>
       </p:ext>
     </p:extLst>
   </p:cSld>

</xml_diff>

<commit_message>
Added manuscript and figures
</commit_message>
<xml_diff>
--- a/Manuscript/Figures/02_Data_Example_FC_OBS.pptx
+++ b/Manuscript/Figures/02_Data_Example_FC_OBS.pptx
@@ -2,12 +2,12 @@
 <file path=ppt/presentation.xml><?xml version="1.0" encoding="utf-8"?>
 <p:presentation xmlns:a="http://schemas.openxmlformats.org/drawingml/2006/main" xmlns:r="http://schemas.openxmlformats.org/officeDocument/2006/relationships" xmlns:p="http://schemas.openxmlformats.org/presentationml/2006/main" saveSubsetFonts="1">
   <p:sldMasterIdLst>
-    <p:sldMasterId id="2147483720" r:id="rId1"/>
+    <p:sldMasterId id="2147483756" r:id="rId1"/>
   </p:sldMasterIdLst>
   <p:sldIdLst>
     <p:sldId id="257" r:id="rId2"/>
   </p:sldIdLst>
-  <p:sldSz cx="6588125" cy="3887788"/>
+  <p:sldSz cx="6372225" cy="9629775"/>
   <p:notesSz cx="6858000" cy="9144000"/>
   <p:defaultTextStyle>
     <a:defPPr>
@@ -115,7 +115,7 @@
 <file path=ppt/revisionInfo.xml><?xml version="1.0" encoding="utf-8"?>
 <p1510:revInfo xmlns:a="http://schemas.openxmlformats.org/drawingml/2006/main" xmlns:r="http://schemas.openxmlformats.org/officeDocument/2006/relationships" xmlns:p1510="http://schemas.microsoft.com/office/powerpoint/2015/10/main">
   <p1510:revLst>
-    <p1510:client id="{8A0A920E-B6E7-4924-87BF-0D5A6B2D1958}" v="23" dt="2023-12-21T14:00:04.863"/>
+    <p1510:client id="{169AF0B0-C29F-49D0-B18A-29148960D042}" v="22" dt="2024-10-15T13:59:47.943"/>
   </p1510:revLst>
 </p1510:revInfo>
 </file>
@@ -123,490 +123,986 @@
 <file path=ppt/changesInfos/changesInfo1.xml><?xml version="1.0" encoding="utf-8"?>
 <pc:chgInfo xmlns:a="http://schemas.openxmlformats.org/drawingml/2006/main" xmlns:r="http://schemas.openxmlformats.org/officeDocument/2006/relationships" xmlns:ac="http://schemas.microsoft.com/office/drawing/2013/main/command" xmlns:pc="http://schemas.microsoft.com/office/powerpoint/2013/main/command">
   <pc:docChgLst>
-    <pc:chgData name="Fatima Pillosu" userId="a6295d4dc9e22643" providerId="LiveId" clId="{0756FD03-1706-4472-A4C9-E6951E3B5C4C}"/>
-    <pc:docChg chg="custSel modSld">
-      <pc:chgData name="Fatima Pillosu" userId="a6295d4dc9e22643" providerId="LiveId" clId="{0756FD03-1706-4472-A4C9-E6951E3B5C4C}" dt="2023-11-29T09:38:00.207" v="52" actId="1036"/>
+    <pc:chgData name="Fatima Pillosu" userId="a6295d4dc9e22643" providerId="LiveId" clId="{169AF0B0-C29F-49D0-B18A-29148960D042}"/>
+    <pc:docChg chg="undo custSel modSld">
+      <pc:chgData name="Fatima Pillosu" userId="a6295d4dc9e22643" providerId="LiveId" clId="{169AF0B0-C29F-49D0-B18A-29148960D042}" dt="2024-10-15T13:59:47.943" v="567"/>
       <pc:docMkLst>
         <pc:docMk/>
       </pc:docMkLst>
       <pc:sldChg chg="addSp delSp modSp mod">
-        <pc:chgData name="Fatima Pillosu" userId="a6295d4dc9e22643" providerId="LiveId" clId="{0756FD03-1706-4472-A4C9-E6951E3B5C4C}" dt="2023-11-29T09:38:00.207" v="52" actId="1036"/>
+        <pc:chgData name="Fatima Pillosu" userId="a6295d4dc9e22643" providerId="LiveId" clId="{169AF0B0-C29F-49D0-B18A-29148960D042}" dt="2024-10-15T13:59:47.943" v="567"/>
         <pc:sldMkLst>
           <pc:docMk/>
-          <pc:sldMk cId="1072346714" sldId="256"/>
+          <pc:sldMk cId="3678187506" sldId="257"/>
         </pc:sldMkLst>
-        <pc:spChg chg="del mod">
-          <ac:chgData name="Fatima Pillosu" userId="a6295d4dc9e22643" providerId="LiveId" clId="{0756FD03-1706-4472-A4C9-E6951E3B5C4C}" dt="2023-11-29T09:37:33.019" v="49" actId="21"/>
-          <ac:spMkLst>
-            <pc:docMk/>
-            <pc:sldMk cId="1072346714" sldId="256"/>
-            <ac:spMk id="26" creationId="{4D6BD6C7-6D5D-3367-95B6-7A5399D42A36}"/>
-          </ac:spMkLst>
-        </pc:spChg>
-        <pc:spChg chg="del mod">
-          <ac:chgData name="Fatima Pillosu" userId="a6295d4dc9e22643" providerId="LiveId" clId="{0756FD03-1706-4472-A4C9-E6951E3B5C4C}" dt="2023-11-29T09:37:33.019" v="49" actId="21"/>
-          <ac:spMkLst>
-            <pc:docMk/>
-            <pc:sldMk cId="1072346714" sldId="256"/>
-            <ac:spMk id="27" creationId="{33D724CA-F564-BB24-4C21-3B17DB159837}"/>
-          </ac:spMkLst>
-        </pc:spChg>
-        <pc:spChg chg="del mod">
-          <ac:chgData name="Fatima Pillosu" userId="a6295d4dc9e22643" providerId="LiveId" clId="{0756FD03-1706-4472-A4C9-E6951E3B5C4C}" dt="2023-11-29T09:37:33.019" v="49" actId="21"/>
-          <ac:spMkLst>
-            <pc:docMk/>
-            <pc:sldMk cId="1072346714" sldId="256"/>
-            <ac:spMk id="28" creationId="{FADEB154-1E14-E07E-AE86-1E1B57D9D799}"/>
-          </ac:spMkLst>
-        </pc:spChg>
-        <pc:spChg chg="del mod">
-          <ac:chgData name="Fatima Pillosu" userId="a6295d4dc9e22643" providerId="LiveId" clId="{0756FD03-1706-4472-A4C9-E6951E3B5C4C}" dt="2023-11-29T09:37:33.019" v="49" actId="21"/>
-          <ac:spMkLst>
-            <pc:docMk/>
-            <pc:sldMk cId="1072346714" sldId="256"/>
-            <ac:spMk id="29" creationId="{4D64AC32-9D89-42AB-CA47-4E37B5E9C371}"/>
-          </ac:spMkLst>
-        </pc:spChg>
-        <pc:spChg chg="del mod">
-          <ac:chgData name="Fatima Pillosu" userId="a6295d4dc9e22643" providerId="LiveId" clId="{0756FD03-1706-4472-A4C9-E6951E3B5C4C}" dt="2023-11-29T09:37:33.019" v="49" actId="21"/>
-          <ac:spMkLst>
-            <pc:docMk/>
-            <pc:sldMk cId="1072346714" sldId="256"/>
-            <ac:spMk id="30" creationId="{C0E4CF8B-2B7D-3A99-C2A0-B902715DC82D}"/>
-          </ac:spMkLst>
-        </pc:spChg>
-        <pc:spChg chg="del mod">
-          <ac:chgData name="Fatima Pillosu" userId="a6295d4dc9e22643" providerId="LiveId" clId="{0756FD03-1706-4472-A4C9-E6951E3B5C4C}" dt="2023-11-29T09:37:33.019" v="49" actId="21"/>
-          <ac:spMkLst>
-            <pc:docMk/>
-            <pc:sldMk cId="1072346714" sldId="256"/>
-            <ac:spMk id="34" creationId="{6A0CAB05-3A1A-545D-00E5-C520ADE2DE98}"/>
-          </ac:spMkLst>
-        </pc:spChg>
-        <pc:spChg chg="del mod">
-          <ac:chgData name="Fatima Pillosu" userId="a6295d4dc9e22643" providerId="LiveId" clId="{0756FD03-1706-4472-A4C9-E6951E3B5C4C}" dt="2023-11-29T09:37:33.019" v="49" actId="21"/>
-          <ac:spMkLst>
-            <pc:docMk/>
-            <pc:sldMk cId="1072346714" sldId="256"/>
-            <ac:spMk id="35" creationId="{DB0EAE5B-B91F-04EC-7FD5-6281E2FC4C6C}"/>
-          </ac:spMkLst>
-        </pc:spChg>
-        <pc:spChg chg="del mod">
-          <ac:chgData name="Fatima Pillosu" userId="a6295d4dc9e22643" providerId="LiveId" clId="{0756FD03-1706-4472-A4C9-E6951E3B5C4C}" dt="2023-11-29T09:37:33.019" v="49" actId="21"/>
-          <ac:spMkLst>
-            <pc:docMk/>
-            <pc:sldMk cId="1072346714" sldId="256"/>
-            <ac:spMk id="36" creationId="{5F68747B-853A-30C8-389E-AA4F4C616EC8}"/>
-          </ac:spMkLst>
-        </pc:spChg>
-        <pc:spChg chg="del mod">
-          <ac:chgData name="Fatima Pillosu" userId="a6295d4dc9e22643" providerId="LiveId" clId="{0756FD03-1706-4472-A4C9-E6951E3B5C4C}" dt="2023-11-29T09:37:33.019" v="49" actId="21"/>
-          <ac:spMkLst>
-            <pc:docMk/>
-            <pc:sldMk cId="1072346714" sldId="256"/>
-            <ac:spMk id="37" creationId="{C4FCC9A3-D86A-1A5F-B937-22E313A502C5}"/>
-          </ac:spMkLst>
-        </pc:spChg>
-        <pc:spChg chg="del mod">
-          <ac:chgData name="Fatima Pillosu" userId="a6295d4dc9e22643" providerId="LiveId" clId="{0756FD03-1706-4472-A4C9-E6951E3B5C4C}" dt="2023-11-29T09:37:33.019" v="49" actId="21"/>
-          <ac:spMkLst>
-            <pc:docMk/>
-            <pc:sldMk cId="1072346714" sldId="256"/>
-            <ac:spMk id="38" creationId="{1F0DCFE1-BA5A-8CF0-68A5-5AF9DF122315}"/>
-          </ac:spMkLst>
-        </pc:spChg>
-        <pc:spChg chg="del mod">
-          <ac:chgData name="Fatima Pillosu" userId="a6295d4dc9e22643" providerId="LiveId" clId="{0756FD03-1706-4472-A4C9-E6951E3B5C4C}" dt="2023-11-29T09:37:33.019" v="49" actId="21"/>
-          <ac:spMkLst>
-            <pc:docMk/>
-            <pc:sldMk cId="1072346714" sldId="256"/>
-            <ac:spMk id="39" creationId="{2E377314-5496-12AD-8BDF-90A42DD8E8F4}"/>
-          </ac:spMkLst>
-        </pc:spChg>
-        <pc:spChg chg="del mod">
-          <ac:chgData name="Fatima Pillosu" userId="a6295d4dc9e22643" providerId="LiveId" clId="{0756FD03-1706-4472-A4C9-E6951E3B5C4C}" dt="2023-11-29T09:37:33.019" v="49" actId="21"/>
-          <ac:spMkLst>
-            <pc:docMk/>
-            <pc:sldMk cId="1072346714" sldId="256"/>
-            <ac:spMk id="40" creationId="{B2A63B25-69CE-4281-940E-8AA360570CD0}"/>
-          </ac:spMkLst>
-        </pc:spChg>
-        <pc:spChg chg="del mod">
-          <ac:chgData name="Fatima Pillosu" userId="a6295d4dc9e22643" providerId="LiveId" clId="{0756FD03-1706-4472-A4C9-E6951E3B5C4C}" dt="2023-11-29T09:37:33.019" v="49" actId="21"/>
-          <ac:spMkLst>
-            <pc:docMk/>
-            <pc:sldMk cId="1072346714" sldId="256"/>
-            <ac:spMk id="41" creationId="{B7E954CF-847A-5202-4A7E-21E743CEE0EC}"/>
-          </ac:spMkLst>
-        </pc:spChg>
-        <pc:spChg chg="del mod">
-          <ac:chgData name="Fatima Pillosu" userId="a6295d4dc9e22643" providerId="LiveId" clId="{0756FD03-1706-4472-A4C9-E6951E3B5C4C}" dt="2023-11-29T09:37:33.019" v="49" actId="21"/>
-          <ac:spMkLst>
-            <pc:docMk/>
-            <pc:sldMk cId="1072346714" sldId="256"/>
-            <ac:spMk id="42" creationId="{A466677D-E070-FE73-93B9-CD8A8623DA35}"/>
-          </ac:spMkLst>
-        </pc:spChg>
-        <pc:spChg chg="del mod">
-          <ac:chgData name="Fatima Pillosu" userId="a6295d4dc9e22643" providerId="LiveId" clId="{0756FD03-1706-4472-A4C9-E6951E3B5C4C}" dt="2023-11-29T09:37:33.019" v="49" actId="21"/>
-          <ac:spMkLst>
-            <pc:docMk/>
-            <pc:sldMk cId="1072346714" sldId="256"/>
-            <ac:spMk id="43" creationId="{7743BAD9-1439-F899-912D-2D4812D5D5C8}"/>
-          </ac:spMkLst>
-        </pc:spChg>
-        <pc:spChg chg="del mod">
-          <ac:chgData name="Fatima Pillosu" userId="a6295d4dc9e22643" providerId="LiveId" clId="{0756FD03-1706-4472-A4C9-E6951E3B5C4C}" dt="2023-11-29T09:37:33.019" v="49" actId="21"/>
-          <ac:spMkLst>
-            <pc:docMk/>
-            <pc:sldMk cId="1072346714" sldId="256"/>
-            <ac:spMk id="44" creationId="{810A7679-63A0-270B-D9A3-1587B7A0592D}"/>
-          </ac:spMkLst>
-        </pc:spChg>
-        <pc:spChg chg="del mod">
-          <ac:chgData name="Fatima Pillosu" userId="a6295d4dc9e22643" providerId="LiveId" clId="{0756FD03-1706-4472-A4C9-E6951E3B5C4C}" dt="2023-11-29T09:37:33.019" v="49" actId="21"/>
-          <ac:spMkLst>
-            <pc:docMk/>
-            <pc:sldMk cId="1072346714" sldId="256"/>
-            <ac:spMk id="45" creationId="{BAE5F748-D858-F541-E783-B26433165740}"/>
-          </ac:spMkLst>
-        </pc:spChg>
-        <pc:spChg chg="del mod">
-          <ac:chgData name="Fatima Pillosu" userId="a6295d4dc9e22643" providerId="LiveId" clId="{0756FD03-1706-4472-A4C9-E6951E3B5C4C}" dt="2023-11-29T09:37:33.019" v="49" actId="21"/>
-          <ac:spMkLst>
-            <pc:docMk/>
-            <pc:sldMk cId="1072346714" sldId="256"/>
-            <ac:spMk id="46" creationId="{18FED8DD-8957-CF93-A4D5-2B74A0368F2E}"/>
-          </ac:spMkLst>
-        </pc:spChg>
-        <pc:spChg chg="del mod">
-          <ac:chgData name="Fatima Pillosu" userId="a6295d4dc9e22643" providerId="LiveId" clId="{0756FD03-1706-4472-A4C9-E6951E3B5C4C}" dt="2023-11-29T09:37:33.019" v="49" actId="21"/>
-          <ac:spMkLst>
-            <pc:docMk/>
-            <pc:sldMk cId="1072346714" sldId="256"/>
-            <ac:spMk id="47" creationId="{334882D8-1A9D-CC8A-06CF-488A793CF256}"/>
-          </ac:spMkLst>
-        </pc:spChg>
-        <pc:spChg chg="del mod">
-          <ac:chgData name="Fatima Pillosu" userId="a6295d4dc9e22643" providerId="LiveId" clId="{0756FD03-1706-4472-A4C9-E6951E3B5C4C}" dt="2023-11-29T09:37:33.019" v="49" actId="21"/>
-          <ac:spMkLst>
-            <pc:docMk/>
-            <pc:sldMk cId="1072346714" sldId="256"/>
-            <ac:spMk id="48" creationId="{F6A8E961-9243-0767-D3AA-AB18C84ADE56}"/>
-          </ac:spMkLst>
-        </pc:spChg>
-        <pc:spChg chg="del mod">
-          <ac:chgData name="Fatima Pillosu" userId="a6295d4dc9e22643" providerId="LiveId" clId="{0756FD03-1706-4472-A4C9-E6951E3B5C4C}" dt="2023-11-29T09:37:33.019" v="49" actId="21"/>
-          <ac:spMkLst>
-            <pc:docMk/>
-            <pc:sldMk cId="1072346714" sldId="256"/>
-            <ac:spMk id="49" creationId="{C4F5BF5B-44D1-F769-4A52-FEEA32A1D3C7}"/>
-          </ac:spMkLst>
-        </pc:spChg>
-        <pc:spChg chg="del mod">
-          <ac:chgData name="Fatima Pillosu" userId="a6295d4dc9e22643" providerId="LiveId" clId="{0756FD03-1706-4472-A4C9-E6951E3B5C4C}" dt="2023-11-29T09:37:33.019" v="49" actId="21"/>
-          <ac:spMkLst>
-            <pc:docMk/>
-            <pc:sldMk cId="1072346714" sldId="256"/>
-            <ac:spMk id="50" creationId="{766938A5-4E33-9EEA-7BC6-2645316AC3A4}"/>
-          </ac:spMkLst>
-        </pc:spChg>
-        <pc:spChg chg="del mod">
-          <ac:chgData name="Fatima Pillosu" userId="a6295d4dc9e22643" providerId="LiveId" clId="{0756FD03-1706-4472-A4C9-E6951E3B5C4C}" dt="2023-11-29T09:37:33.019" v="49" actId="21"/>
-          <ac:spMkLst>
-            <pc:docMk/>
-            <pc:sldMk cId="1072346714" sldId="256"/>
-            <ac:spMk id="51" creationId="{676F60C1-93DC-03F5-E632-0CE4750575A4}"/>
+        <pc:spChg chg="add del mod">
+          <ac:chgData name="Fatima Pillosu" userId="a6295d4dc9e22643" providerId="LiveId" clId="{169AF0B0-C29F-49D0-B18A-29148960D042}" dt="2024-10-15T13:59:14.817" v="564" actId="21"/>
+          <ac:spMkLst>
+            <pc:docMk/>
+            <pc:sldMk cId="3678187506" sldId="257"/>
+            <ac:spMk id="5" creationId="{76152E3D-3F02-0B1C-AA13-6F4BAB5BB0AF}"/>
+          </ac:spMkLst>
+        </pc:spChg>
+        <pc:spChg chg="add del mod">
+          <ac:chgData name="Fatima Pillosu" userId="a6295d4dc9e22643" providerId="LiveId" clId="{169AF0B0-C29F-49D0-B18A-29148960D042}" dt="2024-10-15T13:59:14.817" v="564" actId="21"/>
+          <ac:spMkLst>
+            <pc:docMk/>
+            <pc:sldMk cId="3678187506" sldId="257"/>
+            <ac:spMk id="7" creationId="{966D71FF-DE5A-3195-D4B3-EDC7395E6A95}"/>
+          </ac:spMkLst>
+        </pc:spChg>
+        <pc:spChg chg="add del mod">
+          <ac:chgData name="Fatima Pillosu" userId="a6295d4dc9e22643" providerId="LiveId" clId="{169AF0B0-C29F-49D0-B18A-29148960D042}" dt="2024-10-15T13:59:14.817" v="564" actId="21"/>
+          <ac:spMkLst>
+            <pc:docMk/>
+            <pc:sldMk cId="3678187506" sldId="257"/>
+            <ac:spMk id="8" creationId="{7F65EB5E-8C99-2898-308D-4B7B6240EE93}"/>
+          </ac:spMkLst>
+        </pc:spChg>
+        <pc:spChg chg="add del mod">
+          <ac:chgData name="Fatima Pillosu" userId="a6295d4dc9e22643" providerId="LiveId" clId="{169AF0B0-C29F-49D0-B18A-29148960D042}" dt="2024-10-15T13:59:14.817" v="564" actId="21"/>
+          <ac:spMkLst>
+            <pc:docMk/>
+            <pc:sldMk cId="3678187506" sldId="257"/>
+            <ac:spMk id="9" creationId="{A2EB6F06-395D-9318-4EA7-3D2A87F7A7F8}"/>
+          </ac:spMkLst>
+        </pc:spChg>
+        <pc:spChg chg="del">
+          <ac:chgData name="Fatima Pillosu" userId="a6295d4dc9e22643" providerId="LiveId" clId="{169AF0B0-C29F-49D0-B18A-29148960D042}" dt="2024-10-15T08:53:50.736" v="0" actId="21"/>
+          <ac:spMkLst>
+            <pc:docMk/>
+            <pc:sldMk cId="3678187506" sldId="257"/>
+            <ac:spMk id="10" creationId="{4FE095D0-F330-6D0B-8D62-E81D7A85EDDC}"/>
+          </ac:spMkLst>
+        </pc:spChg>
+        <pc:spChg chg="add del mod">
+          <ac:chgData name="Fatima Pillosu" userId="a6295d4dc9e22643" providerId="LiveId" clId="{169AF0B0-C29F-49D0-B18A-29148960D042}" dt="2024-10-15T13:59:14.817" v="564" actId="21"/>
+          <ac:spMkLst>
+            <pc:docMk/>
+            <pc:sldMk cId="3678187506" sldId="257"/>
+            <ac:spMk id="10" creationId="{6325FE5D-06ED-04EF-69C0-BD0EBDC8BD88}"/>
+          </ac:spMkLst>
+        </pc:spChg>
+        <pc:spChg chg="add del mod">
+          <ac:chgData name="Fatima Pillosu" userId="a6295d4dc9e22643" providerId="LiveId" clId="{169AF0B0-C29F-49D0-B18A-29148960D042}" dt="2024-10-15T13:59:14.817" v="564" actId="21"/>
+          <ac:spMkLst>
+            <pc:docMk/>
+            <pc:sldMk cId="3678187506" sldId="257"/>
+            <ac:spMk id="11" creationId="{6835EBA5-C264-52F1-869D-3FD37CDE780F}"/>
+          </ac:spMkLst>
+        </pc:spChg>
+        <pc:spChg chg="add del mod">
+          <ac:chgData name="Fatima Pillosu" userId="a6295d4dc9e22643" providerId="LiveId" clId="{169AF0B0-C29F-49D0-B18A-29148960D042}" dt="2024-10-15T13:59:14.817" v="564" actId="21"/>
+          <ac:spMkLst>
+            <pc:docMk/>
+            <pc:sldMk cId="3678187506" sldId="257"/>
+            <ac:spMk id="12" creationId="{62D88A45-D06C-5F31-091D-286DBD29E7C0}"/>
+          </ac:spMkLst>
+        </pc:spChg>
+        <pc:spChg chg="add del mod">
+          <ac:chgData name="Fatima Pillosu" userId="a6295d4dc9e22643" providerId="LiveId" clId="{169AF0B0-C29F-49D0-B18A-29148960D042}" dt="2024-10-15T13:59:14.817" v="564" actId="21"/>
+          <ac:spMkLst>
+            <pc:docMk/>
+            <pc:sldMk cId="3678187506" sldId="257"/>
+            <ac:spMk id="13" creationId="{75935094-04FA-6918-ACA5-B36AC7E6F57D}"/>
+          </ac:spMkLst>
+        </pc:spChg>
+        <pc:spChg chg="del">
+          <ac:chgData name="Fatima Pillosu" userId="a6295d4dc9e22643" providerId="LiveId" clId="{169AF0B0-C29F-49D0-B18A-29148960D042}" dt="2024-10-15T08:53:50.736" v="0" actId="21"/>
+          <ac:spMkLst>
+            <pc:docMk/>
+            <pc:sldMk cId="3678187506" sldId="257"/>
+            <ac:spMk id="14" creationId="{4F79B5CA-9846-C2A1-7E4D-ABD91AE0233C}"/>
+          </ac:spMkLst>
+        </pc:spChg>
+        <pc:spChg chg="add del mod">
+          <ac:chgData name="Fatima Pillosu" userId="a6295d4dc9e22643" providerId="LiveId" clId="{169AF0B0-C29F-49D0-B18A-29148960D042}" dt="2024-10-15T13:59:14.817" v="564" actId="21"/>
+          <ac:spMkLst>
+            <pc:docMk/>
+            <pc:sldMk cId="3678187506" sldId="257"/>
+            <ac:spMk id="14" creationId="{9E57529D-A32C-E6A8-C317-F2B525741717}"/>
+          </ac:spMkLst>
+        </pc:spChg>
+        <pc:spChg chg="add del mod">
+          <ac:chgData name="Fatima Pillosu" userId="a6295d4dc9e22643" providerId="LiveId" clId="{169AF0B0-C29F-49D0-B18A-29148960D042}" dt="2024-10-15T13:59:14.817" v="564" actId="21"/>
+          <ac:spMkLst>
+            <pc:docMk/>
+            <pc:sldMk cId="3678187506" sldId="257"/>
+            <ac:spMk id="15" creationId="{C39289CC-107A-6BD7-94AC-9B2E82E9DD2E}"/>
+          </ac:spMkLst>
+        </pc:spChg>
+        <pc:spChg chg="del">
+          <ac:chgData name="Fatima Pillosu" userId="a6295d4dc9e22643" providerId="LiveId" clId="{169AF0B0-C29F-49D0-B18A-29148960D042}" dt="2024-10-15T08:53:50.736" v="0" actId="21"/>
+          <ac:spMkLst>
+            <pc:docMk/>
+            <pc:sldMk cId="3678187506" sldId="257"/>
+            <ac:spMk id="15" creationId="{C48DEC25-43DE-3CB2-AF8A-3C2A97F8F4D1}"/>
+          </ac:spMkLst>
+        </pc:spChg>
+        <pc:spChg chg="del">
+          <ac:chgData name="Fatima Pillosu" userId="a6295d4dc9e22643" providerId="LiveId" clId="{169AF0B0-C29F-49D0-B18A-29148960D042}" dt="2024-10-15T08:53:50.736" v="0" actId="21"/>
+          <ac:spMkLst>
+            <pc:docMk/>
+            <pc:sldMk cId="3678187506" sldId="257"/>
+            <ac:spMk id="16" creationId="{7A140EFE-E9C2-3A10-FD69-64FE12C4CE44}"/>
+          </ac:spMkLst>
+        </pc:spChg>
+        <pc:spChg chg="add del mod">
+          <ac:chgData name="Fatima Pillosu" userId="a6295d4dc9e22643" providerId="LiveId" clId="{169AF0B0-C29F-49D0-B18A-29148960D042}" dt="2024-10-15T13:59:14.817" v="564" actId="21"/>
+          <ac:spMkLst>
+            <pc:docMk/>
+            <pc:sldMk cId="3678187506" sldId="257"/>
+            <ac:spMk id="16" creationId="{FF26949D-6692-5742-5359-EF2280524EB6}"/>
+          </ac:spMkLst>
+        </pc:spChg>
+        <pc:spChg chg="add del mod">
+          <ac:chgData name="Fatima Pillosu" userId="a6295d4dc9e22643" providerId="LiveId" clId="{169AF0B0-C29F-49D0-B18A-29148960D042}" dt="2024-10-15T13:59:14.817" v="564" actId="21"/>
+          <ac:spMkLst>
+            <pc:docMk/>
+            <pc:sldMk cId="3678187506" sldId="257"/>
+            <ac:spMk id="17" creationId="{47674D0E-8DEC-D619-FD5C-6291A6CB1F74}"/>
+          </ac:spMkLst>
+        </pc:spChg>
+        <pc:spChg chg="del">
+          <ac:chgData name="Fatima Pillosu" userId="a6295d4dc9e22643" providerId="LiveId" clId="{169AF0B0-C29F-49D0-B18A-29148960D042}" dt="2024-10-15T08:53:50.736" v="0" actId="21"/>
+          <ac:spMkLst>
+            <pc:docMk/>
+            <pc:sldMk cId="3678187506" sldId="257"/>
+            <ac:spMk id="17" creationId="{D9B8CD13-EBE6-3643-4AFB-D0DACE221007}"/>
+          </ac:spMkLst>
+        </pc:spChg>
+        <pc:spChg chg="add del mod">
+          <ac:chgData name="Fatima Pillosu" userId="a6295d4dc9e22643" providerId="LiveId" clId="{169AF0B0-C29F-49D0-B18A-29148960D042}" dt="2024-10-15T13:59:14.817" v="564" actId="21"/>
+          <ac:spMkLst>
+            <pc:docMk/>
+            <pc:sldMk cId="3678187506" sldId="257"/>
+            <ac:spMk id="18" creationId="{65BFDB0F-0CA5-5859-DF80-49AB12F1C7A0}"/>
+          </ac:spMkLst>
+        </pc:spChg>
+        <pc:spChg chg="del">
+          <ac:chgData name="Fatima Pillosu" userId="a6295d4dc9e22643" providerId="LiveId" clId="{169AF0B0-C29F-49D0-B18A-29148960D042}" dt="2024-10-15T08:53:50.736" v="0" actId="21"/>
+          <ac:spMkLst>
+            <pc:docMk/>
+            <pc:sldMk cId="3678187506" sldId="257"/>
+            <ac:spMk id="18" creationId="{EB584B3D-ED06-B266-CA62-9934C712A3F8}"/>
+          </ac:spMkLst>
+        </pc:spChg>
+        <pc:spChg chg="del">
+          <ac:chgData name="Fatima Pillosu" userId="a6295d4dc9e22643" providerId="LiveId" clId="{169AF0B0-C29F-49D0-B18A-29148960D042}" dt="2024-10-15T08:53:50.736" v="0" actId="21"/>
+          <ac:spMkLst>
+            <pc:docMk/>
+            <pc:sldMk cId="3678187506" sldId="257"/>
+            <ac:spMk id="19" creationId="{7E3CEC12-94E9-EB0F-1D95-91E649E86A7F}"/>
+          </ac:spMkLst>
+        </pc:spChg>
+        <pc:spChg chg="add del mod">
+          <ac:chgData name="Fatima Pillosu" userId="a6295d4dc9e22643" providerId="LiveId" clId="{169AF0B0-C29F-49D0-B18A-29148960D042}" dt="2024-10-15T13:59:14.817" v="564" actId="21"/>
+          <ac:spMkLst>
+            <pc:docMk/>
+            <pc:sldMk cId="3678187506" sldId="257"/>
+            <ac:spMk id="19" creationId="{B3053355-9D65-6A39-B80E-FE5297F3F1D7}"/>
+          </ac:spMkLst>
+        </pc:spChg>
+        <pc:spChg chg="del">
+          <ac:chgData name="Fatima Pillosu" userId="a6295d4dc9e22643" providerId="LiveId" clId="{169AF0B0-C29F-49D0-B18A-29148960D042}" dt="2024-10-15T08:53:50.736" v="0" actId="21"/>
+          <ac:spMkLst>
+            <pc:docMk/>
+            <pc:sldMk cId="3678187506" sldId="257"/>
+            <ac:spMk id="20" creationId="{19FBFF87-0A12-838B-30AC-E0AE75911D4D}"/>
+          </ac:spMkLst>
+        </pc:spChg>
+        <pc:spChg chg="add del mod">
+          <ac:chgData name="Fatima Pillosu" userId="a6295d4dc9e22643" providerId="LiveId" clId="{169AF0B0-C29F-49D0-B18A-29148960D042}" dt="2024-10-15T13:59:14.817" v="564" actId="21"/>
+          <ac:spMkLst>
+            <pc:docMk/>
+            <pc:sldMk cId="3678187506" sldId="257"/>
+            <ac:spMk id="20" creationId="{6585FA76-FE82-6B72-5C97-E976DBC6F5A2}"/>
+          </ac:spMkLst>
+        </pc:spChg>
+        <pc:spChg chg="del">
+          <ac:chgData name="Fatima Pillosu" userId="a6295d4dc9e22643" providerId="LiveId" clId="{169AF0B0-C29F-49D0-B18A-29148960D042}" dt="2024-10-15T08:53:50.736" v="0" actId="21"/>
+          <ac:spMkLst>
+            <pc:docMk/>
+            <pc:sldMk cId="3678187506" sldId="257"/>
+            <ac:spMk id="21" creationId="{24F131B5-43EF-80FE-3944-8BCAD68A7A72}"/>
+          </ac:spMkLst>
+        </pc:spChg>
+        <pc:spChg chg="add del mod">
+          <ac:chgData name="Fatima Pillosu" userId="a6295d4dc9e22643" providerId="LiveId" clId="{169AF0B0-C29F-49D0-B18A-29148960D042}" dt="2024-10-15T13:59:14.817" v="564" actId="21"/>
+          <ac:spMkLst>
+            <pc:docMk/>
+            <pc:sldMk cId="3678187506" sldId="257"/>
+            <ac:spMk id="21" creationId="{CA1C67A3-7D6D-0980-C65E-1A4EC6D02F65}"/>
+          </ac:spMkLst>
+        </pc:spChg>
+        <pc:spChg chg="add del mod">
+          <ac:chgData name="Fatima Pillosu" userId="a6295d4dc9e22643" providerId="LiveId" clId="{169AF0B0-C29F-49D0-B18A-29148960D042}" dt="2024-10-15T13:59:14.817" v="564" actId="21"/>
+          <ac:spMkLst>
+            <pc:docMk/>
+            <pc:sldMk cId="3678187506" sldId="257"/>
+            <ac:spMk id="25" creationId="{4FE095D0-F330-6D0B-8D62-E81D7A85EDDC}"/>
+          </ac:spMkLst>
+        </pc:spChg>
+        <pc:spChg chg="add del mod">
+          <ac:chgData name="Fatima Pillosu" userId="a6295d4dc9e22643" providerId="LiveId" clId="{169AF0B0-C29F-49D0-B18A-29148960D042}" dt="2024-10-15T13:50:27.640" v="347" actId="478"/>
+          <ac:spMkLst>
+            <pc:docMk/>
+            <pc:sldMk cId="3678187506" sldId="257"/>
+            <ac:spMk id="26" creationId="{4F79B5CA-9846-C2A1-7E4D-ABD91AE0233C}"/>
+          </ac:spMkLst>
+        </pc:spChg>
+        <pc:spChg chg="add del mod">
+          <ac:chgData name="Fatima Pillosu" userId="a6295d4dc9e22643" providerId="LiveId" clId="{169AF0B0-C29F-49D0-B18A-29148960D042}" dt="2024-10-15T13:50:27.640" v="347" actId="478"/>
+          <ac:spMkLst>
+            <pc:docMk/>
+            <pc:sldMk cId="3678187506" sldId="257"/>
+            <ac:spMk id="27" creationId="{C48DEC25-43DE-3CB2-AF8A-3C2A97F8F4D1}"/>
+          </ac:spMkLst>
+        </pc:spChg>
+        <pc:spChg chg="add del mod">
+          <ac:chgData name="Fatima Pillosu" userId="a6295d4dc9e22643" providerId="LiveId" clId="{169AF0B0-C29F-49D0-B18A-29148960D042}" dt="2024-10-15T13:50:27.640" v="347" actId="478"/>
+          <ac:spMkLst>
+            <pc:docMk/>
+            <pc:sldMk cId="3678187506" sldId="257"/>
+            <ac:spMk id="28" creationId="{7A140EFE-E9C2-3A10-FD69-64FE12C4CE44}"/>
+          </ac:spMkLst>
+        </pc:spChg>
+        <pc:spChg chg="add del mod">
+          <ac:chgData name="Fatima Pillosu" userId="a6295d4dc9e22643" providerId="LiveId" clId="{169AF0B0-C29F-49D0-B18A-29148960D042}" dt="2024-10-15T13:44:55.190" v="153" actId="478"/>
+          <ac:spMkLst>
+            <pc:docMk/>
+            <pc:sldMk cId="3678187506" sldId="257"/>
+            <ac:spMk id="29" creationId="{D9B8CD13-EBE6-3643-4AFB-D0DACE221007}"/>
+          </ac:spMkLst>
+        </pc:spChg>
+        <pc:spChg chg="add del mod">
+          <ac:chgData name="Fatima Pillosu" userId="a6295d4dc9e22643" providerId="LiveId" clId="{169AF0B0-C29F-49D0-B18A-29148960D042}" dt="2024-10-15T13:50:27.640" v="347" actId="478"/>
+          <ac:spMkLst>
+            <pc:docMk/>
+            <pc:sldMk cId="3678187506" sldId="257"/>
+            <ac:spMk id="30" creationId="{EB584B3D-ED06-B266-CA62-9934C712A3F8}"/>
+          </ac:spMkLst>
+        </pc:spChg>
+        <pc:spChg chg="add del mod">
+          <ac:chgData name="Fatima Pillosu" userId="a6295d4dc9e22643" providerId="LiveId" clId="{169AF0B0-C29F-49D0-B18A-29148960D042}" dt="2024-10-15T13:50:27.640" v="347" actId="478"/>
+          <ac:spMkLst>
+            <pc:docMk/>
+            <pc:sldMk cId="3678187506" sldId="257"/>
+            <ac:spMk id="31" creationId="{7E3CEC12-94E9-EB0F-1D95-91E649E86A7F}"/>
+          </ac:spMkLst>
+        </pc:spChg>
+        <pc:spChg chg="add del mod">
+          <ac:chgData name="Fatima Pillosu" userId="a6295d4dc9e22643" providerId="LiveId" clId="{169AF0B0-C29F-49D0-B18A-29148960D042}" dt="2024-10-15T13:50:27.640" v="347" actId="478"/>
+          <ac:spMkLst>
+            <pc:docMk/>
+            <pc:sldMk cId="3678187506" sldId="257"/>
+            <ac:spMk id="32" creationId="{19FBFF87-0A12-838B-30AC-E0AE75911D4D}"/>
+          </ac:spMkLst>
+        </pc:spChg>
+        <pc:spChg chg="add del mod">
+          <ac:chgData name="Fatima Pillosu" userId="a6295d4dc9e22643" providerId="LiveId" clId="{169AF0B0-C29F-49D0-B18A-29148960D042}" dt="2024-10-15T13:44:55.190" v="153" actId="478"/>
+          <ac:spMkLst>
+            <pc:docMk/>
+            <pc:sldMk cId="3678187506" sldId="257"/>
+            <ac:spMk id="33" creationId="{24F131B5-43EF-80FE-3944-8BCAD68A7A72}"/>
+          </ac:spMkLst>
+        </pc:spChg>
+        <pc:spChg chg="add del mod">
+          <ac:chgData name="Fatima Pillosu" userId="a6295d4dc9e22643" providerId="LiveId" clId="{169AF0B0-C29F-49D0-B18A-29148960D042}" dt="2024-10-15T13:59:14.817" v="564" actId="21"/>
+          <ac:spMkLst>
+            <pc:docMk/>
+            <pc:sldMk cId="3678187506" sldId="257"/>
+            <ac:spMk id="34" creationId="{971E2717-DEED-4972-6287-82BB16781D3B}"/>
+          </ac:spMkLst>
+        </pc:spChg>
+        <pc:spChg chg="add del mod">
+          <ac:chgData name="Fatima Pillosu" userId="a6295d4dc9e22643" providerId="LiveId" clId="{169AF0B0-C29F-49D0-B18A-29148960D042}" dt="2024-10-15T13:59:14.817" v="564" actId="21"/>
+          <ac:spMkLst>
+            <pc:docMk/>
+            <pc:sldMk cId="3678187506" sldId="257"/>
+            <ac:spMk id="35" creationId="{7C89C3A8-5EAA-0C7C-D9E4-1E4B3909EBC8}"/>
+          </ac:spMkLst>
+        </pc:spChg>
+        <pc:spChg chg="add del mod">
+          <ac:chgData name="Fatima Pillosu" userId="a6295d4dc9e22643" providerId="LiveId" clId="{169AF0B0-C29F-49D0-B18A-29148960D042}" dt="2024-10-15T13:59:14.817" v="564" actId="21"/>
+          <ac:spMkLst>
+            <pc:docMk/>
+            <pc:sldMk cId="3678187506" sldId="257"/>
+            <ac:spMk id="36" creationId="{7BF49BFA-FCE5-37B6-3322-30032CA035EA}"/>
+          </ac:spMkLst>
+        </pc:spChg>
+        <pc:spChg chg="add del mod">
+          <ac:chgData name="Fatima Pillosu" userId="a6295d4dc9e22643" providerId="LiveId" clId="{169AF0B0-C29F-49D0-B18A-29148960D042}" dt="2024-10-15T13:59:14.817" v="564" actId="21"/>
+          <ac:spMkLst>
+            <pc:docMk/>
+            <pc:sldMk cId="3678187506" sldId="257"/>
+            <ac:spMk id="37" creationId="{3810E10D-233E-192F-E764-BC5AEBD140CA}"/>
+          </ac:spMkLst>
+        </pc:spChg>
+        <pc:spChg chg="add del mod">
+          <ac:chgData name="Fatima Pillosu" userId="a6295d4dc9e22643" providerId="LiveId" clId="{169AF0B0-C29F-49D0-B18A-29148960D042}" dt="2024-10-15T13:59:14.817" v="564" actId="21"/>
+          <ac:spMkLst>
+            <pc:docMk/>
+            <pc:sldMk cId="3678187506" sldId="257"/>
+            <ac:spMk id="38" creationId="{87E8E644-5256-6F3C-07ED-5C55FE638F1C}"/>
+          </ac:spMkLst>
+        </pc:spChg>
+        <pc:spChg chg="add del mod">
+          <ac:chgData name="Fatima Pillosu" userId="a6295d4dc9e22643" providerId="LiveId" clId="{169AF0B0-C29F-49D0-B18A-29148960D042}" dt="2024-10-15T13:59:14.817" v="564" actId="21"/>
+          <ac:spMkLst>
+            <pc:docMk/>
+            <pc:sldMk cId="3678187506" sldId="257"/>
+            <ac:spMk id="39" creationId="{09487492-2BFD-7E60-8F1E-4990C80286FF}"/>
+          </ac:spMkLst>
+        </pc:spChg>
+        <pc:spChg chg="add del mod">
+          <ac:chgData name="Fatima Pillosu" userId="a6295d4dc9e22643" providerId="LiveId" clId="{169AF0B0-C29F-49D0-B18A-29148960D042}" dt="2024-10-15T13:59:14.817" v="564" actId="21"/>
+          <ac:spMkLst>
+            <pc:docMk/>
+            <pc:sldMk cId="3678187506" sldId="257"/>
+            <ac:spMk id="40" creationId="{A34808D0-85BC-49FD-DE30-3E36BC1F3EB7}"/>
+          </ac:spMkLst>
+        </pc:spChg>
+        <pc:spChg chg="add del mod">
+          <ac:chgData name="Fatima Pillosu" userId="a6295d4dc9e22643" providerId="LiveId" clId="{169AF0B0-C29F-49D0-B18A-29148960D042}" dt="2024-10-15T13:59:14.817" v="564" actId="21"/>
+          <ac:spMkLst>
+            <pc:docMk/>
+            <pc:sldMk cId="3678187506" sldId="257"/>
+            <ac:spMk id="41" creationId="{CCAF333D-D62A-6E5A-9E5C-A77D4E489CC7}"/>
+          </ac:spMkLst>
+        </pc:spChg>
+        <pc:spChg chg="add del mod">
+          <ac:chgData name="Fatima Pillosu" userId="a6295d4dc9e22643" providerId="LiveId" clId="{169AF0B0-C29F-49D0-B18A-29148960D042}" dt="2024-10-15T13:59:14.817" v="564" actId="21"/>
+          <ac:spMkLst>
+            <pc:docMk/>
+            <pc:sldMk cId="3678187506" sldId="257"/>
+            <ac:spMk id="42" creationId="{E801BCDD-D7EC-8708-6E95-AEB9AD3D0562}"/>
+          </ac:spMkLst>
+        </pc:spChg>
+        <pc:spChg chg="add del mod">
+          <ac:chgData name="Fatima Pillosu" userId="a6295d4dc9e22643" providerId="LiveId" clId="{169AF0B0-C29F-49D0-B18A-29148960D042}" dt="2024-10-15T13:59:14.817" v="564" actId="21"/>
+          <ac:spMkLst>
+            <pc:docMk/>
+            <pc:sldMk cId="3678187506" sldId="257"/>
+            <ac:spMk id="43" creationId="{3D6B6A65-7136-1666-0656-0F83A85E5896}"/>
           </ac:spMkLst>
         </pc:spChg>
         <pc:spChg chg="add del">
-          <ac:chgData name="Fatima Pillosu" userId="a6295d4dc9e22643" providerId="LiveId" clId="{0756FD03-1706-4472-A4C9-E6951E3B5C4C}" dt="2023-11-29T09:37:20.464" v="48" actId="478"/>
-          <ac:spMkLst>
-            <pc:docMk/>
-            <pc:sldMk cId="1072346714" sldId="256"/>
-            <ac:spMk id="52" creationId="{68B7249F-6B7F-8463-BFAB-6DF1A571F792}"/>
+          <ac:chgData name="Fatima Pillosu" userId="a6295d4dc9e22643" providerId="LiveId" clId="{169AF0B0-C29F-49D0-B18A-29148960D042}" dt="2024-10-15T13:59:12.871" v="563" actId="478"/>
+          <ac:spMkLst>
+            <pc:docMk/>
+            <pc:sldMk cId="3678187506" sldId="257"/>
+            <ac:spMk id="44" creationId="{6E73B067-9857-9AFB-2861-A1CCD82632FC}"/>
+          </ac:spMkLst>
+        </pc:spChg>
+        <pc:spChg chg="add del mod">
+          <ac:chgData name="Fatima Pillosu" userId="a6295d4dc9e22643" providerId="LiveId" clId="{169AF0B0-C29F-49D0-B18A-29148960D042}" dt="2024-10-15T13:59:37.298" v="566" actId="21"/>
+          <ac:spMkLst>
+            <pc:docMk/>
+            <pc:sldMk cId="3678187506" sldId="257"/>
+            <ac:spMk id="49" creationId="{4FE095D0-F330-6D0B-8D62-E81D7A85EDDC}"/>
+          </ac:spMkLst>
+        </pc:spChg>
+        <pc:spChg chg="add del mod">
+          <ac:chgData name="Fatima Pillosu" userId="a6295d4dc9e22643" providerId="LiveId" clId="{169AF0B0-C29F-49D0-B18A-29148960D042}" dt="2024-10-15T13:59:37.298" v="566" actId="21"/>
+          <ac:spMkLst>
+            <pc:docMk/>
+            <pc:sldMk cId="3678187506" sldId="257"/>
+            <ac:spMk id="50" creationId="{76152E3D-3F02-0B1C-AA13-6F4BAB5BB0AF}"/>
+          </ac:spMkLst>
+        </pc:spChg>
+        <pc:spChg chg="add del mod">
+          <ac:chgData name="Fatima Pillosu" userId="a6295d4dc9e22643" providerId="LiveId" clId="{169AF0B0-C29F-49D0-B18A-29148960D042}" dt="2024-10-15T13:59:37.298" v="566" actId="21"/>
+          <ac:spMkLst>
+            <pc:docMk/>
+            <pc:sldMk cId="3678187506" sldId="257"/>
+            <ac:spMk id="51" creationId="{966D71FF-DE5A-3195-D4B3-EDC7395E6A95}"/>
+          </ac:spMkLst>
+        </pc:spChg>
+        <pc:spChg chg="add del mod">
+          <ac:chgData name="Fatima Pillosu" userId="a6295d4dc9e22643" providerId="LiveId" clId="{169AF0B0-C29F-49D0-B18A-29148960D042}" dt="2024-10-15T13:59:37.298" v="566" actId="21"/>
+          <ac:spMkLst>
+            <pc:docMk/>
+            <pc:sldMk cId="3678187506" sldId="257"/>
+            <ac:spMk id="52" creationId="{7F65EB5E-8C99-2898-308D-4B7B6240EE93}"/>
+          </ac:spMkLst>
+        </pc:spChg>
+        <pc:spChg chg="add del mod">
+          <ac:chgData name="Fatima Pillosu" userId="a6295d4dc9e22643" providerId="LiveId" clId="{169AF0B0-C29F-49D0-B18A-29148960D042}" dt="2024-10-15T13:59:37.298" v="566" actId="21"/>
+          <ac:spMkLst>
+            <pc:docMk/>
+            <pc:sldMk cId="3678187506" sldId="257"/>
+            <ac:spMk id="53" creationId="{A2EB6F06-395D-9318-4EA7-3D2A87F7A7F8}"/>
+          </ac:spMkLst>
+        </pc:spChg>
+        <pc:spChg chg="add del mod">
+          <ac:chgData name="Fatima Pillosu" userId="a6295d4dc9e22643" providerId="LiveId" clId="{169AF0B0-C29F-49D0-B18A-29148960D042}" dt="2024-10-15T13:59:37.298" v="566" actId="21"/>
+          <ac:spMkLst>
+            <pc:docMk/>
+            <pc:sldMk cId="3678187506" sldId="257"/>
+            <ac:spMk id="54" creationId="{6325FE5D-06ED-04EF-69C0-BD0EBDC8BD88}"/>
+          </ac:spMkLst>
+        </pc:spChg>
+        <pc:spChg chg="add del mod">
+          <ac:chgData name="Fatima Pillosu" userId="a6295d4dc9e22643" providerId="LiveId" clId="{169AF0B0-C29F-49D0-B18A-29148960D042}" dt="2024-10-15T13:59:37.298" v="566" actId="21"/>
+          <ac:spMkLst>
+            <pc:docMk/>
+            <pc:sldMk cId="3678187506" sldId="257"/>
+            <ac:spMk id="55" creationId="{6835EBA5-C264-52F1-869D-3FD37CDE780F}"/>
+          </ac:spMkLst>
+        </pc:spChg>
+        <pc:spChg chg="add del mod">
+          <ac:chgData name="Fatima Pillosu" userId="a6295d4dc9e22643" providerId="LiveId" clId="{169AF0B0-C29F-49D0-B18A-29148960D042}" dt="2024-10-15T13:59:37.298" v="566" actId="21"/>
+          <ac:spMkLst>
+            <pc:docMk/>
+            <pc:sldMk cId="3678187506" sldId="257"/>
+            <ac:spMk id="56" creationId="{62D88A45-D06C-5F31-091D-286DBD29E7C0}"/>
+          </ac:spMkLst>
+        </pc:spChg>
+        <pc:spChg chg="add del mod">
+          <ac:chgData name="Fatima Pillosu" userId="a6295d4dc9e22643" providerId="LiveId" clId="{169AF0B0-C29F-49D0-B18A-29148960D042}" dt="2024-10-15T13:59:37.298" v="566" actId="21"/>
+          <ac:spMkLst>
+            <pc:docMk/>
+            <pc:sldMk cId="3678187506" sldId="257"/>
+            <ac:spMk id="57" creationId="{75935094-04FA-6918-ACA5-B36AC7E6F57D}"/>
+          </ac:spMkLst>
+        </pc:spChg>
+        <pc:spChg chg="add del mod">
+          <ac:chgData name="Fatima Pillosu" userId="a6295d4dc9e22643" providerId="LiveId" clId="{169AF0B0-C29F-49D0-B18A-29148960D042}" dt="2024-10-15T13:59:37.298" v="566" actId="21"/>
+          <ac:spMkLst>
+            <pc:docMk/>
+            <pc:sldMk cId="3678187506" sldId="257"/>
+            <ac:spMk id="58" creationId="{9E57529D-A32C-E6A8-C317-F2B525741717}"/>
+          </ac:spMkLst>
+        </pc:spChg>
+        <pc:spChg chg="add del mod">
+          <ac:chgData name="Fatima Pillosu" userId="a6295d4dc9e22643" providerId="LiveId" clId="{169AF0B0-C29F-49D0-B18A-29148960D042}" dt="2024-10-15T13:59:37.298" v="566" actId="21"/>
+          <ac:spMkLst>
+            <pc:docMk/>
+            <pc:sldMk cId="3678187506" sldId="257"/>
+            <ac:spMk id="59" creationId="{C39289CC-107A-6BD7-94AC-9B2E82E9DD2E}"/>
+          </ac:spMkLst>
+        </pc:spChg>
+        <pc:spChg chg="add del mod">
+          <ac:chgData name="Fatima Pillosu" userId="a6295d4dc9e22643" providerId="LiveId" clId="{169AF0B0-C29F-49D0-B18A-29148960D042}" dt="2024-10-15T13:59:37.298" v="566" actId="21"/>
+          <ac:spMkLst>
+            <pc:docMk/>
+            <pc:sldMk cId="3678187506" sldId="257"/>
+            <ac:spMk id="60" creationId="{FF26949D-6692-5742-5359-EF2280524EB6}"/>
+          </ac:spMkLst>
+        </pc:spChg>
+        <pc:spChg chg="add del mod">
+          <ac:chgData name="Fatima Pillosu" userId="a6295d4dc9e22643" providerId="LiveId" clId="{169AF0B0-C29F-49D0-B18A-29148960D042}" dt="2024-10-15T13:59:37.298" v="566" actId="21"/>
+          <ac:spMkLst>
+            <pc:docMk/>
+            <pc:sldMk cId="3678187506" sldId="257"/>
+            <ac:spMk id="61" creationId="{47674D0E-8DEC-D619-FD5C-6291A6CB1F74}"/>
+          </ac:spMkLst>
+        </pc:spChg>
+        <pc:spChg chg="add del mod">
+          <ac:chgData name="Fatima Pillosu" userId="a6295d4dc9e22643" providerId="LiveId" clId="{169AF0B0-C29F-49D0-B18A-29148960D042}" dt="2024-10-15T13:59:37.298" v="566" actId="21"/>
+          <ac:spMkLst>
+            <pc:docMk/>
+            <pc:sldMk cId="3678187506" sldId="257"/>
+            <ac:spMk id="62" creationId="{65BFDB0F-0CA5-5859-DF80-49AB12F1C7A0}"/>
+          </ac:spMkLst>
+        </pc:spChg>
+        <pc:spChg chg="add del mod">
+          <ac:chgData name="Fatima Pillosu" userId="a6295d4dc9e22643" providerId="LiveId" clId="{169AF0B0-C29F-49D0-B18A-29148960D042}" dt="2024-10-15T13:59:37.298" v="566" actId="21"/>
+          <ac:spMkLst>
+            <pc:docMk/>
+            <pc:sldMk cId="3678187506" sldId="257"/>
+            <ac:spMk id="63" creationId="{B3053355-9D65-6A39-B80E-FE5297F3F1D7}"/>
+          </ac:spMkLst>
+        </pc:spChg>
+        <pc:spChg chg="add del mod">
+          <ac:chgData name="Fatima Pillosu" userId="a6295d4dc9e22643" providerId="LiveId" clId="{169AF0B0-C29F-49D0-B18A-29148960D042}" dt="2024-10-15T13:59:37.298" v="566" actId="21"/>
+          <ac:spMkLst>
+            <pc:docMk/>
+            <pc:sldMk cId="3678187506" sldId="257"/>
+            <ac:spMk id="64" creationId="{6585FA76-FE82-6B72-5C97-E976DBC6F5A2}"/>
+          </ac:spMkLst>
+        </pc:spChg>
+        <pc:spChg chg="add del mod">
+          <ac:chgData name="Fatima Pillosu" userId="a6295d4dc9e22643" providerId="LiveId" clId="{169AF0B0-C29F-49D0-B18A-29148960D042}" dt="2024-10-15T13:59:37.298" v="566" actId="21"/>
+          <ac:spMkLst>
+            <pc:docMk/>
+            <pc:sldMk cId="3678187506" sldId="257"/>
+            <ac:spMk id="65" creationId="{CA1C67A3-7D6D-0980-C65E-1A4EC6D02F65}"/>
+          </ac:spMkLst>
+        </pc:spChg>
+        <pc:spChg chg="add del mod">
+          <ac:chgData name="Fatima Pillosu" userId="a6295d4dc9e22643" providerId="LiveId" clId="{169AF0B0-C29F-49D0-B18A-29148960D042}" dt="2024-10-15T13:59:37.298" v="566" actId="21"/>
+          <ac:spMkLst>
+            <pc:docMk/>
+            <pc:sldMk cId="3678187506" sldId="257"/>
+            <ac:spMk id="66" creationId="{971E2717-DEED-4972-6287-82BB16781D3B}"/>
+          </ac:spMkLst>
+        </pc:spChg>
+        <pc:spChg chg="add del mod">
+          <ac:chgData name="Fatima Pillosu" userId="a6295d4dc9e22643" providerId="LiveId" clId="{169AF0B0-C29F-49D0-B18A-29148960D042}" dt="2024-10-15T13:59:37.298" v="566" actId="21"/>
+          <ac:spMkLst>
+            <pc:docMk/>
+            <pc:sldMk cId="3678187506" sldId="257"/>
+            <ac:spMk id="67" creationId="{7C89C3A8-5EAA-0C7C-D9E4-1E4B3909EBC8}"/>
+          </ac:spMkLst>
+        </pc:spChg>
+        <pc:spChg chg="add del mod">
+          <ac:chgData name="Fatima Pillosu" userId="a6295d4dc9e22643" providerId="LiveId" clId="{169AF0B0-C29F-49D0-B18A-29148960D042}" dt="2024-10-15T13:59:37.298" v="566" actId="21"/>
+          <ac:spMkLst>
+            <pc:docMk/>
+            <pc:sldMk cId="3678187506" sldId="257"/>
+            <ac:spMk id="68" creationId="{7BF49BFA-FCE5-37B6-3322-30032CA035EA}"/>
+          </ac:spMkLst>
+        </pc:spChg>
+        <pc:spChg chg="add del mod">
+          <ac:chgData name="Fatima Pillosu" userId="a6295d4dc9e22643" providerId="LiveId" clId="{169AF0B0-C29F-49D0-B18A-29148960D042}" dt="2024-10-15T13:59:37.298" v="566" actId="21"/>
+          <ac:spMkLst>
+            <pc:docMk/>
+            <pc:sldMk cId="3678187506" sldId="257"/>
+            <ac:spMk id="69" creationId="{3810E10D-233E-192F-E764-BC5AEBD140CA}"/>
+          </ac:spMkLst>
+        </pc:spChg>
+        <pc:spChg chg="add del mod">
+          <ac:chgData name="Fatima Pillosu" userId="a6295d4dc9e22643" providerId="LiveId" clId="{169AF0B0-C29F-49D0-B18A-29148960D042}" dt="2024-10-15T13:59:37.298" v="566" actId="21"/>
+          <ac:spMkLst>
+            <pc:docMk/>
+            <pc:sldMk cId="3678187506" sldId="257"/>
+            <ac:spMk id="70" creationId="{87E8E644-5256-6F3C-07ED-5C55FE638F1C}"/>
+          </ac:spMkLst>
+        </pc:spChg>
+        <pc:spChg chg="add del mod">
+          <ac:chgData name="Fatima Pillosu" userId="a6295d4dc9e22643" providerId="LiveId" clId="{169AF0B0-C29F-49D0-B18A-29148960D042}" dt="2024-10-15T13:59:37.298" v="566" actId="21"/>
+          <ac:spMkLst>
+            <pc:docMk/>
+            <pc:sldMk cId="3678187506" sldId="257"/>
+            <ac:spMk id="71" creationId="{09487492-2BFD-7E60-8F1E-4990C80286FF}"/>
+          </ac:spMkLst>
+        </pc:spChg>
+        <pc:spChg chg="add del mod">
+          <ac:chgData name="Fatima Pillosu" userId="a6295d4dc9e22643" providerId="LiveId" clId="{169AF0B0-C29F-49D0-B18A-29148960D042}" dt="2024-10-15T13:59:37.298" v="566" actId="21"/>
+          <ac:spMkLst>
+            <pc:docMk/>
+            <pc:sldMk cId="3678187506" sldId="257"/>
+            <ac:spMk id="72" creationId="{A34808D0-85BC-49FD-DE30-3E36BC1F3EB7}"/>
+          </ac:spMkLst>
+        </pc:spChg>
+        <pc:spChg chg="add del mod">
+          <ac:chgData name="Fatima Pillosu" userId="a6295d4dc9e22643" providerId="LiveId" clId="{169AF0B0-C29F-49D0-B18A-29148960D042}" dt="2024-10-15T13:59:37.298" v="566" actId="21"/>
+          <ac:spMkLst>
+            <pc:docMk/>
+            <pc:sldMk cId="3678187506" sldId="257"/>
+            <ac:spMk id="73" creationId="{CCAF333D-D62A-6E5A-9E5C-A77D4E489CC7}"/>
+          </ac:spMkLst>
+        </pc:spChg>
+        <pc:spChg chg="add del mod">
+          <ac:chgData name="Fatima Pillosu" userId="a6295d4dc9e22643" providerId="LiveId" clId="{169AF0B0-C29F-49D0-B18A-29148960D042}" dt="2024-10-15T13:59:37.298" v="566" actId="21"/>
+          <ac:spMkLst>
+            <pc:docMk/>
+            <pc:sldMk cId="3678187506" sldId="257"/>
+            <ac:spMk id="74" creationId="{E801BCDD-D7EC-8708-6E95-AEB9AD3D0562}"/>
+          </ac:spMkLst>
+        </pc:spChg>
+        <pc:spChg chg="add del mod">
+          <ac:chgData name="Fatima Pillosu" userId="a6295d4dc9e22643" providerId="LiveId" clId="{169AF0B0-C29F-49D0-B18A-29148960D042}" dt="2024-10-15T13:59:37.298" v="566" actId="21"/>
+          <ac:spMkLst>
+            <pc:docMk/>
+            <pc:sldMk cId="3678187506" sldId="257"/>
+            <ac:spMk id="75" creationId="{3D6B6A65-7136-1666-0656-0F83A85E5896}"/>
           </ac:spMkLst>
         </pc:spChg>
         <pc:spChg chg="add mod">
-          <ac:chgData name="Fatima Pillosu" userId="a6295d4dc9e22643" providerId="LiveId" clId="{0756FD03-1706-4472-A4C9-E6951E3B5C4C}" dt="2023-11-29T09:37:54.207" v="50"/>
-          <ac:spMkLst>
-            <pc:docMk/>
-            <pc:sldMk cId="1072346714" sldId="256"/>
-            <ac:spMk id="57" creationId="{62474F9B-9549-98F4-5E8F-BBEAC7016D7F}"/>
+          <ac:chgData name="Fatima Pillosu" userId="a6295d4dc9e22643" providerId="LiveId" clId="{169AF0B0-C29F-49D0-B18A-29148960D042}" dt="2024-10-15T13:59:47.943" v="567"/>
+          <ac:spMkLst>
+            <pc:docMk/>
+            <pc:sldMk cId="3678187506" sldId="257"/>
+            <ac:spMk id="80" creationId="{4FE095D0-F330-6D0B-8D62-E81D7A85EDDC}"/>
           </ac:spMkLst>
         </pc:spChg>
         <pc:spChg chg="add mod">
-          <ac:chgData name="Fatima Pillosu" userId="a6295d4dc9e22643" providerId="LiveId" clId="{0756FD03-1706-4472-A4C9-E6951E3B5C4C}" dt="2023-11-29T09:37:54.207" v="50"/>
-          <ac:spMkLst>
-            <pc:docMk/>
-            <pc:sldMk cId="1072346714" sldId="256"/>
-            <ac:spMk id="58" creationId="{230FF514-E474-F3B0-E4CA-E17B20299031}"/>
+          <ac:chgData name="Fatima Pillosu" userId="a6295d4dc9e22643" providerId="LiveId" clId="{169AF0B0-C29F-49D0-B18A-29148960D042}" dt="2024-10-15T13:59:47.943" v="567"/>
+          <ac:spMkLst>
+            <pc:docMk/>
+            <pc:sldMk cId="3678187506" sldId="257"/>
+            <ac:spMk id="81" creationId="{76152E3D-3F02-0B1C-AA13-6F4BAB5BB0AF}"/>
           </ac:spMkLst>
         </pc:spChg>
         <pc:spChg chg="add mod">
-          <ac:chgData name="Fatima Pillosu" userId="a6295d4dc9e22643" providerId="LiveId" clId="{0756FD03-1706-4472-A4C9-E6951E3B5C4C}" dt="2023-11-29T09:37:54.207" v="50"/>
-          <ac:spMkLst>
-            <pc:docMk/>
-            <pc:sldMk cId="1072346714" sldId="256"/>
-            <ac:spMk id="59" creationId="{60EFB212-C205-78DB-7709-6791A8193261}"/>
+          <ac:chgData name="Fatima Pillosu" userId="a6295d4dc9e22643" providerId="LiveId" clId="{169AF0B0-C29F-49D0-B18A-29148960D042}" dt="2024-10-15T13:59:47.943" v="567"/>
+          <ac:spMkLst>
+            <pc:docMk/>
+            <pc:sldMk cId="3678187506" sldId="257"/>
+            <ac:spMk id="82" creationId="{966D71FF-DE5A-3195-D4B3-EDC7395E6A95}"/>
           </ac:spMkLst>
         </pc:spChg>
         <pc:spChg chg="add mod">
-          <ac:chgData name="Fatima Pillosu" userId="a6295d4dc9e22643" providerId="LiveId" clId="{0756FD03-1706-4472-A4C9-E6951E3B5C4C}" dt="2023-11-29T09:37:54.207" v="50"/>
-          <ac:spMkLst>
-            <pc:docMk/>
-            <pc:sldMk cId="1072346714" sldId="256"/>
-            <ac:spMk id="60" creationId="{7376B85B-917A-079A-5132-DEDB5C5E7834}"/>
+          <ac:chgData name="Fatima Pillosu" userId="a6295d4dc9e22643" providerId="LiveId" clId="{169AF0B0-C29F-49D0-B18A-29148960D042}" dt="2024-10-15T13:59:47.943" v="567"/>
+          <ac:spMkLst>
+            <pc:docMk/>
+            <pc:sldMk cId="3678187506" sldId="257"/>
+            <ac:spMk id="83" creationId="{7F65EB5E-8C99-2898-308D-4B7B6240EE93}"/>
           </ac:spMkLst>
         </pc:spChg>
         <pc:spChg chg="add mod">
-          <ac:chgData name="Fatima Pillosu" userId="a6295d4dc9e22643" providerId="LiveId" clId="{0756FD03-1706-4472-A4C9-E6951E3B5C4C}" dt="2023-11-29T09:38:00.207" v="52" actId="1036"/>
-          <ac:spMkLst>
-            <pc:docMk/>
-            <pc:sldMk cId="1072346714" sldId="256"/>
-            <ac:spMk id="61" creationId="{A9ADF02B-2B10-FE58-83FB-270E1B72F374}"/>
-          </ac:spMkLst>
-        </pc:spChg>
-        <pc:spChg chg="mod">
-          <ac:chgData name="Fatima Pillosu" userId="a6295d4dc9e22643" providerId="LiveId" clId="{0756FD03-1706-4472-A4C9-E6951E3B5C4C}" dt="2023-11-29T09:37:54.207" v="50"/>
-          <ac:spMkLst>
-            <pc:docMk/>
-            <pc:sldMk cId="1072346714" sldId="256"/>
-            <ac:spMk id="64" creationId="{21139AFA-61F8-7687-C77E-BFDBF491ED17}"/>
+          <ac:chgData name="Fatima Pillosu" userId="a6295d4dc9e22643" providerId="LiveId" clId="{169AF0B0-C29F-49D0-B18A-29148960D042}" dt="2024-10-15T13:59:47.943" v="567"/>
+          <ac:spMkLst>
+            <pc:docMk/>
+            <pc:sldMk cId="3678187506" sldId="257"/>
+            <ac:spMk id="84" creationId="{A2EB6F06-395D-9318-4EA7-3D2A87F7A7F8}"/>
           </ac:spMkLst>
         </pc:spChg>
         <pc:spChg chg="add mod">
-          <ac:chgData name="Fatima Pillosu" userId="a6295d4dc9e22643" providerId="LiveId" clId="{0756FD03-1706-4472-A4C9-E6951E3B5C4C}" dt="2023-11-29T09:37:54.207" v="50"/>
-          <ac:spMkLst>
-            <pc:docMk/>
-            <pc:sldMk cId="1072346714" sldId="256"/>
-            <ac:spMk id="65" creationId="{C3AB6EEE-A212-6219-4457-D0464EB0CCAE}"/>
+          <ac:chgData name="Fatima Pillosu" userId="a6295d4dc9e22643" providerId="LiveId" clId="{169AF0B0-C29F-49D0-B18A-29148960D042}" dt="2024-10-15T13:59:47.943" v="567"/>
+          <ac:spMkLst>
+            <pc:docMk/>
+            <pc:sldMk cId="3678187506" sldId="257"/>
+            <ac:spMk id="85" creationId="{6325FE5D-06ED-04EF-69C0-BD0EBDC8BD88}"/>
           </ac:spMkLst>
         </pc:spChg>
         <pc:spChg chg="add mod">
-          <ac:chgData name="Fatima Pillosu" userId="a6295d4dc9e22643" providerId="LiveId" clId="{0756FD03-1706-4472-A4C9-E6951E3B5C4C}" dt="2023-11-29T09:37:54.207" v="50"/>
-          <ac:spMkLst>
-            <pc:docMk/>
-            <pc:sldMk cId="1072346714" sldId="256"/>
-            <ac:spMk id="66" creationId="{28F2E26B-47E5-8BA5-47B6-5E6D88369717}"/>
+          <ac:chgData name="Fatima Pillosu" userId="a6295d4dc9e22643" providerId="LiveId" clId="{169AF0B0-C29F-49D0-B18A-29148960D042}" dt="2024-10-15T13:59:47.943" v="567"/>
+          <ac:spMkLst>
+            <pc:docMk/>
+            <pc:sldMk cId="3678187506" sldId="257"/>
+            <ac:spMk id="86" creationId="{6835EBA5-C264-52F1-869D-3FD37CDE780F}"/>
           </ac:spMkLst>
         </pc:spChg>
         <pc:spChg chg="add mod">
-          <ac:chgData name="Fatima Pillosu" userId="a6295d4dc9e22643" providerId="LiveId" clId="{0756FD03-1706-4472-A4C9-E6951E3B5C4C}" dt="2023-11-29T09:37:54.207" v="50"/>
-          <ac:spMkLst>
-            <pc:docMk/>
-            <pc:sldMk cId="1072346714" sldId="256"/>
-            <ac:spMk id="67" creationId="{DB00622D-EFA4-873C-60A9-8D8057632DA8}"/>
+          <ac:chgData name="Fatima Pillosu" userId="a6295d4dc9e22643" providerId="LiveId" clId="{169AF0B0-C29F-49D0-B18A-29148960D042}" dt="2024-10-15T13:59:47.943" v="567"/>
+          <ac:spMkLst>
+            <pc:docMk/>
+            <pc:sldMk cId="3678187506" sldId="257"/>
+            <ac:spMk id="87" creationId="{62D88A45-D06C-5F31-091D-286DBD29E7C0}"/>
           </ac:spMkLst>
         </pc:spChg>
         <pc:spChg chg="add mod">
-          <ac:chgData name="Fatima Pillosu" userId="a6295d4dc9e22643" providerId="LiveId" clId="{0756FD03-1706-4472-A4C9-E6951E3B5C4C}" dt="2023-11-29T09:37:54.207" v="50"/>
-          <ac:spMkLst>
-            <pc:docMk/>
-            <pc:sldMk cId="1072346714" sldId="256"/>
-            <ac:spMk id="68" creationId="{4DC2DACD-FD0F-3B6F-1271-24B1715E8415}"/>
+          <ac:chgData name="Fatima Pillosu" userId="a6295d4dc9e22643" providerId="LiveId" clId="{169AF0B0-C29F-49D0-B18A-29148960D042}" dt="2024-10-15T13:59:47.943" v="567"/>
+          <ac:spMkLst>
+            <pc:docMk/>
+            <pc:sldMk cId="3678187506" sldId="257"/>
+            <ac:spMk id="88" creationId="{75935094-04FA-6918-ACA5-B36AC7E6F57D}"/>
           </ac:spMkLst>
         </pc:spChg>
         <pc:spChg chg="add mod">
-          <ac:chgData name="Fatima Pillosu" userId="a6295d4dc9e22643" providerId="LiveId" clId="{0756FD03-1706-4472-A4C9-E6951E3B5C4C}" dt="2023-11-29T09:37:54.207" v="50"/>
-          <ac:spMkLst>
-            <pc:docMk/>
-            <pc:sldMk cId="1072346714" sldId="256"/>
-            <ac:spMk id="69" creationId="{3D7E1B29-F647-CFAB-E0D7-3C9F7A2144FC}"/>
+          <ac:chgData name="Fatima Pillosu" userId="a6295d4dc9e22643" providerId="LiveId" clId="{169AF0B0-C29F-49D0-B18A-29148960D042}" dt="2024-10-15T13:59:47.943" v="567"/>
+          <ac:spMkLst>
+            <pc:docMk/>
+            <pc:sldMk cId="3678187506" sldId="257"/>
+            <ac:spMk id="89" creationId="{9E57529D-A32C-E6A8-C317-F2B525741717}"/>
           </ac:spMkLst>
         </pc:spChg>
         <pc:spChg chg="add mod">
-          <ac:chgData name="Fatima Pillosu" userId="a6295d4dc9e22643" providerId="LiveId" clId="{0756FD03-1706-4472-A4C9-E6951E3B5C4C}" dt="2023-11-29T09:37:54.207" v="50"/>
-          <ac:spMkLst>
-            <pc:docMk/>
-            <pc:sldMk cId="1072346714" sldId="256"/>
-            <ac:spMk id="70" creationId="{CB0F925A-BE4F-BA21-B616-81D1EE21A5D3}"/>
+          <ac:chgData name="Fatima Pillosu" userId="a6295d4dc9e22643" providerId="LiveId" clId="{169AF0B0-C29F-49D0-B18A-29148960D042}" dt="2024-10-15T13:59:47.943" v="567"/>
+          <ac:spMkLst>
+            <pc:docMk/>
+            <pc:sldMk cId="3678187506" sldId="257"/>
+            <ac:spMk id="90" creationId="{C39289CC-107A-6BD7-94AC-9B2E82E9DD2E}"/>
           </ac:spMkLst>
         </pc:spChg>
         <pc:spChg chg="add mod">
-          <ac:chgData name="Fatima Pillosu" userId="a6295d4dc9e22643" providerId="LiveId" clId="{0756FD03-1706-4472-A4C9-E6951E3B5C4C}" dt="2023-11-29T09:37:54.207" v="50"/>
-          <ac:spMkLst>
-            <pc:docMk/>
-            <pc:sldMk cId="1072346714" sldId="256"/>
-            <ac:spMk id="71" creationId="{87594D03-4FC2-F597-40DD-0BC8E77ADAB0}"/>
+          <ac:chgData name="Fatima Pillosu" userId="a6295d4dc9e22643" providerId="LiveId" clId="{169AF0B0-C29F-49D0-B18A-29148960D042}" dt="2024-10-15T13:59:47.943" v="567"/>
+          <ac:spMkLst>
+            <pc:docMk/>
+            <pc:sldMk cId="3678187506" sldId="257"/>
+            <ac:spMk id="91" creationId="{FF26949D-6692-5742-5359-EF2280524EB6}"/>
           </ac:spMkLst>
         </pc:spChg>
         <pc:spChg chg="add mod">
-          <ac:chgData name="Fatima Pillosu" userId="a6295d4dc9e22643" providerId="LiveId" clId="{0756FD03-1706-4472-A4C9-E6951E3B5C4C}" dt="2023-11-29T09:37:54.207" v="50"/>
-          <ac:spMkLst>
-            <pc:docMk/>
-            <pc:sldMk cId="1072346714" sldId="256"/>
-            <ac:spMk id="72" creationId="{B4A9E0F8-A058-E30E-B39A-661259D970B7}"/>
+          <ac:chgData name="Fatima Pillosu" userId="a6295d4dc9e22643" providerId="LiveId" clId="{169AF0B0-C29F-49D0-B18A-29148960D042}" dt="2024-10-15T13:59:47.943" v="567"/>
+          <ac:spMkLst>
+            <pc:docMk/>
+            <pc:sldMk cId="3678187506" sldId="257"/>
+            <ac:spMk id="92" creationId="{47674D0E-8DEC-D619-FD5C-6291A6CB1F74}"/>
           </ac:spMkLst>
         </pc:spChg>
         <pc:spChg chg="add mod">
-          <ac:chgData name="Fatima Pillosu" userId="a6295d4dc9e22643" providerId="LiveId" clId="{0756FD03-1706-4472-A4C9-E6951E3B5C4C}" dt="2023-11-29T09:37:54.207" v="50"/>
-          <ac:spMkLst>
-            <pc:docMk/>
-            <pc:sldMk cId="1072346714" sldId="256"/>
-            <ac:spMk id="73" creationId="{CB9643F3-7AEE-4154-7560-89FF50440D39}"/>
+          <ac:chgData name="Fatima Pillosu" userId="a6295d4dc9e22643" providerId="LiveId" clId="{169AF0B0-C29F-49D0-B18A-29148960D042}" dt="2024-10-15T13:59:47.943" v="567"/>
+          <ac:spMkLst>
+            <pc:docMk/>
+            <pc:sldMk cId="3678187506" sldId="257"/>
+            <ac:spMk id="93" creationId="{65BFDB0F-0CA5-5859-DF80-49AB12F1C7A0}"/>
           </ac:spMkLst>
         </pc:spChg>
         <pc:spChg chg="add mod">
-          <ac:chgData name="Fatima Pillosu" userId="a6295d4dc9e22643" providerId="LiveId" clId="{0756FD03-1706-4472-A4C9-E6951E3B5C4C}" dt="2023-11-29T09:37:54.207" v="50"/>
-          <ac:spMkLst>
-            <pc:docMk/>
-            <pc:sldMk cId="1072346714" sldId="256"/>
-            <ac:spMk id="74" creationId="{DC3ED00A-8225-F3DF-6AFC-3E3B416AF7A2}"/>
+          <ac:chgData name="Fatima Pillosu" userId="a6295d4dc9e22643" providerId="LiveId" clId="{169AF0B0-C29F-49D0-B18A-29148960D042}" dt="2024-10-15T13:59:47.943" v="567"/>
+          <ac:spMkLst>
+            <pc:docMk/>
+            <pc:sldMk cId="3678187506" sldId="257"/>
+            <ac:spMk id="94" creationId="{B3053355-9D65-6A39-B80E-FE5297F3F1D7}"/>
           </ac:spMkLst>
         </pc:spChg>
         <pc:spChg chg="add mod">
-          <ac:chgData name="Fatima Pillosu" userId="a6295d4dc9e22643" providerId="LiveId" clId="{0756FD03-1706-4472-A4C9-E6951E3B5C4C}" dt="2023-11-29T09:37:54.207" v="50"/>
-          <ac:spMkLst>
-            <pc:docMk/>
-            <pc:sldMk cId="1072346714" sldId="256"/>
-            <ac:spMk id="75" creationId="{93DD7934-4D1F-203F-115A-8CD30267714B}"/>
+          <ac:chgData name="Fatima Pillosu" userId="a6295d4dc9e22643" providerId="LiveId" clId="{169AF0B0-C29F-49D0-B18A-29148960D042}" dt="2024-10-15T13:59:47.943" v="567"/>
+          <ac:spMkLst>
+            <pc:docMk/>
+            <pc:sldMk cId="3678187506" sldId="257"/>
+            <ac:spMk id="95" creationId="{6585FA76-FE82-6B72-5C97-E976DBC6F5A2}"/>
           </ac:spMkLst>
         </pc:spChg>
         <pc:spChg chg="add mod">
-          <ac:chgData name="Fatima Pillosu" userId="a6295d4dc9e22643" providerId="LiveId" clId="{0756FD03-1706-4472-A4C9-E6951E3B5C4C}" dt="2023-11-29T09:37:54.207" v="50"/>
-          <ac:spMkLst>
-            <pc:docMk/>
-            <pc:sldMk cId="1072346714" sldId="256"/>
-            <ac:spMk id="76" creationId="{E612E97C-EBA3-3FE1-2037-0B88C943A875}"/>
+          <ac:chgData name="Fatima Pillosu" userId="a6295d4dc9e22643" providerId="LiveId" clId="{169AF0B0-C29F-49D0-B18A-29148960D042}" dt="2024-10-15T13:59:47.943" v="567"/>
+          <ac:spMkLst>
+            <pc:docMk/>
+            <pc:sldMk cId="3678187506" sldId="257"/>
+            <ac:spMk id="96" creationId="{CA1C67A3-7D6D-0980-C65E-1A4EC6D02F65}"/>
           </ac:spMkLst>
         </pc:spChg>
         <pc:spChg chg="add mod">
-          <ac:chgData name="Fatima Pillosu" userId="a6295d4dc9e22643" providerId="LiveId" clId="{0756FD03-1706-4472-A4C9-E6951E3B5C4C}" dt="2023-11-29T09:37:54.207" v="50"/>
-          <ac:spMkLst>
-            <pc:docMk/>
-            <pc:sldMk cId="1072346714" sldId="256"/>
-            <ac:spMk id="77" creationId="{F7686D95-1D1B-55FE-328A-3A54FDE4131B}"/>
+          <ac:chgData name="Fatima Pillosu" userId="a6295d4dc9e22643" providerId="LiveId" clId="{169AF0B0-C29F-49D0-B18A-29148960D042}" dt="2024-10-15T13:59:47.943" v="567"/>
+          <ac:spMkLst>
+            <pc:docMk/>
+            <pc:sldMk cId="3678187506" sldId="257"/>
+            <ac:spMk id="97" creationId="{971E2717-DEED-4972-6287-82BB16781D3B}"/>
           </ac:spMkLst>
         </pc:spChg>
         <pc:spChg chg="add mod">
-          <ac:chgData name="Fatima Pillosu" userId="a6295d4dc9e22643" providerId="LiveId" clId="{0756FD03-1706-4472-A4C9-E6951E3B5C4C}" dt="2023-11-29T09:37:54.207" v="50"/>
-          <ac:spMkLst>
-            <pc:docMk/>
-            <pc:sldMk cId="1072346714" sldId="256"/>
-            <ac:spMk id="78" creationId="{76399EE0-F8AF-AE62-22B7-3A25E5005060}"/>
+          <ac:chgData name="Fatima Pillosu" userId="a6295d4dc9e22643" providerId="LiveId" clId="{169AF0B0-C29F-49D0-B18A-29148960D042}" dt="2024-10-15T13:59:47.943" v="567"/>
+          <ac:spMkLst>
+            <pc:docMk/>
+            <pc:sldMk cId="3678187506" sldId="257"/>
+            <ac:spMk id="98" creationId="{7C89C3A8-5EAA-0C7C-D9E4-1E4B3909EBC8}"/>
           </ac:spMkLst>
         </pc:spChg>
         <pc:spChg chg="add mod">
-          <ac:chgData name="Fatima Pillosu" userId="a6295d4dc9e22643" providerId="LiveId" clId="{0756FD03-1706-4472-A4C9-E6951E3B5C4C}" dt="2023-11-29T09:37:54.207" v="50"/>
-          <ac:spMkLst>
-            <pc:docMk/>
-            <pc:sldMk cId="1072346714" sldId="256"/>
-            <ac:spMk id="79" creationId="{38AC4AC0-A304-DFA2-F0FA-E536DBD37F81}"/>
+          <ac:chgData name="Fatima Pillosu" userId="a6295d4dc9e22643" providerId="LiveId" clId="{169AF0B0-C29F-49D0-B18A-29148960D042}" dt="2024-10-15T13:59:47.943" v="567"/>
+          <ac:spMkLst>
+            <pc:docMk/>
+            <pc:sldMk cId="3678187506" sldId="257"/>
+            <ac:spMk id="99" creationId="{7BF49BFA-FCE5-37B6-3322-30032CA035EA}"/>
           </ac:spMkLst>
         </pc:spChg>
         <pc:spChg chg="add mod">
-          <ac:chgData name="Fatima Pillosu" userId="a6295d4dc9e22643" providerId="LiveId" clId="{0756FD03-1706-4472-A4C9-E6951E3B5C4C}" dt="2023-11-29T09:37:54.207" v="50"/>
-          <ac:spMkLst>
-            <pc:docMk/>
-            <pc:sldMk cId="1072346714" sldId="256"/>
-            <ac:spMk id="80" creationId="{5AD677FE-FC0E-E649-098B-C7FB7F847778}"/>
+          <ac:chgData name="Fatima Pillosu" userId="a6295d4dc9e22643" providerId="LiveId" clId="{169AF0B0-C29F-49D0-B18A-29148960D042}" dt="2024-10-15T13:59:47.943" v="567"/>
+          <ac:spMkLst>
+            <pc:docMk/>
+            <pc:sldMk cId="3678187506" sldId="257"/>
+            <ac:spMk id="100" creationId="{3810E10D-233E-192F-E764-BC5AEBD140CA}"/>
           </ac:spMkLst>
         </pc:spChg>
         <pc:spChg chg="add mod">
-          <ac:chgData name="Fatima Pillosu" userId="a6295d4dc9e22643" providerId="LiveId" clId="{0756FD03-1706-4472-A4C9-E6951E3B5C4C}" dt="2023-11-29T09:37:54.207" v="50"/>
-          <ac:spMkLst>
-            <pc:docMk/>
-            <pc:sldMk cId="1072346714" sldId="256"/>
-            <ac:spMk id="81" creationId="{FDD119F1-B8C4-D451-4D83-B8285C2FADE4}"/>
+          <ac:chgData name="Fatima Pillosu" userId="a6295d4dc9e22643" providerId="LiveId" clId="{169AF0B0-C29F-49D0-B18A-29148960D042}" dt="2024-10-15T13:59:47.943" v="567"/>
+          <ac:spMkLst>
+            <pc:docMk/>
+            <pc:sldMk cId="3678187506" sldId="257"/>
+            <ac:spMk id="101" creationId="{87E8E644-5256-6F3C-07ED-5C55FE638F1C}"/>
           </ac:spMkLst>
         </pc:spChg>
         <pc:spChg chg="add mod">
-          <ac:chgData name="Fatima Pillosu" userId="a6295d4dc9e22643" providerId="LiveId" clId="{0756FD03-1706-4472-A4C9-E6951E3B5C4C}" dt="2023-11-29T09:37:54.207" v="50"/>
-          <ac:spMkLst>
-            <pc:docMk/>
-            <pc:sldMk cId="1072346714" sldId="256"/>
-            <ac:spMk id="82" creationId="{A86C750C-FB98-9351-A067-610D39232C45}"/>
-          </ac:spMkLst>
-        </pc:spChg>
-        <pc:grpChg chg="del mod">
-          <ac:chgData name="Fatima Pillosu" userId="a6295d4dc9e22643" providerId="LiveId" clId="{0756FD03-1706-4472-A4C9-E6951E3B5C4C}" dt="2023-11-29T09:37:33.019" v="49" actId="21"/>
-          <ac:grpSpMkLst>
-            <pc:docMk/>
-            <pc:sldMk cId="1072346714" sldId="256"/>
-            <ac:grpSpMk id="31" creationId="{C99970EB-0759-371E-60E8-38F5FEFC5971}"/>
-          </ac:grpSpMkLst>
-        </pc:grpChg>
-        <pc:grpChg chg="add mod">
-          <ac:chgData name="Fatima Pillosu" userId="a6295d4dc9e22643" providerId="LiveId" clId="{0756FD03-1706-4472-A4C9-E6951E3B5C4C}" dt="2023-11-29T09:37:54.207" v="50"/>
-          <ac:grpSpMkLst>
-            <pc:docMk/>
-            <pc:sldMk cId="1072346714" sldId="256"/>
-            <ac:grpSpMk id="62" creationId="{610E7790-8E02-B443-1264-38F59A3D3E2B}"/>
-          </ac:grpSpMkLst>
-        </pc:grpChg>
-        <pc:picChg chg="del mod">
-          <ac:chgData name="Fatima Pillosu" userId="a6295d4dc9e22643" providerId="LiveId" clId="{0756FD03-1706-4472-A4C9-E6951E3B5C4C}" dt="2023-11-29T09:37:33.019" v="49" actId="21"/>
+          <ac:chgData name="Fatima Pillosu" userId="a6295d4dc9e22643" providerId="LiveId" clId="{169AF0B0-C29F-49D0-B18A-29148960D042}" dt="2024-10-15T13:59:47.943" v="567"/>
+          <ac:spMkLst>
+            <pc:docMk/>
+            <pc:sldMk cId="3678187506" sldId="257"/>
+            <ac:spMk id="102" creationId="{09487492-2BFD-7E60-8F1E-4990C80286FF}"/>
+          </ac:spMkLst>
+        </pc:spChg>
+        <pc:spChg chg="add mod">
+          <ac:chgData name="Fatima Pillosu" userId="a6295d4dc9e22643" providerId="LiveId" clId="{169AF0B0-C29F-49D0-B18A-29148960D042}" dt="2024-10-15T13:59:47.943" v="567"/>
+          <ac:spMkLst>
+            <pc:docMk/>
+            <pc:sldMk cId="3678187506" sldId="257"/>
+            <ac:spMk id="103" creationId="{A34808D0-85BC-49FD-DE30-3E36BC1F3EB7}"/>
+          </ac:spMkLst>
+        </pc:spChg>
+        <pc:spChg chg="add mod">
+          <ac:chgData name="Fatima Pillosu" userId="a6295d4dc9e22643" providerId="LiveId" clId="{169AF0B0-C29F-49D0-B18A-29148960D042}" dt="2024-10-15T13:59:47.943" v="567"/>
+          <ac:spMkLst>
+            <pc:docMk/>
+            <pc:sldMk cId="3678187506" sldId="257"/>
+            <ac:spMk id="104" creationId="{CCAF333D-D62A-6E5A-9E5C-A77D4E489CC7}"/>
+          </ac:spMkLst>
+        </pc:spChg>
+        <pc:spChg chg="add mod">
+          <ac:chgData name="Fatima Pillosu" userId="a6295d4dc9e22643" providerId="LiveId" clId="{169AF0B0-C29F-49D0-B18A-29148960D042}" dt="2024-10-15T13:59:47.943" v="567"/>
+          <ac:spMkLst>
+            <pc:docMk/>
+            <pc:sldMk cId="3678187506" sldId="257"/>
+            <ac:spMk id="105" creationId="{E801BCDD-D7EC-8708-6E95-AEB9AD3D0562}"/>
+          </ac:spMkLst>
+        </pc:spChg>
+        <pc:spChg chg="add mod">
+          <ac:chgData name="Fatima Pillosu" userId="a6295d4dc9e22643" providerId="LiveId" clId="{169AF0B0-C29F-49D0-B18A-29148960D042}" dt="2024-10-15T13:59:47.943" v="567"/>
+          <ac:spMkLst>
+            <pc:docMk/>
+            <pc:sldMk cId="3678187506" sldId="257"/>
+            <ac:spMk id="106" creationId="{3D6B6A65-7136-1666-0656-0F83A85E5896}"/>
+          </ac:spMkLst>
+        </pc:spChg>
+        <pc:picChg chg="add del mod">
+          <ac:chgData name="Fatima Pillosu" userId="a6295d4dc9e22643" providerId="LiveId" clId="{169AF0B0-C29F-49D0-B18A-29148960D042}" dt="2024-10-15T13:44:55.190" v="153" actId="478"/>
           <ac:picMkLst>
             <pc:docMk/>
-            <pc:sldMk cId="1072346714" sldId="256"/>
-            <ac:picMk id="22" creationId="{671F6A74-7242-B4F8-81C5-EB111E195B51}"/>
+            <pc:sldMk cId="3678187506" sldId="257"/>
+            <ac:picMk id="2" creationId="{4985DDCB-5CB6-5BC9-0056-C09A0C7C5A32}"/>
           </ac:picMkLst>
         </pc:picChg>
-        <pc:picChg chg="del mod">
-          <ac:chgData name="Fatima Pillosu" userId="a6295d4dc9e22643" providerId="LiveId" clId="{0756FD03-1706-4472-A4C9-E6951E3B5C4C}" dt="2023-11-29T09:37:33.019" v="49" actId="21"/>
+        <pc:picChg chg="add del mod">
+          <ac:chgData name="Fatima Pillosu" userId="a6295d4dc9e22643" providerId="LiveId" clId="{169AF0B0-C29F-49D0-B18A-29148960D042}" dt="2024-10-15T13:59:14.817" v="564" actId="21"/>
           <ac:picMkLst>
             <pc:docMk/>
-            <pc:sldMk cId="1072346714" sldId="256"/>
-            <ac:picMk id="23" creationId="{1AE1E841-1645-BFD3-3EE5-C8880A8F1C4F}"/>
+            <pc:sldMk cId="3678187506" sldId="257"/>
+            <ac:picMk id="3" creationId="{871E9F37-2633-C94D-7124-C052F7F3446C}"/>
           </ac:picMkLst>
         </pc:picChg>
-        <pc:picChg chg="del mod">
-          <ac:chgData name="Fatima Pillosu" userId="a6295d4dc9e22643" providerId="LiveId" clId="{0756FD03-1706-4472-A4C9-E6951E3B5C4C}" dt="2023-11-29T09:37:33.019" v="49" actId="21"/>
+        <pc:picChg chg="add del mod">
+          <ac:chgData name="Fatima Pillosu" userId="a6295d4dc9e22643" providerId="LiveId" clId="{169AF0B0-C29F-49D0-B18A-29148960D042}" dt="2024-10-15T13:59:14.817" v="564" actId="21"/>
           <ac:picMkLst>
             <pc:docMk/>
-            <pc:sldMk cId="1072346714" sldId="256"/>
-            <ac:picMk id="24" creationId="{C33C068E-1BBA-5EF5-F3D2-8D0CFC725CBD}"/>
+            <pc:sldMk cId="3678187506" sldId="257"/>
+            <ac:picMk id="4" creationId="{7C33DA90-2417-8085-3430-0F83A0257B0B}"/>
           </ac:picMkLst>
         </pc:picChg>
-        <pc:picChg chg="del mod">
-          <ac:chgData name="Fatima Pillosu" userId="a6295d4dc9e22643" providerId="LiveId" clId="{0756FD03-1706-4472-A4C9-E6951E3B5C4C}" dt="2023-11-29T09:37:33.019" v="49" actId="21"/>
+        <pc:picChg chg="del">
+          <ac:chgData name="Fatima Pillosu" userId="a6295d4dc9e22643" providerId="LiveId" clId="{169AF0B0-C29F-49D0-B18A-29148960D042}" dt="2024-10-15T08:53:50.736" v="0" actId="21"/>
           <ac:picMkLst>
             <pc:docMk/>
-            <pc:sldMk cId="1072346714" sldId="256"/>
-            <ac:picMk id="25" creationId="{BDFA06AF-5E33-11D6-CFA8-257E7EAE5711}"/>
+            <pc:sldMk cId="3678187506" sldId="257"/>
+            <ac:picMk id="5" creationId="{4985DDCB-5CB6-5BC9-0056-C09A0C7C5A32}"/>
+          </ac:picMkLst>
+        </pc:picChg>
+        <pc:picChg chg="add del mod">
+          <ac:chgData name="Fatima Pillosu" userId="a6295d4dc9e22643" providerId="LiveId" clId="{169AF0B0-C29F-49D0-B18A-29148960D042}" dt="2024-10-15T13:59:14.817" v="564" actId="21"/>
+          <ac:picMkLst>
+            <pc:docMk/>
+            <pc:sldMk cId="3678187506" sldId="257"/>
+            <ac:picMk id="6" creationId="{E2ACEC1D-E5D1-9F10-A5BC-51A2C4D077AE}"/>
+          </ac:picMkLst>
+        </pc:picChg>
+        <pc:picChg chg="del">
+          <ac:chgData name="Fatima Pillosu" userId="a6295d4dc9e22643" providerId="LiveId" clId="{169AF0B0-C29F-49D0-B18A-29148960D042}" dt="2024-10-15T08:53:50.736" v="0" actId="21"/>
+          <ac:picMkLst>
+            <pc:docMk/>
+            <pc:sldMk cId="3678187506" sldId="257"/>
+            <ac:picMk id="7" creationId="{871E9F37-2633-C94D-7124-C052F7F3446C}"/>
+          </ac:picMkLst>
+        </pc:picChg>
+        <pc:picChg chg="del">
+          <ac:chgData name="Fatima Pillosu" userId="a6295d4dc9e22643" providerId="LiveId" clId="{169AF0B0-C29F-49D0-B18A-29148960D042}" dt="2024-10-15T08:53:50.736" v="0" actId="21"/>
+          <ac:picMkLst>
+            <pc:docMk/>
+            <pc:sldMk cId="3678187506" sldId="257"/>
+            <ac:picMk id="8" creationId="{0C185AEB-FBDC-4979-6408-BB4819BD4C96}"/>
+          </ac:picMkLst>
+        </pc:picChg>
+        <pc:picChg chg="del">
+          <ac:chgData name="Fatima Pillosu" userId="a6295d4dc9e22643" providerId="LiveId" clId="{169AF0B0-C29F-49D0-B18A-29148960D042}" dt="2024-10-15T08:53:50.736" v="0" actId="21"/>
+          <ac:picMkLst>
+            <pc:docMk/>
+            <pc:sldMk cId="3678187506" sldId="257"/>
+            <ac:picMk id="9" creationId="{7C33DA90-2417-8085-3430-0F83A0257B0B}"/>
+          </ac:picMkLst>
+        </pc:picChg>
+        <pc:picChg chg="del">
+          <ac:chgData name="Fatima Pillosu" userId="a6295d4dc9e22643" providerId="LiveId" clId="{169AF0B0-C29F-49D0-B18A-29148960D042}" dt="2024-10-15T08:53:50.736" v="0" actId="21"/>
+          <ac:picMkLst>
+            <pc:docMk/>
+            <pc:sldMk cId="3678187506" sldId="257"/>
+            <ac:picMk id="11" creationId="{E2ACEC1D-E5D1-9F10-A5BC-51A2C4D077AE}"/>
+          </ac:picMkLst>
+        </pc:picChg>
+        <pc:picChg chg="add del mod modCrop">
+          <ac:chgData name="Fatima Pillosu" userId="a6295d4dc9e22643" providerId="LiveId" clId="{169AF0B0-C29F-49D0-B18A-29148960D042}" dt="2024-10-15T13:59:14.817" v="564" actId="21"/>
+          <ac:picMkLst>
+            <pc:docMk/>
+            <pc:sldMk cId="3678187506" sldId="257"/>
+            <ac:picMk id="24" creationId="{0C185AEB-FBDC-4979-6408-BB4819BD4C96}"/>
+          </ac:picMkLst>
+        </pc:picChg>
+        <pc:picChg chg="add del mod">
+          <ac:chgData name="Fatima Pillosu" userId="a6295d4dc9e22643" providerId="LiveId" clId="{169AF0B0-C29F-49D0-B18A-29148960D042}" dt="2024-10-15T13:59:37.298" v="566" actId="21"/>
+          <ac:picMkLst>
+            <pc:docMk/>
+            <pc:sldMk cId="3678187506" sldId="257"/>
+            <ac:picMk id="45" creationId="{871E9F37-2633-C94D-7124-C052F7F3446C}"/>
+          </ac:picMkLst>
+        </pc:picChg>
+        <pc:picChg chg="add del mod">
+          <ac:chgData name="Fatima Pillosu" userId="a6295d4dc9e22643" providerId="LiveId" clId="{169AF0B0-C29F-49D0-B18A-29148960D042}" dt="2024-10-15T13:59:37.298" v="566" actId="21"/>
+          <ac:picMkLst>
+            <pc:docMk/>
+            <pc:sldMk cId="3678187506" sldId="257"/>
+            <ac:picMk id="46" creationId="{7C33DA90-2417-8085-3430-0F83A0257B0B}"/>
+          </ac:picMkLst>
+        </pc:picChg>
+        <pc:picChg chg="add del mod">
+          <ac:chgData name="Fatima Pillosu" userId="a6295d4dc9e22643" providerId="LiveId" clId="{169AF0B0-C29F-49D0-B18A-29148960D042}" dt="2024-10-15T13:59:37.298" v="566" actId="21"/>
+          <ac:picMkLst>
+            <pc:docMk/>
+            <pc:sldMk cId="3678187506" sldId="257"/>
+            <ac:picMk id="47" creationId="{E2ACEC1D-E5D1-9F10-A5BC-51A2C4D077AE}"/>
+          </ac:picMkLst>
+        </pc:picChg>
+        <pc:picChg chg="add del mod">
+          <ac:chgData name="Fatima Pillosu" userId="a6295d4dc9e22643" providerId="LiveId" clId="{169AF0B0-C29F-49D0-B18A-29148960D042}" dt="2024-10-15T13:59:37.298" v="566" actId="21"/>
+          <ac:picMkLst>
+            <pc:docMk/>
+            <pc:sldMk cId="3678187506" sldId="257"/>
+            <ac:picMk id="48" creationId="{0C185AEB-FBDC-4979-6408-BB4819BD4C96}"/>
           </ac:picMkLst>
         </pc:picChg>
         <pc:picChg chg="add mod">
-          <ac:chgData name="Fatima Pillosu" userId="a6295d4dc9e22643" providerId="LiveId" clId="{0756FD03-1706-4472-A4C9-E6951E3B5C4C}" dt="2023-11-29T09:37:54.207" v="50"/>
+          <ac:chgData name="Fatima Pillosu" userId="a6295d4dc9e22643" providerId="LiveId" clId="{169AF0B0-C29F-49D0-B18A-29148960D042}" dt="2024-10-15T13:59:47.943" v="567"/>
           <ac:picMkLst>
             <pc:docMk/>
-            <pc:sldMk cId="1072346714" sldId="256"/>
-            <ac:picMk id="53" creationId="{C1A28376-AEBE-2CB6-3202-C9AB2EB83169}"/>
+            <pc:sldMk cId="3678187506" sldId="257"/>
+            <ac:picMk id="76" creationId="{871E9F37-2633-C94D-7124-C052F7F3446C}"/>
           </ac:picMkLst>
         </pc:picChg>
         <pc:picChg chg="add mod">
-          <ac:chgData name="Fatima Pillosu" userId="a6295d4dc9e22643" providerId="LiveId" clId="{0756FD03-1706-4472-A4C9-E6951E3B5C4C}" dt="2023-11-29T09:37:54.207" v="50"/>
+          <ac:chgData name="Fatima Pillosu" userId="a6295d4dc9e22643" providerId="LiveId" clId="{169AF0B0-C29F-49D0-B18A-29148960D042}" dt="2024-10-15T13:59:47.943" v="567"/>
           <ac:picMkLst>
             <pc:docMk/>
-            <pc:sldMk cId="1072346714" sldId="256"/>
-            <ac:picMk id="54" creationId="{D231E065-ED8C-1E5A-E34B-9EF2993E163D}"/>
+            <pc:sldMk cId="3678187506" sldId="257"/>
+            <ac:picMk id="77" creationId="{7C33DA90-2417-8085-3430-0F83A0257B0B}"/>
           </ac:picMkLst>
         </pc:picChg>
         <pc:picChg chg="add mod">
-          <ac:chgData name="Fatima Pillosu" userId="a6295d4dc9e22643" providerId="LiveId" clId="{0756FD03-1706-4472-A4C9-E6951E3B5C4C}" dt="2023-11-29T09:37:54.207" v="50"/>
+          <ac:chgData name="Fatima Pillosu" userId="a6295d4dc9e22643" providerId="LiveId" clId="{169AF0B0-C29F-49D0-B18A-29148960D042}" dt="2024-10-15T13:59:47.943" v="567"/>
           <ac:picMkLst>
             <pc:docMk/>
-            <pc:sldMk cId="1072346714" sldId="256"/>
-            <ac:picMk id="55" creationId="{1C20D923-F680-860A-8430-00CFCD2244D4}"/>
+            <pc:sldMk cId="3678187506" sldId="257"/>
+            <ac:picMk id="78" creationId="{E2ACEC1D-E5D1-9F10-A5BC-51A2C4D077AE}"/>
           </ac:picMkLst>
         </pc:picChg>
         <pc:picChg chg="add mod">
-          <ac:chgData name="Fatima Pillosu" userId="a6295d4dc9e22643" providerId="LiveId" clId="{0756FD03-1706-4472-A4C9-E6951E3B5C4C}" dt="2023-11-29T09:37:54.207" v="50"/>
+          <ac:chgData name="Fatima Pillosu" userId="a6295d4dc9e22643" providerId="LiveId" clId="{169AF0B0-C29F-49D0-B18A-29148960D042}" dt="2024-10-15T13:59:47.943" v="567"/>
           <ac:picMkLst>
             <pc:docMk/>
-            <pc:sldMk cId="1072346714" sldId="256"/>
-            <ac:picMk id="56" creationId="{F3233E7D-C036-A735-6A90-2B99E9642804}"/>
+            <pc:sldMk cId="3678187506" sldId="257"/>
+            <ac:picMk id="79" creationId="{0C185AEB-FBDC-4979-6408-BB4819BD4C96}"/>
           </ac:picMkLst>
         </pc:picChg>
-        <pc:picChg chg="mod">
-          <ac:chgData name="Fatima Pillosu" userId="a6295d4dc9e22643" providerId="LiveId" clId="{0756FD03-1706-4472-A4C9-E6951E3B5C4C}" dt="2023-11-29T09:37:54.207" v="50"/>
-          <ac:picMkLst>
-            <pc:docMk/>
-            <pc:sldMk cId="1072346714" sldId="256"/>
-            <ac:picMk id="63" creationId="{9D6B798F-5A41-F5C5-8448-FECDF45F68EE}"/>
-          </ac:picMkLst>
-        </pc:picChg>
+        <pc:cxnChg chg="del">
+          <ac:chgData name="Fatima Pillosu" userId="a6295d4dc9e22643" providerId="LiveId" clId="{169AF0B0-C29F-49D0-B18A-29148960D042}" dt="2024-10-15T08:53:50.736" v="0" actId="21"/>
+          <ac:cxnSpMkLst>
+            <pc:docMk/>
+            <pc:sldMk cId="3678187506" sldId="257"/>
+            <ac:cxnSpMk id="12" creationId="{3A0FA579-A86B-403C-BB7E-7C40FE7275E3}"/>
+          </ac:cxnSpMkLst>
+        </pc:cxnChg>
+        <pc:cxnChg chg="del">
+          <ac:chgData name="Fatima Pillosu" userId="a6295d4dc9e22643" providerId="LiveId" clId="{169AF0B0-C29F-49D0-B18A-29148960D042}" dt="2024-10-15T08:53:50.736" v="0" actId="21"/>
+          <ac:cxnSpMkLst>
+            <pc:docMk/>
+            <pc:sldMk cId="3678187506" sldId="257"/>
+            <ac:cxnSpMk id="13" creationId="{45FAEEA4-3AD6-6555-8095-FD58585F4512}"/>
+          </ac:cxnSpMkLst>
+        </pc:cxnChg>
+        <pc:cxnChg chg="add del mod">
+          <ac:chgData name="Fatima Pillosu" userId="a6295d4dc9e22643" providerId="LiveId" clId="{169AF0B0-C29F-49D0-B18A-29148960D042}" dt="2024-10-15T13:44:55.190" v="153" actId="478"/>
+          <ac:cxnSpMkLst>
+            <pc:docMk/>
+            <pc:sldMk cId="3678187506" sldId="257"/>
+            <ac:cxnSpMk id="22" creationId="{3A0FA579-A86B-403C-BB7E-7C40FE7275E3}"/>
+          </ac:cxnSpMkLst>
+        </pc:cxnChg>
+        <pc:cxnChg chg="add del mod">
+          <ac:chgData name="Fatima Pillosu" userId="a6295d4dc9e22643" providerId="LiveId" clId="{169AF0B0-C29F-49D0-B18A-29148960D042}" dt="2024-10-15T13:44:55.190" v="153" actId="478"/>
+          <ac:cxnSpMkLst>
+            <pc:docMk/>
+            <pc:sldMk cId="3678187506" sldId="257"/>
+            <ac:cxnSpMk id="23" creationId="{45FAEEA4-3AD6-6555-8095-FD58585F4512}"/>
+          </ac:cxnSpMkLst>
+        </pc:cxnChg>
       </pc:sldChg>
     </pc:docChg>
   </pc:docChgLst>
@@ -1311,6 +1807,494 @@
             <ac:cxnSpMk id="90" creationId="{6BC775DB-29E5-8334-F642-4D662BBC5BEC}"/>
           </ac:cxnSpMkLst>
         </pc:cxnChg>
+      </pc:sldChg>
+    </pc:docChg>
+  </pc:docChgLst>
+  <pc:docChgLst>
+    <pc:chgData name="Fatima Pillosu" userId="a6295d4dc9e22643" providerId="LiveId" clId="{0756FD03-1706-4472-A4C9-E6951E3B5C4C}"/>
+    <pc:docChg chg="custSel modSld">
+      <pc:chgData name="Fatima Pillosu" userId="a6295d4dc9e22643" providerId="LiveId" clId="{0756FD03-1706-4472-A4C9-E6951E3B5C4C}" dt="2023-11-29T09:38:00.207" v="52" actId="1036"/>
+      <pc:docMkLst>
+        <pc:docMk/>
+      </pc:docMkLst>
+      <pc:sldChg chg="addSp delSp modSp mod">
+        <pc:chgData name="Fatima Pillosu" userId="a6295d4dc9e22643" providerId="LiveId" clId="{0756FD03-1706-4472-A4C9-E6951E3B5C4C}" dt="2023-11-29T09:38:00.207" v="52" actId="1036"/>
+        <pc:sldMkLst>
+          <pc:docMk/>
+          <pc:sldMk cId="1072346714" sldId="256"/>
+        </pc:sldMkLst>
+        <pc:spChg chg="del mod">
+          <ac:chgData name="Fatima Pillosu" userId="a6295d4dc9e22643" providerId="LiveId" clId="{0756FD03-1706-4472-A4C9-E6951E3B5C4C}" dt="2023-11-29T09:37:33.019" v="49" actId="21"/>
+          <ac:spMkLst>
+            <pc:docMk/>
+            <pc:sldMk cId="1072346714" sldId="256"/>
+            <ac:spMk id="26" creationId="{4D6BD6C7-6D5D-3367-95B6-7A5399D42A36}"/>
+          </ac:spMkLst>
+        </pc:spChg>
+        <pc:spChg chg="del mod">
+          <ac:chgData name="Fatima Pillosu" userId="a6295d4dc9e22643" providerId="LiveId" clId="{0756FD03-1706-4472-A4C9-E6951E3B5C4C}" dt="2023-11-29T09:37:33.019" v="49" actId="21"/>
+          <ac:spMkLst>
+            <pc:docMk/>
+            <pc:sldMk cId="1072346714" sldId="256"/>
+            <ac:spMk id="27" creationId="{33D724CA-F564-BB24-4C21-3B17DB159837}"/>
+          </ac:spMkLst>
+        </pc:spChg>
+        <pc:spChg chg="del mod">
+          <ac:chgData name="Fatima Pillosu" userId="a6295d4dc9e22643" providerId="LiveId" clId="{0756FD03-1706-4472-A4C9-E6951E3B5C4C}" dt="2023-11-29T09:37:33.019" v="49" actId="21"/>
+          <ac:spMkLst>
+            <pc:docMk/>
+            <pc:sldMk cId="1072346714" sldId="256"/>
+            <ac:spMk id="28" creationId="{FADEB154-1E14-E07E-AE86-1E1B57D9D799}"/>
+          </ac:spMkLst>
+        </pc:spChg>
+        <pc:spChg chg="del mod">
+          <ac:chgData name="Fatima Pillosu" userId="a6295d4dc9e22643" providerId="LiveId" clId="{0756FD03-1706-4472-A4C9-E6951E3B5C4C}" dt="2023-11-29T09:37:33.019" v="49" actId="21"/>
+          <ac:spMkLst>
+            <pc:docMk/>
+            <pc:sldMk cId="1072346714" sldId="256"/>
+            <ac:spMk id="29" creationId="{4D64AC32-9D89-42AB-CA47-4E37B5E9C371}"/>
+          </ac:spMkLst>
+        </pc:spChg>
+        <pc:spChg chg="del mod">
+          <ac:chgData name="Fatima Pillosu" userId="a6295d4dc9e22643" providerId="LiveId" clId="{0756FD03-1706-4472-A4C9-E6951E3B5C4C}" dt="2023-11-29T09:37:33.019" v="49" actId="21"/>
+          <ac:spMkLst>
+            <pc:docMk/>
+            <pc:sldMk cId="1072346714" sldId="256"/>
+            <ac:spMk id="30" creationId="{C0E4CF8B-2B7D-3A99-C2A0-B902715DC82D}"/>
+          </ac:spMkLst>
+        </pc:spChg>
+        <pc:spChg chg="del mod">
+          <ac:chgData name="Fatima Pillosu" userId="a6295d4dc9e22643" providerId="LiveId" clId="{0756FD03-1706-4472-A4C9-E6951E3B5C4C}" dt="2023-11-29T09:37:33.019" v="49" actId="21"/>
+          <ac:spMkLst>
+            <pc:docMk/>
+            <pc:sldMk cId="1072346714" sldId="256"/>
+            <ac:spMk id="34" creationId="{6A0CAB05-3A1A-545D-00E5-C520ADE2DE98}"/>
+          </ac:spMkLst>
+        </pc:spChg>
+        <pc:spChg chg="del mod">
+          <ac:chgData name="Fatima Pillosu" userId="a6295d4dc9e22643" providerId="LiveId" clId="{0756FD03-1706-4472-A4C9-E6951E3B5C4C}" dt="2023-11-29T09:37:33.019" v="49" actId="21"/>
+          <ac:spMkLst>
+            <pc:docMk/>
+            <pc:sldMk cId="1072346714" sldId="256"/>
+            <ac:spMk id="35" creationId="{DB0EAE5B-B91F-04EC-7FD5-6281E2FC4C6C}"/>
+          </ac:spMkLst>
+        </pc:spChg>
+        <pc:spChg chg="del mod">
+          <ac:chgData name="Fatima Pillosu" userId="a6295d4dc9e22643" providerId="LiveId" clId="{0756FD03-1706-4472-A4C9-E6951E3B5C4C}" dt="2023-11-29T09:37:33.019" v="49" actId="21"/>
+          <ac:spMkLst>
+            <pc:docMk/>
+            <pc:sldMk cId="1072346714" sldId="256"/>
+            <ac:spMk id="36" creationId="{5F68747B-853A-30C8-389E-AA4F4C616EC8}"/>
+          </ac:spMkLst>
+        </pc:spChg>
+        <pc:spChg chg="del mod">
+          <ac:chgData name="Fatima Pillosu" userId="a6295d4dc9e22643" providerId="LiveId" clId="{0756FD03-1706-4472-A4C9-E6951E3B5C4C}" dt="2023-11-29T09:37:33.019" v="49" actId="21"/>
+          <ac:spMkLst>
+            <pc:docMk/>
+            <pc:sldMk cId="1072346714" sldId="256"/>
+            <ac:spMk id="37" creationId="{C4FCC9A3-D86A-1A5F-B937-22E313A502C5}"/>
+          </ac:spMkLst>
+        </pc:spChg>
+        <pc:spChg chg="del mod">
+          <ac:chgData name="Fatima Pillosu" userId="a6295d4dc9e22643" providerId="LiveId" clId="{0756FD03-1706-4472-A4C9-E6951E3B5C4C}" dt="2023-11-29T09:37:33.019" v="49" actId="21"/>
+          <ac:spMkLst>
+            <pc:docMk/>
+            <pc:sldMk cId="1072346714" sldId="256"/>
+            <ac:spMk id="38" creationId="{1F0DCFE1-BA5A-8CF0-68A5-5AF9DF122315}"/>
+          </ac:spMkLst>
+        </pc:spChg>
+        <pc:spChg chg="del mod">
+          <ac:chgData name="Fatima Pillosu" userId="a6295d4dc9e22643" providerId="LiveId" clId="{0756FD03-1706-4472-A4C9-E6951E3B5C4C}" dt="2023-11-29T09:37:33.019" v="49" actId="21"/>
+          <ac:spMkLst>
+            <pc:docMk/>
+            <pc:sldMk cId="1072346714" sldId="256"/>
+            <ac:spMk id="39" creationId="{2E377314-5496-12AD-8BDF-90A42DD8E8F4}"/>
+          </ac:spMkLst>
+        </pc:spChg>
+        <pc:spChg chg="del mod">
+          <ac:chgData name="Fatima Pillosu" userId="a6295d4dc9e22643" providerId="LiveId" clId="{0756FD03-1706-4472-A4C9-E6951E3B5C4C}" dt="2023-11-29T09:37:33.019" v="49" actId="21"/>
+          <ac:spMkLst>
+            <pc:docMk/>
+            <pc:sldMk cId="1072346714" sldId="256"/>
+            <ac:spMk id="40" creationId="{B2A63B25-69CE-4281-940E-8AA360570CD0}"/>
+          </ac:spMkLst>
+        </pc:spChg>
+        <pc:spChg chg="del mod">
+          <ac:chgData name="Fatima Pillosu" userId="a6295d4dc9e22643" providerId="LiveId" clId="{0756FD03-1706-4472-A4C9-E6951E3B5C4C}" dt="2023-11-29T09:37:33.019" v="49" actId="21"/>
+          <ac:spMkLst>
+            <pc:docMk/>
+            <pc:sldMk cId="1072346714" sldId="256"/>
+            <ac:spMk id="41" creationId="{B7E954CF-847A-5202-4A7E-21E743CEE0EC}"/>
+          </ac:spMkLst>
+        </pc:spChg>
+        <pc:spChg chg="del mod">
+          <ac:chgData name="Fatima Pillosu" userId="a6295d4dc9e22643" providerId="LiveId" clId="{0756FD03-1706-4472-A4C9-E6951E3B5C4C}" dt="2023-11-29T09:37:33.019" v="49" actId="21"/>
+          <ac:spMkLst>
+            <pc:docMk/>
+            <pc:sldMk cId="1072346714" sldId="256"/>
+            <ac:spMk id="42" creationId="{A466677D-E070-FE73-93B9-CD8A8623DA35}"/>
+          </ac:spMkLst>
+        </pc:spChg>
+        <pc:spChg chg="del mod">
+          <ac:chgData name="Fatima Pillosu" userId="a6295d4dc9e22643" providerId="LiveId" clId="{0756FD03-1706-4472-A4C9-E6951E3B5C4C}" dt="2023-11-29T09:37:33.019" v="49" actId="21"/>
+          <ac:spMkLst>
+            <pc:docMk/>
+            <pc:sldMk cId="1072346714" sldId="256"/>
+            <ac:spMk id="43" creationId="{7743BAD9-1439-F899-912D-2D4812D5D5C8}"/>
+          </ac:spMkLst>
+        </pc:spChg>
+        <pc:spChg chg="del mod">
+          <ac:chgData name="Fatima Pillosu" userId="a6295d4dc9e22643" providerId="LiveId" clId="{0756FD03-1706-4472-A4C9-E6951E3B5C4C}" dt="2023-11-29T09:37:33.019" v="49" actId="21"/>
+          <ac:spMkLst>
+            <pc:docMk/>
+            <pc:sldMk cId="1072346714" sldId="256"/>
+            <ac:spMk id="44" creationId="{810A7679-63A0-270B-D9A3-1587B7A0592D}"/>
+          </ac:spMkLst>
+        </pc:spChg>
+        <pc:spChg chg="del mod">
+          <ac:chgData name="Fatima Pillosu" userId="a6295d4dc9e22643" providerId="LiveId" clId="{0756FD03-1706-4472-A4C9-E6951E3B5C4C}" dt="2023-11-29T09:37:33.019" v="49" actId="21"/>
+          <ac:spMkLst>
+            <pc:docMk/>
+            <pc:sldMk cId="1072346714" sldId="256"/>
+            <ac:spMk id="45" creationId="{BAE5F748-D858-F541-E783-B26433165740}"/>
+          </ac:spMkLst>
+        </pc:spChg>
+        <pc:spChg chg="del mod">
+          <ac:chgData name="Fatima Pillosu" userId="a6295d4dc9e22643" providerId="LiveId" clId="{0756FD03-1706-4472-A4C9-E6951E3B5C4C}" dt="2023-11-29T09:37:33.019" v="49" actId="21"/>
+          <ac:spMkLst>
+            <pc:docMk/>
+            <pc:sldMk cId="1072346714" sldId="256"/>
+            <ac:spMk id="46" creationId="{18FED8DD-8957-CF93-A4D5-2B74A0368F2E}"/>
+          </ac:spMkLst>
+        </pc:spChg>
+        <pc:spChg chg="del mod">
+          <ac:chgData name="Fatima Pillosu" userId="a6295d4dc9e22643" providerId="LiveId" clId="{0756FD03-1706-4472-A4C9-E6951E3B5C4C}" dt="2023-11-29T09:37:33.019" v="49" actId="21"/>
+          <ac:spMkLst>
+            <pc:docMk/>
+            <pc:sldMk cId="1072346714" sldId="256"/>
+            <ac:spMk id="47" creationId="{334882D8-1A9D-CC8A-06CF-488A793CF256}"/>
+          </ac:spMkLst>
+        </pc:spChg>
+        <pc:spChg chg="del mod">
+          <ac:chgData name="Fatima Pillosu" userId="a6295d4dc9e22643" providerId="LiveId" clId="{0756FD03-1706-4472-A4C9-E6951E3B5C4C}" dt="2023-11-29T09:37:33.019" v="49" actId="21"/>
+          <ac:spMkLst>
+            <pc:docMk/>
+            <pc:sldMk cId="1072346714" sldId="256"/>
+            <ac:spMk id="48" creationId="{F6A8E961-9243-0767-D3AA-AB18C84ADE56}"/>
+          </ac:spMkLst>
+        </pc:spChg>
+        <pc:spChg chg="del mod">
+          <ac:chgData name="Fatima Pillosu" userId="a6295d4dc9e22643" providerId="LiveId" clId="{0756FD03-1706-4472-A4C9-E6951E3B5C4C}" dt="2023-11-29T09:37:33.019" v="49" actId="21"/>
+          <ac:spMkLst>
+            <pc:docMk/>
+            <pc:sldMk cId="1072346714" sldId="256"/>
+            <ac:spMk id="49" creationId="{C4F5BF5B-44D1-F769-4A52-FEEA32A1D3C7}"/>
+          </ac:spMkLst>
+        </pc:spChg>
+        <pc:spChg chg="del mod">
+          <ac:chgData name="Fatima Pillosu" userId="a6295d4dc9e22643" providerId="LiveId" clId="{0756FD03-1706-4472-A4C9-E6951E3B5C4C}" dt="2023-11-29T09:37:33.019" v="49" actId="21"/>
+          <ac:spMkLst>
+            <pc:docMk/>
+            <pc:sldMk cId="1072346714" sldId="256"/>
+            <ac:spMk id="50" creationId="{766938A5-4E33-9EEA-7BC6-2645316AC3A4}"/>
+          </ac:spMkLst>
+        </pc:spChg>
+        <pc:spChg chg="del mod">
+          <ac:chgData name="Fatima Pillosu" userId="a6295d4dc9e22643" providerId="LiveId" clId="{0756FD03-1706-4472-A4C9-E6951E3B5C4C}" dt="2023-11-29T09:37:33.019" v="49" actId="21"/>
+          <ac:spMkLst>
+            <pc:docMk/>
+            <pc:sldMk cId="1072346714" sldId="256"/>
+            <ac:spMk id="51" creationId="{676F60C1-93DC-03F5-E632-0CE4750575A4}"/>
+          </ac:spMkLst>
+        </pc:spChg>
+        <pc:spChg chg="add del">
+          <ac:chgData name="Fatima Pillosu" userId="a6295d4dc9e22643" providerId="LiveId" clId="{0756FD03-1706-4472-A4C9-E6951E3B5C4C}" dt="2023-11-29T09:37:20.464" v="48" actId="478"/>
+          <ac:spMkLst>
+            <pc:docMk/>
+            <pc:sldMk cId="1072346714" sldId="256"/>
+            <ac:spMk id="52" creationId="{68B7249F-6B7F-8463-BFAB-6DF1A571F792}"/>
+          </ac:spMkLst>
+        </pc:spChg>
+        <pc:spChg chg="add mod">
+          <ac:chgData name="Fatima Pillosu" userId="a6295d4dc9e22643" providerId="LiveId" clId="{0756FD03-1706-4472-A4C9-E6951E3B5C4C}" dt="2023-11-29T09:37:54.207" v="50"/>
+          <ac:spMkLst>
+            <pc:docMk/>
+            <pc:sldMk cId="1072346714" sldId="256"/>
+            <ac:spMk id="57" creationId="{62474F9B-9549-98F4-5E8F-BBEAC7016D7F}"/>
+          </ac:spMkLst>
+        </pc:spChg>
+        <pc:spChg chg="add mod">
+          <ac:chgData name="Fatima Pillosu" userId="a6295d4dc9e22643" providerId="LiveId" clId="{0756FD03-1706-4472-A4C9-E6951E3B5C4C}" dt="2023-11-29T09:37:54.207" v="50"/>
+          <ac:spMkLst>
+            <pc:docMk/>
+            <pc:sldMk cId="1072346714" sldId="256"/>
+            <ac:spMk id="58" creationId="{230FF514-E474-F3B0-E4CA-E17B20299031}"/>
+          </ac:spMkLst>
+        </pc:spChg>
+        <pc:spChg chg="add mod">
+          <ac:chgData name="Fatima Pillosu" userId="a6295d4dc9e22643" providerId="LiveId" clId="{0756FD03-1706-4472-A4C9-E6951E3B5C4C}" dt="2023-11-29T09:37:54.207" v="50"/>
+          <ac:spMkLst>
+            <pc:docMk/>
+            <pc:sldMk cId="1072346714" sldId="256"/>
+            <ac:spMk id="59" creationId="{60EFB212-C205-78DB-7709-6791A8193261}"/>
+          </ac:spMkLst>
+        </pc:spChg>
+        <pc:spChg chg="add mod">
+          <ac:chgData name="Fatima Pillosu" userId="a6295d4dc9e22643" providerId="LiveId" clId="{0756FD03-1706-4472-A4C9-E6951E3B5C4C}" dt="2023-11-29T09:37:54.207" v="50"/>
+          <ac:spMkLst>
+            <pc:docMk/>
+            <pc:sldMk cId="1072346714" sldId="256"/>
+            <ac:spMk id="60" creationId="{7376B85B-917A-079A-5132-DEDB5C5E7834}"/>
+          </ac:spMkLst>
+        </pc:spChg>
+        <pc:spChg chg="add mod">
+          <ac:chgData name="Fatima Pillosu" userId="a6295d4dc9e22643" providerId="LiveId" clId="{0756FD03-1706-4472-A4C9-E6951E3B5C4C}" dt="2023-11-29T09:38:00.207" v="52" actId="1036"/>
+          <ac:spMkLst>
+            <pc:docMk/>
+            <pc:sldMk cId="1072346714" sldId="256"/>
+            <ac:spMk id="61" creationId="{A9ADF02B-2B10-FE58-83FB-270E1B72F374}"/>
+          </ac:spMkLst>
+        </pc:spChg>
+        <pc:spChg chg="mod">
+          <ac:chgData name="Fatima Pillosu" userId="a6295d4dc9e22643" providerId="LiveId" clId="{0756FD03-1706-4472-A4C9-E6951E3B5C4C}" dt="2023-11-29T09:37:54.207" v="50"/>
+          <ac:spMkLst>
+            <pc:docMk/>
+            <pc:sldMk cId="1072346714" sldId="256"/>
+            <ac:spMk id="64" creationId="{21139AFA-61F8-7687-C77E-BFDBF491ED17}"/>
+          </ac:spMkLst>
+        </pc:spChg>
+        <pc:spChg chg="add mod">
+          <ac:chgData name="Fatima Pillosu" userId="a6295d4dc9e22643" providerId="LiveId" clId="{0756FD03-1706-4472-A4C9-E6951E3B5C4C}" dt="2023-11-29T09:37:54.207" v="50"/>
+          <ac:spMkLst>
+            <pc:docMk/>
+            <pc:sldMk cId="1072346714" sldId="256"/>
+            <ac:spMk id="65" creationId="{C3AB6EEE-A212-6219-4457-D0464EB0CCAE}"/>
+          </ac:spMkLst>
+        </pc:spChg>
+        <pc:spChg chg="add mod">
+          <ac:chgData name="Fatima Pillosu" userId="a6295d4dc9e22643" providerId="LiveId" clId="{0756FD03-1706-4472-A4C9-E6951E3B5C4C}" dt="2023-11-29T09:37:54.207" v="50"/>
+          <ac:spMkLst>
+            <pc:docMk/>
+            <pc:sldMk cId="1072346714" sldId="256"/>
+            <ac:spMk id="66" creationId="{28F2E26B-47E5-8BA5-47B6-5E6D88369717}"/>
+          </ac:spMkLst>
+        </pc:spChg>
+        <pc:spChg chg="add mod">
+          <ac:chgData name="Fatima Pillosu" userId="a6295d4dc9e22643" providerId="LiveId" clId="{0756FD03-1706-4472-A4C9-E6951E3B5C4C}" dt="2023-11-29T09:37:54.207" v="50"/>
+          <ac:spMkLst>
+            <pc:docMk/>
+            <pc:sldMk cId="1072346714" sldId="256"/>
+            <ac:spMk id="67" creationId="{DB00622D-EFA4-873C-60A9-8D8057632DA8}"/>
+          </ac:spMkLst>
+        </pc:spChg>
+        <pc:spChg chg="add mod">
+          <ac:chgData name="Fatima Pillosu" userId="a6295d4dc9e22643" providerId="LiveId" clId="{0756FD03-1706-4472-A4C9-E6951E3B5C4C}" dt="2023-11-29T09:37:54.207" v="50"/>
+          <ac:spMkLst>
+            <pc:docMk/>
+            <pc:sldMk cId="1072346714" sldId="256"/>
+            <ac:spMk id="68" creationId="{4DC2DACD-FD0F-3B6F-1271-24B1715E8415}"/>
+          </ac:spMkLst>
+        </pc:spChg>
+        <pc:spChg chg="add mod">
+          <ac:chgData name="Fatima Pillosu" userId="a6295d4dc9e22643" providerId="LiveId" clId="{0756FD03-1706-4472-A4C9-E6951E3B5C4C}" dt="2023-11-29T09:37:54.207" v="50"/>
+          <ac:spMkLst>
+            <pc:docMk/>
+            <pc:sldMk cId="1072346714" sldId="256"/>
+            <ac:spMk id="69" creationId="{3D7E1B29-F647-CFAB-E0D7-3C9F7A2144FC}"/>
+          </ac:spMkLst>
+        </pc:spChg>
+        <pc:spChg chg="add mod">
+          <ac:chgData name="Fatima Pillosu" userId="a6295d4dc9e22643" providerId="LiveId" clId="{0756FD03-1706-4472-A4C9-E6951E3B5C4C}" dt="2023-11-29T09:37:54.207" v="50"/>
+          <ac:spMkLst>
+            <pc:docMk/>
+            <pc:sldMk cId="1072346714" sldId="256"/>
+            <ac:spMk id="70" creationId="{CB0F925A-BE4F-BA21-B616-81D1EE21A5D3}"/>
+          </ac:spMkLst>
+        </pc:spChg>
+        <pc:spChg chg="add mod">
+          <ac:chgData name="Fatima Pillosu" userId="a6295d4dc9e22643" providerId="LiveId" clId="{0756FD03-1706-4472-A4C9-E6951E3B5C4C}" dt="2023-11-29T09:37:54.207" v="50"/>
+          <ac:spMkLst>
+            <pc:docMk/>
+            <pc:sldMk cId="1072346714" sldId="256"/>
+            <ac:spMk id="71" creationId="{87594D03-4FC2-F597-40DD-0BC8E77ADAB0}"/>
+          </ac:spMkLst>
+        </pc:spChg>
+        <pc:spChg chg="add mod">
+          <ac:chgData name="Fatima Pillosu" userId="a6295d4dc9e22643" providerId="LiveId" clId="{0756FD03-1706-4472-A4C9-E6951E3B5C4C}" dt="2023-11-29T09:37:54.207" v="50"/>
+          <ac:spMkLst>
+            <pc:docMk/>
+            <pc:sldMk cId="1072346714" sldId="256"/>
+            <ac:spMk id="72" creationId="{B4A9E0F8-A058-E30E-B39A-661259D970B7}"/>
+          </ac:spMkLst>
+        </pc:spChg>
+        <pc:spChg chg="add mod">
+          <ac:chgData name="Fatima Pillosu" userId="a6295d4dc9e22643" providerId="LiveId" clId="{0756FD03-1706-4472-A4C9-E6951E3B5C4C}" dt="2023-11-29T09:37:54.207" v="50"/>
+          <ac:spMkLst>
+            <pc:docMk/>
+            <pc:sldMk cId="1072346714" sldId="256"/>
+            <ac:spMk id="73" creationId="{CB9643F3-7AEE-4154-7560-89FF50440D39}"/>
+          </ac:spMkLst>
+        </pc:spChg>
+        <pc:spChg chg="add mod">
+          <ac:chgData name="Fatima Pillosu" userId="a6295d4dc9e22643" providerId="LiveId" clId="{0756FD03-1706-4472-A4C9-E6951E3B5C4C}" dt="2023-11-29T09:37:54.207" v="50"/>
+          <ac:spMkLst>
+            <pc:docMk/>
+            <pc:sldMk cId="1072346714" sldId="256"/>
+            <ac:spMk id="74" creationId="{DC3ED00A-8225-F3DF-6AFC-3E3B416AF7A2}"/>
+          </ac:spMkLst>
+        </pc:spChg>
+        <pc:spChg chg="add mod">
+          <ac:chgData name="Fatima Pillosu" userId="a6295d4dc9e22643" providerId="LiveId" clId="{0756FD03-1706-4472-A4C9-E6951E3B5C4C}" dt="2023-11-29T09:37:54.207" v="50"/>
+          <ac:spMkLst>
+            <pc:docMk/>
+            <pc:sldMk cId="1072346714" sldId="256"/>
+            <ac:spMk id="75" creationId="{93DD7934-4D1F-203F-115A-8CD30267714B}"/>
+          </ac:spMkLst>
+        </pc:spChg>
+        <pc:spChg chg="add mod">
+          <ac:chgData name="Fatima Pillosu" userId="a6295d4dc9e22643" providerId="LiveId" clId="{0756FD03-1706-4472-A4C9-E6951E3B5C4C}" dt="2023-11-29T09:37:54.207" v="50"/>
+          <ac:spMkLst>
+            <pc:docMk/>
+            <pc:sldMk cId="1072346714" sldId="256"/>
+            <ac:spMk id="76" creationId="{E612E97C-EBA3-3FE1-2037-0B88C943A875}"/>
+          </ac:spMkLst>
+        </pc:spChg>
+        <pc:spChg chg="add mod">
+          <ac:chgData name="Fatima Pillosu" userId="a6295d4dc9e22643" providerId="LiveId" clId="{0756FD03-1706-4472-A4C9-E6951E3B5C4C}" dt="2023-11-29T09:37:54.207" v="50"/>
+          <ac:spMkLst>
+            <pc:docMk/>
+            <pc:sldMk cId="1072346714" sldId="256"/>
+            <ac:spMk id="77" creationId="{F7686D95-1D1B-55FE-328A-3A54FDE4131B}"/>
+          </ac:spMkLst>
+        </pc:spChg>
+        <pc:spChg chg="add mod">
+          <ac:chgData name="Fatima Pillosu" userId="a6295d4dc9e22643" providerId="LiveId" clId="{0756FD03-1706-4472-A4C9-E6951E3B5C4C}" dt="2023-11-29T09:37:54.207" v="50"/>
+          <ac:spMkLst>
+            <pc:docMk/>
+            <pc:sldMk cId="1072346714" sldId="256"/>
+            <ac:spMk id="78" creationId="{76399EE0-F8AF-AE62-22B7-3A25E5005060}"/>
+          </ac:spMkLst>
+        </pc:spChg>
+        <pc:spChg chg="add mod">
+          <ac:chgData name="Fatima Pillosu" userId="a6295d4dc9e22643" providerId="LiveId" clId="{0756FD03-1706-4472-A4C9-E6951E3B5C4C}" dt="2023-11-29T09:37:54.207" v="50"/>
+          <ac:spMkLst>
+            <pc:docMk/>
+            <pc:sldMk cId="1072346714" sldId="256"/>
+            <ac:spMk id="79" creationId="{38AC4AC0-A304-DFA2-F0FA-E536DBD37F81}"/>
+          </ac:spMkLst>
+        </pc:spChg>
+        <pc:spChg chg="add mod">
+          <ac:chgData name="Fatima Pillosu" userId="a6295d4dc9e22643" providerId="LiveId" clId="{0756FD03-1706-4472-A4C9-E6951E3B5C4C}" dt="2023-11-29T09:37:54.207" v="50"/>
+          <ac:spMkLst>
+            <pc:docMk/>
+            <pc:sldMk cId="1072346714" sldId="256"/>
+            <ac:spMk id="80" creationId="{5AD677FE-FC0E-E649-098B-C7FB7F847778}"/>
+          </ac:spMkLst>
+        </pc:spChg>
+        <pc:spChg chg="add mod">
+          <ac:chgData name="Fatima Pillosu" userId="a6295d4dc9e22643" providerId="LiveId" clId="{0756FD03-1706-4472-A4C9-E6951E3B5C4C}" dt="2023-11-29T09:37:54.207" v="50"/>
+          <ac:spMkLst>
+            <pc:docMk/>
+            <pc:sldMk cId="1072346714" sldId="256"/>
+            <ac:spMk id="81" creationId="{FDD119F1-B8C4-D451-4D83-B8285C2FADE4}"/>
+          </ac:spMkLst>
+        </pc:spChg>
+        <pc:spChg chg="add mod">
+          <ac:chgData name="Fatima Pillosu" userId="a6295d4dc9e22643" providerId="LiveId" clId="{0756FD03-1706-4472-A4C9-E6951E3B5C4C}" dt="2023-11-29T09:37:54.207" v="50"/>
+          <ac:spMkLst>
+            <pc:docMk/>
+            <pc:sldMk cId="1072346714" sldId="256"/>
+            <ac:spMk id="82" creationId="{A86C750C-FB98-9351-A067-610D39232C45}"/>
+          </ac:spMkLst>
+        </pc:spChg>
+        <pc:grpChg chg="del mod">
+          <ac:chgData name="Fatima Pillosu" userId="a6295d4dc9e22643" providerId="LiveId" clId="{0756FD03-1706-4472-A4C9-E6951E3B5C4C}" dt="2023-11-29T09:37:33.019" v="49" actId="21"/>
+          <ac:grpSpMkLst>
+            <pc:docMk/>
+            <pc:sldMk cId="1072346714" sldId="256"/>
+            <ac:grpSpMk id="31" creationId="{C99970EB-0759-371E-60E8-38F5FEFC5971}"/>
+          </ac:grpSpMkLst>
+        </pc:grpChg>
+        <pc:grpChg chg="add mod">
+          <ac:chgData name="Fatima Pillosu" userId="a6295d4dc9e22643" providerId="LiveId" clId="{0756FD03-1706-4472-A4C9-E6951E3B5C4C}" dt="2023-11-29T09:37:54.207" v="50"/>
+          <ac:grpSpMkLst>
+            <pc:docMk/>
+            <pc:sldMk cId="1072346714" sldId="256"/>
+            <ac:grpSpMk id="62" creationId="{610E7790-8E02-B443-1264-38F59A3D3E2B}"/>
+          </ac:grpSpMkLst>
+        </pc:grpChg>
+        <pc:picChg chg="del mod">
+          <ac:chgData name="Fatima Pillosu" userId="a6295d4dc9e22643" providerId="LiveId" clId="{0756FD03-1706-4472-A4C9-E6951E3B5C4C}" dt="2023-11-29T09:37:33.019" v="49" actId="21"/>
+          <ac:picMkLst>
+            <pc:docMk/>
+            <pc:sldMk cId="1072346714" sldId="256"/>
+            <ac:picMk id="22" creationId="{671F6A74-7242-B4F8-81C5-EB111E195B51}"/>
+          </ac:picMkLst>
+        </pc:picChg>
+        <pc:picChg chg="del mod">
+          <ac:chgData name="Fatima Pillosu" userId="a6295d4dc9e22643" providerId="LiveId" clId="{0756FD03-1706-4472-A4C9-E6951E3B5C4C}" dt="2023-11-29T09:37:33.019" v="49" actId="21"/>
+          <ac:picMkLst>
+            <pc:docMk/>
+            <pc:sldMk cId="1072346714" sldId="256"/>
+            <ac:picMk id="23" creationId="{1AE1E841-1645-BFD3-3EE5-C8880A8F1C4F}"/>
+          </ac:picMkLst>
+        </pc:picChg>
+        <pc:picChg chg="del mod">
+          <ac:chgData name="Fatima Pillosu" userId="a6295d4dc9e22643" providerId="LiveId" clId="{0756FD03-1706-4472-A4C9-E6951E3B5C4C}" dt="2023-11-29T09:37:33.019" v="49" actId="21"/>
+          <ac:picMkLst>
+            <pc:docMk/>
+            <pc:sldMk cId="1072346714" sldId="256"/>
+            <ac:picMk id="24" creationId="{C33C068E-1BBA-5EF5-F3D2-8D0CFC725CBD}"/>
+          </ac:picMkLst>
+        </pc:picChg>
+        <pc:picChg chg="del mod">
+          <ac:chgData name="Fatima Pillosu" userId="a6295d4dc9e22643" providerId="LiveId" clId="{0756FD03-1706-4472-A4C9-E6951E3B5C4C}" dt="2023-11-29T09:37:33.019" v="49" actId="21"/>
+          <ac:picMkLst>
+            <pc:docMk/>
+            <pc:sldMk cId="1072346714" sldId="256"/>
+            <ac:picMk id="25" creationId="{BDFA06AF-5E33-11D6-CFA8-257E7EAE5711}"/>
+          </ac:picMkLst>
+        </pc:picChg>
+        <pc:picChg chg="add mod">
+          <ac:chgData name="Fatima Pillosu" userId="a6295d4dc9e22643" providerId="LiveId" clId="{0756FD03-1706-4472-A4C9-E6951E3B5C4C}" dt="2023-11-29T09:37:54.207" v="50"/>
+          <ac:picMkLst>
+            <pc:docMk/>
+            <pc:sldMk cId="1072346714" sldId="256"/>
+            <ac:picMk id="53" creationId="{C1A28376-AEBE-2CB6-3202-C9AB2EB83169}"/>
+          </ac:picMkLst>
+        </pc:picChg>
+        <pc:picChg chg="add mod">
+          <ac:chgData name="Fatima Pillosu" userId="a6295d4dc9e22643" providerId="LiveId" clId="{0756FD03-1706-4472-A4C9-E6951E3B5C4C}" dt="2023-11-29T09:37:54.207" v="50"/>
+          <ac:picMkLst>
+            <pc:docMk/>
+            <pc:sldMk cId="1072346714" sldId="256"/>
+            <ac:picMk id="54" creationId="{D231E065-ED8C-1E5A-E34B-9EF2993E163D}"/>
+          </ac:picMkLst>
+        </pc:picChg>
+        <pc:picChg chg="add mod">
+          <ac:chgData name="Fatima Pillosu" userId="a6295d4dc9e22643" providerId="LiveId" clId="{0756FD03-1706-4472-A4C9-E6951E3B5C4C}" dt="2023-11-29T09:37:54.207" v="50"/>
+          <ac:picMkLst>
+            <pc:docMk/>
+            <pc:sldMk cId="1072346714" sldId="256"/>
+            <ac:picMk id="55" creationId="{1C20D923-F680-860A-8430-00CFCD2244D4}"/>
+          </ac:picMkLst>
+        </pc:picChg>
+        <pc:picChg chg="add mod">
+          <ac:chgData name="Fatima Pillosu" userId="a6295d4dc9e22643" providerId="LiveId" clId="{0756FD03-1706-4472-A4C9-E6951E3B5C4C}" dt="2023-11-29T09:37:54.207" v="50"/>
+          <ac:picMkLst>
+            <pc:docMk/>
+            <pc:sldMk cId="1072346714" sldId="256"/>
+            <ac:picMk id="56" creationId="{F3233E7D-C036-A735-6A90-2B99E9642804}"/>
+          </ac:picMkLst>
+        </pc:picChg>
+        <pc:picChg chg="mod">
+          <ac:chgData name="Fatima Pillosu" userId="a6295d4dc9e22643" providerId="LiveId" clId="{0756FD03-1706-4472-A4C9-E6951E3B5C4C}" dt="2023-11-29T09:37:54.207" v="50"/>
+          <ac:picMkLst>
+            <pc:docMk/>
+            <pc:sldMk cId="1072346714" sldId="256"/>
+            <ac:picMk id="63" creationId="{9D6B798F-5A41-F5C5-8448-FECDF45F68EE}"/>
+          </ac:picMkLst>
+        </pc:picChg>
       </pc:sldChg>
     </pc:docChg>
   </pc:docChgLst>
@@ -1346,15 +2330,15 @@
         </p:nvSpPr>
         <p:spPr>
           <a:xfrm>
-            <a:off x="823516" y="636266"/>
-            <a:ext cx="4941094" cy="1353526"/>
+            <a:off x="477917" y="1575985"/>
+            <a:ext cx="5416391" cy="3352588"/>
           </a:xfrm>
         </p:spPr>
         <p:txBody>
           <a:bodyPr anchor="b"/>
           <a:lstStyle>
             <a:lvl1pPr algn="ctr">
-              <a:defRPr sz="3242"/>
+              <a:defRPr sz="4181"/>
             </a:lvl1pPr>
           </a:lstStyle>
           <a:p>
@@ -1378,8 +2362,8 @@
         </p:nvSpPr>
         <p:spPr>
           <a:xfrm>
-            <a:off x="823516" y="2041989"/>
-            <a:ext cx="4941094" cy="938649"/>
+            <a:off x="796528" y="5057862"/>
+            <a:ext cx="4779169" cy="2324966"/>
           </a:xfrm>
         </p:spPr>
         <p:txBody>
@@ -1387,39 +2371,39 @@
           <a:lstStyle>
             <a:lvl1pPr marL="0" indent="0" algn="ctr">
               <a:buNone/>
-              <a:defRPr sz="1297"/>
+              <a:defRPr sz="1673"/>
             </a:lvl1pPr>
-            <a:lvl2pPr marL="247071" indent="0" algn="ctr">
+            <a:lvl2pPr marL="318623" indent="0" algn="ctr">
               <a:buNone/>
-              <a:defRPr sz="1081"/>
+              <a:defRPr sz="1394"/>
             </a:lvl2pPr>
-            <a:lvl3pPr marL="494142" indent="0" algn="ctr">
+            <a:lvl3pPr marL="637245" indent="0" algn="ctr">
               <a:buNone/>
-              <a:defRPr sz="973"/>
+              <a:defRPr sz="1254"/>
             </a:lvl3pPr>
-            <a:lvl4pPr marL="741213" indent="0" algn="ctr">
+            <a:lvl4pPr marL="955868" indent="0" algn="ctr">
               <a:buNone/>
-              <a:defRPr sz="865"/>
+              <a:defRPr sz="1115"/>
             </a:lvl4pPr>
-            <a:lvl5pPr marL="988284" indent="0" algn="ctr">
+            <a:lvl5pPr marL="1274491" indent="0" algn="ctr">
               <a:buNone/>
-              <a:defRPr sz="865"/>
+              <a:defRPr sz="1115"/>
             </a:lvl5pPr>
-            <a:lvl6pPr marL="1235354" indent="0" algn="ctr">
+            <a:lvl6pPr marL="1593113" indent="0" algn="ctr">
               <a:buNone/>
-              <a:defRPr sz="865"/>
+              <a:defRPr sz="1115"/>
             </a:lvl6pPr>
-            <a:lvl7pPr marL="1482425" indent="0" algn="ctr">
+            <a:lvl7pPr marL="1911736" indent="0" algn="ctr">
               <a:buNone/>
-              <a:defRPr sz="865"/>
+              <a:defRPr sz="1115"/>
             </a:lvl7pPr>
-            <a:lvl8pPr marL="1729496" indent="0" algn="ctr">
+            <a:lvl8pPr marL="2230359" indent="0" algn="ctr">
               <a:buNone/>
-              <a:defRPr sz="865"/>
+              <a:defRPr sz="1115"/>
             </a:lvl8pPr>
-            <a:lvl9pPr marL="1976567" indent="0" algn="ctr">
+            <a:lvl9pPr marL="2548981" indent="0" algn="ctr">
               <a:buNone/>
-              <a:defRPr sz="865"/>
+              <a:defRPr sz="1115"/>
             </a:lvl9pPr>
           </a:lstStyle>
           <a:p>
@@ -1448,7 +2432,7 @@
           <a:p>
             <a:fld id="{7058D181-6ACD-4703-8678-938650DF8C40}" type="datetimeFigureOut">
               <a:rPr lang="en-GB" smtClean="0"/>
-              <a:t>28/12/2023</a:t>
+              <a:t>15/10/2024</a:t>
             </a:fld>
             <a:endParaRPr lang="en-GB"/>
           </a:p>
@@ -1499,7 +2483,7 @@
     </p:spTree>
     <p:extLst>
       <p:ext uri="{BB962C8B-B14F-4D97-AF65-F5344CB8AC3E}">
-        <p14:creationId xmlns:p14="http://schemas.microsoft.com/office/powerpoint/2010/main" val="1688599986"/>
+        <p14:creationId xmlns:p14="http://schemas.microsoft.com/office/powerpoint/2010/main" val="2766739167"/>
       </p:ext>
     </p:extLst>
   </p:cSld>
@@ -1618,7 +2602,7 @@
           <a:p>
             <a:fld id="{7058D181-6ACD-4703-8678-938650DF8C40}" type="datetimeFigureOut">
               <a:rPr lang="en-GB" smtClean="0"/>
-              <a:t>28/12/2023</a:t>
+              <a:t>15/10/2024</a:t>
             </a:fld>
             <a:endParaRPr lang="en-GB"/>
           </a:p>
@@ -1669,7 +2653,7 @@
     </p:spTree>
     <p:extLst>
       <p:ext uri="{BB962C8B-B14F-4D97-AF65-F5344CB8AC3E}">
-        <p14:creationId xmlns:p14="http://schemas.microsoft.com/office/powerpoint/2010/main" val="2844846295"/>
+        <p14:creationId xmlns:p14="http://schemas.microsoft.com/office/powerpoint/2010/main" val="3417572971"/>
       </p:ext>
     </p:extLst>
   </p:cSld>
@@ -1708,8 +2692,8 @@
         </p:nvSpPr>
         <p:spPr>
           <a:xfrm>
-            <a:off x="4714627" y="206989"/>
-            <a:ext cx="1420564" cy="3294721"/>
+            <a:off x="4560124" y="512696"/>
+            <a:ext cx="1374011" cy="8160789"/>
           </a:xfrm>
         </p:spPr>
         <p:txBody>
@@ -1736,8 +2720,8 @@
         </p:nvSpPr>
         <p:spPr>
           <a:xfrm>
-            <a:off x="452933" y="206989"/>
-            <a:ext cx="4179342" cy="3294721"/>
+            <a:off x="438091" y="512696"/>
+            <a:ext cx="4042380" cy="8160789"/>
           </a:xfrm>
         </p:spPr>
         <p:txBody>
@@ -1798,7 +2782,7 @@
           <a:p>
             <a:fld id="{7058D181-6ACD-4703-8678-938650DF8C40}" type="datetimeFigureOut">
               <a:rPr lang="en-GB" smtClean="0"/>
-              <a:t>28/12/2023</a:t>
+              <a:t>15/10/2024</a:t>
             </a:fld>
             <a:endParaRPr lang="en-GB"/>
           </a:p>
@@ -1849,7 +2833,7 @@
     </p:spTree>
     <p:extLst>
       <p:ext uri="{BB962C8B-B14F-4D97-AF65-F5344CB8AC3E}">
-        <p14:creationId xmlns:p14="http://schemas.microsoft.com/office/powerpoint/2010/main" val="53501426"/>
+        <p14:creationId xmlns:p14="http://schemas.microsoft.com/office/powerpoint/2010/main" val="2464247909"/>
       </p:ext>
     </p:extLst>
   </p:cSld>
@@ -1968,7 +2952,7 @@
           <a:p>
             <a:fld id="{7058D181-6ACD-4703-8678-938650DF8C40}" type="datetimeFigureOut">
               <a:rPr lang="en-GB" smtClean="0"/>
-              <a:t>28/12/2023</a:t>
+              <a:t>15/10/2024</a:t>
             </a:fld>
             <a:endParaRPr lang="en-GB"/>
           </a:p>
@@ -2019,7 +3003,7 @@
     </p:spTree>
     <p:extLst>
       <p:ext uri="{BB962C8B-B14F-4D97-AF65-F5344CB8AC3E}">
-        <p14:creationId xmlns:p14="http://schemas.microsoft.com/office/powerpoint/2010/main" val="1209427771"/>
+        <p14:creationId xmlns:p14="http://schemas.microsoft.com/office/powerpoint/2010/main" val="3073235807"/>
       </p:ext>
     </p:extLst>
   </p:cSld>
@@ -2058,15 +3042,15 @@
         </p:nvSpPr>
         <p:spPr>
           <a:xfrm>
-            <a:off x="449502" y="969247"/>
-            <a:ext cx="5682258" cy="1617212"/>
+            <a:off x="434772" y="2400759"/>
+            <a:ext cx="5496044" cy="4005718"/>
           </a:xfrm>
         </p:spPr>
         <p:txBody>
           <a:bodyPr anchor="b"/>
           <a:lstStyle>
             <a:lvl1pPr>
-              <a:defRPr sz="3242"/>
+              <a:defRPr sz="4181"/>
             </a:lvl1pPr>
           </a:lstStyle>
           <a:p>
@@ -2090,8 +3074,8 @@
         </p:nvSpPr>
         <p:spPr>
           <a:xfrm>
-            <a:off x="449502" y="2601759"/>
-            <a:ext cx="5682258" cy="850453"/>
+            <a:off x="434772" y="6444373"/>
+            <a:ext cx="5496044" cy="2106513"/>
           </a:xfrm>
         </p:spPr>
         <p:txBody>
@@ -2099,17 +3083,15 @@
           <a:lstStyle>
             <a:lvl1pPr marL="0" indent="0">
               <a:buNone/>
-              <a:defRPr sz="1297">
+              <a:defRPr sz="1673">
                 <a:solidFill>
-                  <a:schemeClr val="tx1">
-                    <a:tint val="75000"/>
-                  </a:schemeClr>
+                  <a:schemeClr val="tx1"/>
                 </a:solidFill>
               </a:defRPr>
             </a:lvl1pPr>
-            <a:lvl2pPr marL="247071" indent="0">
+            <a:lvl2pPr marL="318623" indent="0">
               <a:buNone/>
-              <a:defRPr sz="1081">
+              <a:defRPr sz="1394">
                 <a:solidFill>
                   <a:schemeClr val="tx1">
                     <a:tint val="75000"/>
@@ -2117,9 +3099,9 @@
                 </a:solidFill>
               </a:defRPr>
             </a:lvl2pPr>
-            <a:lvl3pPr marL="494142" indent="0">
+            <a:lvl3pPr marL="637245" indent="0">
               <a:buNone/>
-              <a:defRPr sz="973">
+              <a:defRPr sz="1254">
                 <a:solidFill>
                   <a:schemeClr val="tx1">
                     <a:tint val="75000"/>
@@ -2127,9 +3109,9 @@
                 </a:solidFill>
               </a:defRPr>
             </a:lvl3pPr>
-            <a:lvl4pPr marL="741213" indent="0">
+            <a:lvl4pPr marL="955868" indent="0">
               <a:buNone/>
-              <a:defRPr sz="865">
+              <a:defRPr sz="1115">
                 <a:solidFill>
                   <a:schemeClr val="tx1">
                     <a:tint val="75000"/>
@@ -2137,9 +3119,9 @@
                 </a:solidFill>
               </a:defRPr>
             </a:lvl4pPr>
-            <a:lvl5pPr marL="988284" indent="0">
+            <a:lvl5pPr marL="1274491" indent="0">
               <a:buNone/>
-              <a:defRPr sz="865">
+              <a:defRPr sz="1115">
                 <a:solidFill>
                   <a:schemeClr val="tx1">
                     <a:tint val="75000"/>
@@ -2147,9 +3129,9 @@
                 </a:solidFill>
               </a:defRPr>
             </a:lvl5pPr>
-            <a:lvl6pPr marL="1235354" indent="0">
+            <a:lvl6pPr marL="1593113" indent="0">
               <a:buNone/>
-              <a:defRPr sz="865">
+              <a:defRPr sz="1115">
                 <a:solidFill>
                   <a:schemeClr val="tx1">
                     <a:tint val="75000"/>
@@ -2157,9 +3139,9 @@
                 </a:solidFill>
               </a:defRPr>
             </a:lvl6pPr>
-            <a:lvl7pPr marL="1482425" indent="0">
+            <a:lvl7pPr marL="1911736" indent="0">
               <a:buNone/>
-              <a:defRPr sz="865">
+              <a:defRPr sz="1115">
                 <a:solidFill>
                   <a:schemeClr val="tx1">
                     <a:tint val="75000"/>
@@ -2167,9 +3149,9 @@
                 </a:solidFill>
               </a:defRPr>
             </a:lvl7pPr>
-            <a:lvl8pPr marL="1729496" indent="0">
+            <a:lvl8pPr marL="2230359" indent="0">
               <a:buNone/>
-              <a:defRPr sz="865">
+              <a:defRPr sz="1115">
                 <a:solidFill>
                   <a:schemeClr val="tx1">
                     <a:tint val="75000"/>
@@ -2177,9 +3159,9 @@
                 </a:solidFill>
               </a:defRPr>
             </a:lvl8pPr>
-            <a:lvl9pPr marL="1976567" indent="0">
+            <a:lvl9pPr marL="2548981" indent="0">
               <a:buNone/>
-              <a:defRPr sz="865">
+              <a:defRPr sz="1115">
                 <a:solidFill>
                   <a:schemeClr val="tx1">
                     <a:tint val="75000"/>
@@ -2214,7 +3196,7 @@
           <a:p>
             <a:fld id="{7058D181-6ACD-4703-8678-938650DF8C40}" type="datetimeFigureOut">
               <a:rPr lang="en-GB" smtClean="0"/>
-              <a:t>28/12/2023</a:t>
+              <a:t>15/10/2024</a:t>
             </a:fld>
             <a:endParaRPr lang="en-GB"/>
           </a:p>
@@ -2265,7 +3247,7 @@
     </p:spTree>
     <p:extLst>
       <p:ext uri="{BB962C8B-B14F-4D97-AF65-F5344CB8AC3E}">
-        <p14:creationId xmlns:p14="http://schemas.microsoft.com/office/powerpoint/2010/main" val="2615191984"/>
+        <p14:creationId xmlns:p14="http://schemas.microsoft.com/office/powerpoint/2010/main" val="4072259875"/>
       </p:ext>
     </p:extLst>
   </p:cSld>
@@ -2327,8 +3309,8 @@
         </p:nvSpPr>
         <p:spPr>
           <a:xfrm>
-            <a:off x="452934" y="1034943"/>
-            <a:ext cx="2799953" cy="2466766"/>
+            <a:off x="438090" y="2563482"/>
+            <a:ext cx="2708196" cy="6110004"/>
           </a:xfrm>
         </p:spPr>
         <p:txBody>
@@ -2384,8 +3366,8 @@
         </p:nvSpPr>
         <p:spPr>
           <a:xfrm>
-            <a:off x="3335238" y="1034943"/>
-            <a:ext cx="2799953" cy="2466766"/>
+            <a:off x="3225939" y="2563482"/>
+            <a:ext cx="2708196" cy="6110004"/>
           </a:xfrm>
         </p:spPr>
         <p:txBody>
@@ -2446,7 +3428,7 @@
           <a:p>
             <a:fld id="{7058D181-6ACD-4703-8678-938650DF8C40}" type="datetimeFigureOut">
               <a:rPr lang="en-GB" smtClean="0"/>
-              <a:t>28/12/2023</a:t>
+              <a:t>15/10/2024</a:t>
             </a:fld>
             <a:endParaRPr lang="en-GB"/>
           </a:p>
@@ -2497,7 +3479,7 @@
     </p:spTree>
     <p:extLst>
       <p:ext uri="{BB962C8B-B14F-4D97-AF65-F5344CB8AC3E}">
-        <p14:creationId xmlns:p14="http://schemas.microsoft.com/office/powerpoint/2010/main" val="1436416742"/>
+        <p14:creationId xmlns:p14="http://schemas.microsoft.com/office/powerpoint/2010/main" val="2318286325"/>
       </p:ext>
     </p:extLst>
   </p:cSld>
@@ -2536,8 +3518,8 @@
         </p:nvSpPr>
         <p:spPr>
           <a:xfrm>
-            <a:off x="453792" y="206989"/>
-            <a:ext cx="5682258" cy="751459"/>
+            <a:off x="438920" y="512699"/>
+            <a:ext cx="5496044" cy="1861311"/>
           </a:xfrm>
         </p:spPr>
         <p:txBody>
@@ -2564,8 +3546,8 @@
         </p:nvSpPr>
         <p:spPr>
           <a:xfrm>
-            <a:off x="453792" y="953048"/>
-            <a:ext cx="2787085" cy="467074"/>
+            <a:off x="438921" y="2360633"/>
+            <a:ext cx="2695749" cy="1156910"/>
           </a:xfrm>
         </p:spPr>
         <p:txBody>
@@ -2573,39 +3555,39 @@
           <a:lstStyle>
             <a:lvl1pPr marL="0" indent="0">
               <a:buNone/>
-              <a:defRPr sz="1297" b="1"/>
+              <a:defRPr sz="1673" b="1"/>
             </a:lvl1pPr>
-            <a:lvl2pPr marL="247071" indent="0">
+            <a:lvl2pPr marL="318623" indent="0">
               <a:buNone/>
-              <a:defRPr sz="1081" b="1"/>
+              <a:defRPr sz="1394" b="1"/>
             </a:lvl2pPr>
-            <a:lvl3pPr marL="494142" indent="0">
+            <a:lvl3pPr marL="637245" indent="0">
               <a:buNone/>
-              <a:defRPr sz="973" b="1"/>
+              <a:defRPr sz="1254" b="1"/>
             </a:lvl3pPr>
-            <a:lvl4pPr marL="741213" indent="0">
+            <a:lvl4pPr marL="955868" indent="0">
               <a:buNone/>
-              <a:defRPr sz="865" b="1"/>
+              <a:defRPr sz="1115" b="1"/>
             </a:lvl4pPr>
-            <a:lvl5pPr marL="988284" indent="0">
+            <a:lvl5pPr marL="1274491" indent="0">
               <a:buNone/>
-              <a:defRPr sz="865" b="1"/>
+              <a:defRPr sz="1115" b="1"/>
             </a:lvl5pPr>
-            <a:lvl6pPr marL="1235354" indent="0">
+            <a:lvl6pPr marL="1593113" indent="0">
               <a:buNone/>
-              <a:defRPr sz="865" b="1"/>
+              <a:defRPr sz="1115" b="1"/>
             </a:lvl6pPr>
-            <a:lvl7pPr marL="1482425" indent="0">
+            <a:lvl7pPr marL="1911736" indent="0">
               <a:buNone/>
-              <a:defRPr sz="865" b="1"/>
+              <a:defRPr sz="1115" b="1"/>
             </a:lvl7pPr>
-            <a:lvl8pPr marL="1729496" indent="0">
+            <a:lvl8pPr marL="2230359" indent="0">
               <a:buNone/>
-              <a:defRPr sz="865" b="1"/>
+              <a:defRPr sz="1115" b="1"/>
             </a:lvl8pPr>
-            <a:lvl9pPr marL="1976567" indent="0">
+            <a:lvl9pPr marL="2548981" indent="0">
               <a:buNone/>
-              <a:defRPr sz="865" b="1"/>
+              <a:defRPr sz="1115" b="1"/>
             </a:lvl9pPr>
           </a:lstStyle>
           <a:p>
@@ -2629,8 +3611,8 @@
         </p:nvSpPr>
         <p:spPr>
           <a:xfrm>
-            <a:off x="453792" y="1420123"/>
-            <a:ext cx="2787085" cy="2088786"/>
+            <a:off x="438921" y="3517543"/>
+            <a:ext cx="2695749" cy="5173776"/>
           </a:xfrm>
         </p:spPr>
         <p:txBody>
@@ -2686,8 +3668,8 @@
         </p:nvSpPr>
         <p:spPr>
           <a:xfrm>
-            <a:off x="3335238" y="953048"/>
-            <a:ext cx="2800811" cy="467074"/>
+            <a:off x="3225939" y="2360633"/>
+            <a:ext cx="2709026" cy="1156910"/>
           </a:xfrm>
         </p:spPr>
         <p:txBody>
@@ -2695,39 +3677,39 @@
           <a:lstStyle>
             <a:lvl1pPr marL="0" indent="0">
               <a:buNone/>
-              <a:defRPr sz="1297" b="1"/>
+              <a:defRPr sz="1673" b="1"/>
             </a:lvl1pPr>
-            <a:lvl2pPr marL="247071" indent="0">
+            <a:lvl2pPr marL="318623" indent="0">
               <a:buNone/>
-              <a:defRPr sz="1081" b="1"/>
+              <a:defRPr sz="1394" b="1"/>
             </a:lvl2pPr>
-            <a:lvl3pPr marL="494142" indent="0">
+            <a:lvl3pPr marL="637245" indent="0">
               <a:buNone/>
-              <a:defRPr sz="973" b="1"/>
+              <a:defRPr sz="1254" b="1"/>
             </a:lvl3pPr>
-            <a:lvl4pPr marL="741213" indent="0">
+            <a:lvl4pPr marL="955868" indent="0">
               <a:buNone/>
-              <a:defRPr sz="865" b="1"/>
+              <a:defRPr sz="1115" b="1"/>
             </a:lvl4pPr>
-            <a:lvl5pPr marL="988284" indent="0">
+            <a:lvl5pPr marL="1274491" indent="0">
               <a:buNone/>
-              <a:defRPr sz="865" b="1"/>
+              <a:defRPr sz="1115" b="1"/>
             </a:lvl5pPr>
-            <a:lvl6pPr marL="1235354" indent="0">
+            <a:lvl6pPr marL="1593113" indent="0">
               <a:buNone/>
-              <a:defRPr sz="865" b="1"/>
+              <a:defRPr sz="1115" b="1"/>
             </a:lvl6pPr>
-            <a:lvl7pPr marL="1482425" indent="0">
+            <a:lvl7pPr marL="1911736" indent="0">
               <a:buNone/>
-              <a:defRPr sz="865" b="1"/>
+              <a:defRPr sz="1115" b="1"/>
             </a:lvl7pPr>
-            <a:lvl8pPr marL="1729496" indent="0">
+            <a:lvl8pPr marL="2230359" indent="0">
               <a:buNone/>
-              <a:defRPr sz="865" b="1"/>
+              <a:defRPr sz="1115" b="1"/>
             </a:lvl8pPr>
-            <a:lvl9pPr marL="1976567" indent="0">
+            <a:lvl9pPr marL="2548981" indent="0">
               <a:buNone/>
-              <a:defRPr sz="865" b="1"/>
+              <a:defRPr sz="1115" b="1"/>
             </a:lvl9pPr>
           </a:lstStyle>
           <a:p>
@@ -2751,8 +3733,8 @@
         </p:nvSpPr>
         <p:spPr>
           <a:xfrm>
-            <a:off x="3335238" y="1420123"/>
-            <a:ext cx="2800811" cy="2088786"/>
+            <a:off x="3225939" y="3517543"/>
+            <a:ext cx="2709026" cy="5173776"/>
           </a:xfrm>
         </p:spPr>
         <p:txBody>
@@ -2813,7 +3795,7 @@
           <a:p>
             <a:fld id="{7058D181-6ACD-4703-8678-938650DF8C40}" type="datetimeFigureOut">
               <a:rPr lang="en-GB" smtClean="0"/>
-              <a:t>28/12/2023</a:t>
+              <a:t>15/10/2024</a:t>
             </a:fld>
             <a:endParaRPr lang="en-GB"/>
           </a:p>
@@ -2864,7 +3846,7 @@
     </p:spTree>
     <p:extLst>
       <p:ext uri="{BB962C8B-B14F-4D97-AF65-F5344CB8AC3E}">
-        <p14:creationId xmlns:p14="http://schemas.microsoft.com/office/powerpoint/2010/main" val="3524844183"/>
+        <p14:creationId xmlns:p14="http://schemas.microsoft.com/office/powerpoint/2010/main" val="2122116939"/>
       </p:ext>
     </p:extLst>
   </p:cSld>
@@ -2931,7 +3913,7 @@
           <a:p>
             <a:fld id="{7058D181-6ACD-4703-8678-938650DF8C40}" type="datetimeFigureOut">
               <a:rPr lang="en-GB" smtClean="0"/>
-              <a:t>28/12/2023</a:t>
+              <a:t>15/10/2024</a:t>
             </a:fld>
             <a:endParaRPr lang="en-GB"/>
           </a:p>
@@ -2982,7 +3964,7 @@
     </p:spTree>
     <p:extLst>
       <p:ext uri="{BB962C8B-B14F-4D97-AF65-F5344CB8AC3E}">
-        <p14:creationId xmlns:p14="http://schemas.microsoft.com/office/powerpoint/2010/main" val="1879351440"/>
+        <p14:creationId xmlns:p14="http://schemas.microsoft.com/office/powerpoint/2010/main" val="1001826171"/>
       </p:ext>
     </p:extLst>
   </p:cSld>
@@ -3026,7 +4008,7 @@
           <a:p>
             <a:fld id="{7058D181-6ACD-4703-8678-938650DF8C40}" type="datetimeFigureOut">
               <a:rPr lang="en-GB" smtClean="0"/>
-              <a:t>28/12/2023</a:t>
+              <a:t>15/10/2024</a:t>
             </a:fld>
             <a:endParaRPr lang="en-GB"/>
           </a:p>
@@ -3077,7 +4059,7 @@
     </p:spTree>
     <p:extLst>
       <p:ext uri="{BB962C8B-B14F-4D97-AF65-F5344CB8AC3E}">
-        <p14:creationId xmlns:p14="http://schemas.microsoft.com/office/powerpoint/2010/main" val="3294689737"/>
+        <p14:creationId xmlns:p14="http://schemas.microsoft.com/office/powerpoint/2010/main" val="683189740"/>
       </p:ext>
     </p:extLst>
   </p:cSld>
@@ -3116,15 +4098,15 @@
         </p:nvSpPr>
         <p:spPr>
           <a:xfrm>
-            <a:off x="453792" y="259186"/>
-            <a:ext cx="2124842" cy="907151"/>
+            <a:off x="438921" y="641985"/>
+            <a:ext cx="2055208" cy="2246948"/>
           </a:xfrm>
         </p:spPr>
         <p:txBody>
           <a:bodyPr anchor="b"/>
           <a:lstStyle>
             <a:lvl1pPr>
-              <a:defRPr sz="1729"/>
+              <a:defRPr sz="2230"/>
             </a:lvl1pPr>
           </a:lstStyle>
           <a:p>
@@ -3148,39 +4130,39 @@
         </p:nvSpPr>
         <p:spPr>
           <a:xfrm>
-            <a:off x="2800811" y="559770"/>
-            <a:ext cx="3335238" cy="2762849"/>
+            <a:off x="2709026" y="1386511"/>
+            <a:ext cx="3225939" cy="6843382"/>
           </a:xfrm>
         </p:spPr>
         <p:txBody>
           <a:bodyPr/>
           <a:lstStyle>
             <a:lvl1pPr>
-              <a:defRPr sz="1729"/>
+              <a:defRPr sz="2230"/>
             </a:lvl1pPr>
             <a:lvl2pPr>
-              <a:defRPr sz="1513"/>
+              <a:defRPr sz="1951"/>
             </a:lvl2pPr>
             <a:lvl3pPr>
-              <a:defRPr sz="1297"/>
+              <a:defRPr sz="1673"/>
             </a:lvl3pPr>
             <a:lvl4pPr>
-              <a:defRPr sz="1081"/>
+              <a:defRPr sz="1394"/>
             </a:lvl4pPr>
             <a:lvl5pPr>
-              <a:defRPr sz="1081"/>
+              <a:defRPr sz="1394"/>
             </a:lvl5pPr>
             <a:lvl6pPr>
-              <a:defRPr sz="1081"/>
+              <a:defRPr sz="1394"/>
             </a:lvl6pPr>
             <a:lvl7pPr>
-              <a:defRPr sz="1081"/>
+              <a:defRPr sz="1394"/>
             </a:lvl7pPr>
             <a:lvl8pPr>
-              <a:defRPr sz="1081"/>
+              <a:defRPr sz="1394"/>
             </a:lvl8pPr>
             <a:lvl9pPr>
-              <a:defRPr sz="1081"/>
+              <a:defRPr sz="1394"/>
             </a:lvl9pPr>
           </a:lstStyle>
           <a:p>
@@ -3233,8 +4215,8 @@
         </p:nvSpPr>
         <p:spPr>
           <a:xfrm>
-            <a:off x="453792" y="1166337"/>
-            <a:ext cx="2124842" cy="2160782"/>
+            <a:off x="438921" y="2888932"/>
+            <a:ext cx="2055208" cy="5352105"/>
           </a:xfrm>
         </p:spPr>
         <p:txBody>
@@ -3242,39 +4224,39 @@
           <a:lstStyle>
             <a:lvl1pPr marL="0" indent="0">
               <a:buNone/>
-              <a:defRPr sz="865"/>
+              <a:defRPr sz="1115"/>
             </a:lvl1pPr>
-            <a:lvl2pPr marL="247071" indent="0">
+            <a:lvl2pPr marL="318623" indent="0">
               <a:buNone/>
-              <a:defRPr sz="757"/>
+              <a:defRPr sz="976"/>
             </a:lvl2pPr>
-            <a:lvl3pPr marL="494142" indent="0">
+            <a:lvl3pPr marL="637245" indent="0">
               <a:buNone/>
-              <a:defRPr sz="648"/>
+              <a:defRPr sz="836"/>
             </a:lvl3pPr>
-            <a:lvl4pPr marL="741213" indent="0">
+            <a:lvl4pPr marL="955868" indent="0">
               <a:buNone/>
-              <a:defRPr sz="540"/>
+              <a:defRPr sz="697"/>
             </a:lvl4pPr>
-            <a:lvl5pPr marL="988284" indent="0">
+            <a:lvl5pPr marL="1274491" indent="0">
               <a:buNone/>
-              <a:defRPr sz="540"/>
+              <a:defRPr sz="697"/>
             </a:lvl5pPr>
-            <a:lvl6pPr marL="1235354" indent="0">
+            <a:lvl6pPr marL="1593113" indent="0">
               <a:buNone/>
-              <a:defRPr sz="540"/>
+              <a:defRPr sz="697"/>
             </a:lvl6pPr>
-            <a:lvl7pPr marL="1482425" indent="0">
+            <a:lvl7pPr marL="1911736" indent="0">
               <a:buNone/>
-              <a:defRPr sz="540"/>
+              <a:defRPr sz="697"/>
             </a:lvl7pPr>
-            <a:lvl8pPr marL="1729496" indent="0">
+            <a:lvl8pPr marL="2230359" indent="0">
               <a:buNone/>
-              <a:defRPr sz="540"/>
+              <a:defRPr sz="697"/>
             </a:lvl8pPr>
-            <a:lvl9pPr marL="1976567" indent="0">
+            <a:lvl9pPr marL="2548981" indent="0">
               <a:buNone/>
-              <a:defRPr sz="540"/>
+              <a:defRPr sz="697"/>
             </a:lvl9pPr>
           </a:lstStyle>
           <a:p>
@@ -3303,7 +4285,7 @@
           <a:p>
             <a:fld id="{7058D181-6ACD-4703-8678-938650DF8C40}" type="datetimeFigureOut">
               <a:rPr lang="en-GB" smtClean="0"/>
-              <a:t>28/12/2023</a:t>
+              <a:t>15/10/2024</a:t>
             </a:fld>
             <a:endParaRPr lang="en-GB"/>
           </a:p>
@@ -3354,7 +4336,7 @@
     </p:spTree>
     <p:extLst>
       <p:ext uri="{BB962C8B-B14F-4D97-AF65-F5344CB8AC3E}">
-        <p14:creationId xmlns:p14="http://schemas.microsoft.com/office/powerpoint/2010/main" val="1701496355"/>
+        <p14:creationId xmlns:p14="http://schemas.microsoft.com/office/powerpoint/2010/main" val="449194242"/>
       </p:ext>
     </p:extLst>
   </p:cSld>
@@ -3393,15 +4375,15 @@
         </p:nvSpPr>
         <p:spPr>
           <a:xfrm>
-            <a:off x="453792" y="259186"/>
-            <a:ext cx="2124842" cy="907151"/>
+            <a:off x="438921" y="641985"/>
+            <a:ext cx="2055208" cy="2246948"/>
           </a:xfrm>
         </p:spPr>
         <p:txBody>
           <a:bodyPr anchor="b"/>
           <a:lstStyle>
             <a:lvl1pPr>
-              <a:defRPr sz="1729"/>
+              <a:defRPr sz="2230"/>
             </a:lvl1pPr>
           </a:lstStyle>
           <a:p>
@@ -3425,8 +4407,8 @@
         </p:nvSpPr>
         <p:spPr>
           <a:xfrm>
-            <a:off x="2800811" y="559770"/>
-            <a:ext cx="3335238" cy="2762849"/>
+            <a:off x="2709026" y="1386511"/>
+            <a:ext cx="3225939" cy="6843382"/>
           </a:xfrm>
         </p:spPr>
         <p:txBody>
@@ -3434,39 +4416,39 @@
           <a:lstStyle>
             <a:lvl1pPr marL="0" indent="0">
               <a:buNone/>
-              <a:defRPr sz="1729"/>
+              <a:defRPr sz="2230"/>
             </a:lvl1pPr>
-            <a:lvl2pPr marL="247071" indent="0">
+            <a:lvl2pPr marL="318623" indent="0">
               <a:buNone/>
-              <a:defRPr sz="1513"/>
+              <a:defRPr sz="1951"/>
             </a:lvl2pPr>
-            <a:lvl3pPr marL="494142" indent="0">
+            <a:lvl3pPr marL="637245" indent="0">
               <a:buNone/>
-              <a:defRPr sz="1297"/>
+              <a:defRPr sz="1673"/>
             </a:lvl3pPr>
-            <a:lvl4pPr marL="741213" indent="0">
+            <a:lvl4pPr marL="955868" indent="0">
               <a:buNone/>
-              <a:defRPr sz="1081"/>
+              <a:defRPr sz="1394"/>
             </a:lvl4pPr>
-            <a:lvl5pPr marL="988284" indent="0">
+            <a:lvl5pPr marL="1274491" indent="0">
               <a:buNone/>
-              <a:defRPr sz="1081"/>
+              <a:defRPr sz="1394"/>
             </a:lvl5pPr>
-            <a:lvl6pPr marL="1235354" indent="0">
+            <a:lvl6pPr marL="1593113" indent="0">
               <a:buNone/>
-              <a:defRPr sz="1081"/>
+              <a:defRPr sz="1394"/>
             </a:lvl6pPr>
-            <a:lvl7pPr marL="1482425" indent="0">
+            <a:lvl7pPr marL="1911736" indent="0">
               <a:buNone/>
-              <a:defRPr sz="1081"/>
+              <a:defRPr sz="1394"/>
             </a:lvl7pPr>
-            <a:lvl8pPr marL="1729496" indent="0">
+            <a:lvl8pPr marL="2230359" indent="0">
               <a:buNone/>
-              <a:defRPr sz="1081"/>
+              <a:defRPr sz="1394"/>
             </a:lvl8pPr>
-            <a:lvl9pPr marL="1976567" indent="0">
+            <a:lvl9pPr marL="2548981" indent="0">
               <a:buNone/>
-              <a:defRPr sz="1081"/>
+              <a:defRPr sz="1394"/>
             </a:lvl9pPr>
           </a:lstStyle>
           <a:p>
@@ -3490,8 +4472,8 @@
         </p:nvSpPr>
         <p:spPr>
           <a:xfrm>
-            <a:off x="453792" y="1166337"/>
-            <a:ext cx="2124842" cy="2160782"/>
+            <a:off x="438921" y="2888932"/>
+            <a:ext cx="2055208" cy="5352105"/>
           </a:xfrm>
         </p:spPr>
         <p:txBody>
@@ -3499,39 +4481,39 @@
           <a:lstStyle>
             <a:lvl1pPr marL="0" indent="0">
               <a:buNone/>
-              <a:defRPr sz="865"/>
+              <a:defRPr sz="1115"/>
             </a:lvl1pPr>
-            <a:lvl2pPr marL="247071" indent="0">
+            <a:lvl2pPr marL="318623" indent="0">
               <a:buNone/>
-              <a:defRPr sz="757"/>
+              <a:defRPr sz="976"/>
             </a:lvl2pPr>
-            <a:lvl3pPr marL="494142" indent="0">
+            <a:lvl3pPr marL="637245" indent="0">
               <a:buNone/>
-              <a:defRPr sz="648"/>
+              <a:defRPr sz="836"/>
             </a:lvl3pPr>
-            <a:lvl4pPr marL="741213" indent="0">
+            <a:lvl4pPr marL="955868" indent="0">
               <a:buNone/>
-              <a:defRPr sz="540"/>
+              <a:defRPr sz="697"/>
             </a:lvl4pPr>
-            <a:lvl5pPr marL="988284" indent="0">
+            <a:lvl5pPr marL="1274491" indent="0">
               <a:buNone/>
-              <a:defRPr sz="540"/>
+              <a:defRPr sz="697"/>
             </a:lvl5pPr>
-            <a:lvl6pPr marL="1235354" indent="0">
+            <a:lvl6pPr marL="1593113" indent="0">
               <a:buNone/>
-              <a:defRPr sz="540"/>
+              <a:defRPr sz="697"/>
             </a:lvl6pPr>
-            <a:lvl7pPr marL="1482425" indent="0">
+            <a:lvl7pPr marL="1911736" indent="0">
               <a:buNone/>
-              <a:defRPr sz="540"/>
+              <a:defRPr sz="697"/>
             </a:lvl7pPr>
-            <a:lvl8pPr marL="1729496" indent="0">
+            <a:lvl8pPr marL="2230359" indent="0">
               <a:buNone/>
-              <a:defRPr sz="540"/>
+              <a:defRPr sz="697"/>
             </a:lvl8pPr>
-            <a:lvl9pPr marL="1976567" indent="0">
+            <a:lvl9pPr marL="2548981" indent="0">
               <a:buNone/>
-              <a:defRPr sz="540"/>
+              <a:defRPr sz="697"/>
             </a:lvl9pPr>
           </a:lstStyle>
           <a:p>
@@ -3560,7 +4542,7 @@
           <a:p>
             <a:fld id="{7058D181-6ACD-4703-8678-938650DF8C40}" type="datetimeFigureOut">
               <a:rPr lang="en-GB" smtClean="0"/>
-              <a:t>28/12/2023</a:t>
+              <a:t>15/10/2024</a:t>
             </a:fld>
             <a:endParaRPr lang="en-GB"/>
           </a:p>
@@ -3611,7 +4593,7 @@
     </p:spTree>
     <p:extLst>
       <p:ext uri="{BB962C8B-B14F-4D97-AF65-F5344CB8AC3E}">
-        <p14:creationId xmlns:p14="http://schemas.microsoft.com/office/powerpoint/2010/main" val="1747141558"/>
+        <p14:creationId xmlns:p14="http://schemas.microsoft.com/office/powerpoint/2010/main" val="2534634183"/>
       </p:ext>
     </p:extLst>
   </p:cSld>
@@ -3655,8 +4637,8 @@
         </p:nvSpPr>
         <p:spPr>
           <a:xfrm>
-            <a:off x="452934" y="206989"/>
-            <a:ext cx="5682258" cy="751459"/>
+            <a:off x="438091" y="512699"/>
+            <a:ext cx="5496044" cy="1861311"/>
           </a:xfrm>
           <a:prstGeom prst="rect">
             <a:avLst/>
@@ -3688,8 +4670,8 @@
         </p:nvSpPr>
         <p:spPr>
           <a:xfrm>
-            <a:off x="452934" y="1034943"/>
-            <a:ext cx="5682258" cy="2466766"/>
+            <a:off x="438091" y="2563482"/>
+            <a:ext cx="5496044" cy="6110004"/>
           </a:xfrm>
           <a:prstGeom prst="rect">
             <a:avLst/>
@@ -3750,8 +4732,8 @@
         </p:nvSpPr>
         <p:spPr>
           <a:xfrm>
-            <a:off x="452934" y="3603404"/>
-            <a:ext cx="1482328" cy="206989"/>
+            <a:off x="438090" y="8925377"/>
+            <a:ext cx="1433751" cy="512696"/>
           </a:xfrm>
           <a:prstGeom prst="rect">
             <a:avLst/>
@@ -3761,7 +4743,7 @@
           <a:bodyPr vert="horz" lIns="91440" tIns="45720" rIns="91440" bIns="45720" rtlCol="0" anchor="ctr"/>
           <a:lstStyle>
             <a:lvl1pPr algn="l">
-              <a:defRPr sz="648">
+              <a:defRPr sz="836">
                 <a:solidFill>
                   <a:schemeClr val="tx1">
                     <a:tint val="75000"/>
@@ -3773,7 +4755,7 @@
           <a:p>
             <a:fld id="{7058D181-6ACD-4703-8678-938650DF8C40}" type="datetimeFigureOut">
               <a:rPr lang="en-GB" smtClean="0"/>
-              <a:t>28/12/2023</a:t>
+              <a:t>15/10/2024</a:t>
             </a:fld>
             <a:endParaRPr lang="en-GB"/>
           </a:p>
@@ -3791,8 +4773,8 @@
         </p:nvSpPr>
         <p:spPr>
           <a:xfrm>
-            <a:off x="2182317" y="3603404"/>
-            <a:ext cx="2223492" cy="206989"/>
+            <a:off x="2110800" y="8925377"/>
+            <a:ext cx="2150626" cy="512696"/>
           </a:xfrm>
           <a:prstGeom prst="rect">
             <a:avLst/>
@@ -3802,7 +4784,7 @@
           <a:bodyPr vert="horz" lIns="91440" tIns="45720" rIns="91440" bIns="45720" rtlCol="0" anchor="ctr"/>
           <a:lstStyle>
             <a:lvl1pPr algn="ctr">
-              <a:defRPr sz="648">
+              <a:defRPr sz="836">
                 <a:solidFill>
                   <a:schemeClr val="tx1">
                     <a:tint val="75000"/>
@@ -3828,8 +4810,8 @@
         </p:nvSpPr>
         <p:spPr>
           <a:xfrm>
-            <a:off x="4652863" y="3603404"/>
-            <a:ext cx="1482328" cy="206989"/>
+            <a:off x="4500384" y="8925377"/>
+            <a:ext cx="1433751" cy="512696"/>
           </a:xfrm>
           <a:prstGeom prst="rect">
             <a:avLst/>
@@ -3839,7 +4821,7 @@
           <a:bodyPr vert="horz" lIns="91440" tIns="45720" rIns="91440" bIns="45720" rtlCol="0" anchor="ctr"/>
           <a:lstStyle>
             <a:lvl1pPr algn="r">
-              <a:defRPr sz="648">
+              <a:defRPr sz="836">
                 <a:solidFill>
                   <a:schemeClr val="tx1">
                     <a:tint val="75000"/>
@@ -3860,27 +4842,27 @@
     </p:spTree>
     <p:extLst>
       <p:ext uri="{BB962C8B-B14F-4D97-AF65-F5344CB8AC3E}">
-        <p14:creationId xmlns:p14="http://schemas.microsoft.com/office/powerpoint/2010/main" val="960378148"/>
+        <p14:creationId xmlns:p14="http://schemas.microsoft.com/office/powerpoint/2010/main" val="4041823836"/>
       </p:ext>
     </p:extLst>
   </p:cSld>
   <p:clrMap bg1="lt1" tx1="dk1" bg2="lt2" tx2="dk2" accent1="accent1" accent2="accent2" accent3="accent3" accent4="accent4" accent5="accent5" accent6="accent6" hlink="hlink" folHlink="folHlink"/>
   <p:sldLayoutIdLst>
-    <p:sldLayoutId id="2147483721" r:id="rId1"/>
-    <p:sldLayoutId id="2147483722" r:id="rId2"/>
-    <p:sldLayoutId id="2147483723" r:id="rId3"/>
-    <p:sldLayoutId id="2147483724" r:id="rId4"/>
-    <p:sldLayoutId id="2147483725" r:id="rId5"/>
-    <p:sldLayoutId id="2147483726" r:id="rId6"/>
-    <p:sldLayoutId id="2147483727" r:id="rId7"/>
-    <p:sldLayoutId id="2147483728" r:id="rId8"/>
-    <p:sldLayoutId id="2147483729" r:id="rId9"/>
-    <p:sldLayoutId id="2147483730" r:id="rId10"/>
-    <p:sldLayoutId id="2147483731" r:id="rId11"/>
+    <p:sldLayoutId id="2147483757" r:id="rId1"/>
+    <p:sldLayoutId id="2147483758" r:id="rId2"/>
+    <p:sldLayoutId id="2147483759" r:id="rId3"/>
+    <p:sldLayoutId id="2147483760" r:id="rId4"/>
+    <p:sldLayoutId id="2147483761" r:id="rId5"/>
+    <p:sldLayoutId id="2147483762" r:id="rId6"/>
+    <p:sldLayoutId id="2147483763" r:id="rId7"/>
+    <p:sldLayoutId id="2147483764" r:id="rId8"/>
+    <p:sldLayoutId id="2147483765" r:id="rId9"/>
+    <p:sldLayoutId id="2147483766" r:id="rId10"/>
+    <p:sldLayoutId id="2147483767" r:id="rId11"/>
   </p:sldLayoutIdLst>
   <p:txStyles>
     <p:titleStyle>
-      <a:lvl1pPr algn="l" defTabSz="494142" rtl="0" eaLnBrk="1" latinLnBrk="0" hangingPunct="1">
+      <a:lvl1pPr algn="l" defTabSz="637245" rtl="0" eaLnBrk="1" latinLnBrk="0" hangingPunct="1">
         <a:lnSpc>
           <a:spcPct val="90000"/>
         </a:lnSpc>
@@ -3888,7 +4870,7 @@
           <a:spcPct val="0"/>
         </a:spcBef>
         <a:buNone/>
-        <a:defRPr sz="2378" kern="1200">
+        <a:defRPr sz="3066" kern="1200">
           <a:solidFill>
             <a:schemeClr val="tx1"/>
           </a:solidFill>
@@ -3899,16 +4881,16 @@
       </a:lvl1pPr>
     </p:titleStyle>
     <p:bodyStyle>
-      <a:lvl1pPr marL="123535" indent="-123535" algn="l" defTabSz="494142" rtl="0" eaLnBrk="1" latinLnBrk="0" hangingPunct="1">
+      <a:lvl1pPr marL="159311" indent="-159311" algn="l" defTabSz="637245" rtl="0" eaLnBrk="1" latinLnBrk="0" hangingPunct="1">
         <a:lnSpc>
           <a:spcPct val="90000"/>
         </a:lnSpc>
         <a:spcBef>
-          <a:spcPts val="540"/>
+          <a:spcPts val="697"/>
         </a:spcBef>
         <a:buFont typeface="Arial" panose="020B0604020202020204" pitchFamily="34" charset="0"/>
         <a:buChar char="•"/>
-        <a:defRPr sz="1513" kern="1200">
+        <a:defRPr sz="1951" kern="1200">
           <a:solidFill>
             <a:schemeClr val="tx1"/>
           </a:solidFill>
@@ -3917,16 +4899,16 @@
           <a:cs typeface="+mn-cs"/>
         </a:defRPr>
       </a:lvl1pPr>
-      <a:lvl2pPr marL="370606" indent="-123535" algn="l" defTabSz="494142" rtl="0" eaLnBrk="1" latinLnBrk="0" hangingPunct="1">
+      <a:lvl2pPr marL="477934" indent="-159311" algn="l" defTabSz="637245" rtl="0" eaLnBrk="1" latinLnBrk="0" hangingPunct="1">
         <a:lnSpc>
           <a:spcPct val="90000"/>
         </a:lnSpc>
         <a:spcBef>
-          <a:spcPts val="270"/>
+          <a:spcPts val="348"/>
         </a:spcBef>
         <a:buFont typeface="Arial" panose="020B0604020202020204" pitchFamily="34" charset="0"/>
         <a:buChar char="•"/>
-        <a:defRPr sz="1297" kern="1200">
+        <a:defRPr sz="1673" kern="1200">
           <a:solidFill>
             <a:schemeClr val="tx1"/>
           </a:solidFill>
@@ -3935,16 +4917,16 @@
           <a:cs typeface="+mn-cs"/>
         </a:defRPr>
       </a:lvl2pPr>
-      <a:lvl3pPr marL="617677" indent="-123535" algn="l" defTabSz="494142" rtl="0" eaLnBrk="1" latinLnBrk="0" hangingPunct="1">
+      <a:lvl3pPr marL="796557" indent="-159311" algn="l" defTabSz="637245" rtl="0" eaLnBrk="1" latinLnBrk="0" hangingPunct="1">
         <a:lnSpc>
           <a:spcPct val="90000"/>
         </a:lnSpc>
         <a:spcBef>
-          <a:spcPts val="270"/>
+          <a:spcPts val="348"/>
         </a:spcBef>
         <a:buFont typeface="Arial" panose="020B0604020202020204" pitchFamily="34" charset="0"/>
         <a:buChar char="•"/>
-        <a:defRPr sz="1081" kern="1200">
+        <a:defRPr sz="1394" kern="1200">
           <a:solidFill>
             <a:schemeClr val="tx1"/>
           </a:solidFill>
@@ -3953,16 +4935,16 @@
           <a:cs typeface="+mn-cs"/>
         </a:defRPr>
       </a:lvl3pPr>
-      <a:lvl4pPr marL="864748" indent="-123535" algn="l" defTabSz="494142" rtl="0" eaLnBrk="1" latinLnBrk="0" hangingPunct="1">
+      <a:lvl4pPr marL="1115179" indent="-159311" algn="l" defTabSz="637245" rtl="0" eaLnBrk="1" latinLnBrk="0" hangingPunct="1">
         <a:lnSpc>
           <a:spcPct val="90000"/>
         </a:lnSpc>
         <a:spcBef>
-          <a:spcPts val="270"/>
+          <a:spcPts val="348"/>
         </a:spcBef>
         <a:buFont typeface="Arial" panose="020B0604020202020204" pitchFamily="34" charset="0"/>
         <a:buChar char="•"/>
-        <a:defRPr sz="973" kern="1200">
+        <a:defRPr sz="1254" kern="1200">
           <a:solidFill>
             <a:schemeClr val="tx1"/>
           </a:solidFill>
@@ -3971,16 +4953,16 @@
           <a:cs typeface="+mn-cs"/>
         </a:defRPr>
       </a:lvl4pPr>
-      <a:lvl5pPr marL="1111819" indent="-123535" algn="l" defTabSz="494142" rtl="0" eaLnBrk="1" latinLnBrk="0" hangingPunct="1">
+      <a:lvl5pPr marL="1433802" indent="-159311" algn="l" defTabSz="637245" rtl="0" eaLnBrk="1" latinLnBrk="0" hangingPunct="1">
         <a:lnSpc>
           <a:spcPct val="90000"/>
         </a:lnSpc>
         <a:spcBef>
-          <a:spcPts val="270"/>
+          <a:spcPts val="348"/>
         </a:spcBef>
         <a:buFont typeface="Arial" panose="020B0604020202020204" pitchFamily="34" charset="0"/>
         <a:buChar char="•"/>
-        <a:defRPr sz="973" kern="1200">
+        <a:defRPr sz="1254" kern="1200">
           <a:solidFill>
             <a:schemeClr val="tx1"/>
           </a:solidFill>
@@ -3989,16 +4971,16 @@
           <a:cs typeface="+mn-cs"/>
         </a:defRPr>
       </a:lvl5pPr>
-      <a:lvl6pPr marL="1358890" indent="-123535" algn="l" defTabSz="494142" rtl="0" eaLnBrk="1" latinLnBrk="0" hangingPunct="1">
+      <a:lvl6pPr marL="1752425" indent="-159311" algn="l" defTabSz="637245" rtl="0" eaLnBrk="1" latinLnBrk="0" hangingPunct="1">
         <a:lnSpc>
           <a:spcPct val="90000"/>
         </a:lnSpc>
         <a:spcBef>
-          <a:spcPts val="270"/>
+          <a:spcPts val="348"/>
         </a:spcBef>
         <a:buFont typeface="Arial" panose="020B0604020202020204" pitchFamily="34" charset="0"/>
         <a:buChar char="•"/>
-        <a:defRPr sz="973" kern="1200">
+        <a:defRPr sz="1254" kern="1200">
           <a:solidFill>
             <a:schemeClr val="tx1"/>
           </a:solidFill>
@@ -4007,16 +4989,16 @@
           <a:cs typeface="+mn-cs"/>
         </a:defRPr>
       </a:lvl6pPr>
-      <a:lvl7pPr marL="1605961" indent="-123535" algn="l" defTabSz="494142" rtl="0" eaLnBrk="1" latinLnBrk="0" hangingPunct="1">
+      <a:lvl7pPr marL="2071047" indent="-159311" algn="l" defTabSz="637245" rtl="0" eaLnBrk="1" latinLnBrk="0" hangingPunct="1">
         <a:lnSpc>
           <a:spcPct val="90000"/>
         </a:lnSpc>
         <a:spcBef>
-          <a:spcPts val="270"/>
+          <a:spcPts val="348"/>
         </a:spcBef>
         <a:buFont typeface="Arial" panose="020B0604020202020204" pitchFamily="34" charset="0"/>
         <a:buChar char="•"/>
-        <a:defRPr sz="973" kern="1200">
+        <a:defRPr sz="1254" kern="1200">
           <a:solidFill>
             <a:schemeClr val="tx1"/>
           </a:solidFill>
@@ -4025,16 +5007,16 @@
           <a:cs typeface="+mn-cs"/>
         </a:defRPr>
       </a:lvl7pPr>
-      <a:lvl8pPr marL="1853032" indent="-123535" algn="l" defTabSz="494142" rtl="0" eaLnBrk="1" latinLnBrk="0" hangingPunct="1">
+      <a:lvl8pPr marL="2389670" indent="-159311" algn="l" defTabSz="637245" rtl="0" eaLnBrk="1" latinLnBrk="0" hangingPunct="1">
         <a:lnSpc>
           <a:spcPct val="90000"/>
         </a:lnSpc>
         <a:spcBef>
-          <a:spcPts val="270"/>
+          <a:spcPts val="348"/>
         </a:spcBef>
         <a:buFont typeface="Arial" panose="020B0604020202020204" pitchFamily="34" charset="0"/>
         <a:buChar char="•"/>
-        <a:defRPr sz="973" kern="1200">
+        <a:defRPr sz="1254" kern="1200">
           <a:solidFill>
             <a:schemeClr val="tx1"/>
           </a:solidFill>
@@ -4043,16 +5025,16 @@
           <a:cs typeface="+mn-cs"/>
         </a:defRPr>
       </a:lvl8pPr>
-      <a:lvl9pPr marL="2100102" indent="-123535" algn="l" defTabSz="494142" rtl="0" eaLnBrk="1" latinLnBrk="0" hangingPunct="1">
+      <a:lvl9pPr marL="2708293" indent="-159311" algn="l" defTabSz="637245" rtl="0" eaLnBrk="1" latinLnBrk="0" hangingPunct="1">
         <a:lnSpc>
           <a:spcPct val="90000"/>
         </a:lnSpc>
         <a:spcBef>
-          <a:spcPts val="270"/>
+          <a:spcPts val="348"/>
         </a:spcBef>
         <a:buFont typeface="Arial" panose="020B0604020202020204" pitchFamily="34" charset="0"/>
         <a:buChar char="•"/>
-        <a:defRPr sz="973" kern="1200">
+        <a:defRPr sz="1254" kern="1200">
           <a:solidFill>
             <a:schemeClr val="tx1"/>
           </a:solidFill>
@@ -4066,8 +5048,8 @@
       <a:defPPr>
         <a:defRPr lang="en-US"/>
       </a:defPPr>
-      <a:lvl1pPr marL="0" algn="l" defTabSz="494142" rtl="0" eaLnBrk="1" latinLnBrk="0" hangingPunct="1">
-        <a:defRPr sz="973" kern="1200">
+      <a:lvl1pPr marL="0" algn="l" defTabSz="637245" rtl="0" eaLnBrk="1" latinLnBrk="0" hangingPunct="1">
+        <a:defRPr sz="1254" kern="1200">
           <a:solidFill>
             <a:schemeClr val="tx1"/>
           </a:solidFill>
@@ -4076,8 +5058,8 @@
           <a:cs typeface="+mn-cs"/>
         </a:defRPr>
       </a:lvl1pPr>
-      <a:lvl2pPr marL="247071" algn="l" defTabSz="494142" rtl="0" eaLnBrk="1" latinLnBrk="0" hangingPunct="1">
-        <a:defRPr sz="973" kern="1200">
+      <a:lvl2pPr marL="318623" algn="l" defTabSz="637245" rtl="0" eaLnBrk="1" latinLnBrk="0" hangingPunct="1">
+        <a:defRPr sz="1254" kern="1200">
           <a:solidFill>
             <a:schemeClr val="tx1"/>
           </a:solidFill>
@@ -4086,8 +5068,8 @@
           <a:cs typeface="+mn-cs"/>
         </a:defRPr>
       </a:lvl2pPr>
-      <a:lvl3pPr marL="494142" algn="l" defTabSz="494142" rtl="0" eaLnBrk="1" latinLnBrk="0" hangingPunct="1">
-        <a:defRPr sz="973" kern="1200">
+      <a:lvl3pPr marL="637245" algn="l" defTabSz="637245" rtl="0" eaLnBrk="1" latinLnBrk="0" hangingPunct="1">
+        <a:defRPr sz="1254" kern="1200">
           <a:solidFill>
             <a:schemeClr val="tx1"/>
           </a:solidFill>
@@ -4096,8 +5078,8 @@
           <a:cs typeface="+mn-cs"/>
         </a:defRPr>
       </a:lvl3pPr>
-      <a:lvl4pPr marL="741213" algn="l" defTabSz="494142" rtl="0" eaLnBrk="1" latinLnBrk="0" hangingPunct="1">
-        <a:defRPr sz="973" kern="1200">
+      <a:lvl4pPr marL="955868" algn="l" defTabSz="637245" rtl="0" eaLnBrk="1" latinLnBrk="0" hangingPunct="1">
+        <a:defRPr sz="1254" kern="1200">
           <a:solidFill>
             <a:schemeClr val="tx1"/>
           </a:solidFill>
@@ -4106,8 +5088,8 @@
           <a:cs typeface="+mn-cs"/>
         </a:defRPr>
       </a:lvl4pPr>
-      <a:lvl5pPr marL="988284" algn="l" defTabSz="494142" rtl="0" eaLnBrk="1" latinLnBrk="0" hangingPunct="1">
-        <a:defRPr sz="973" kern="1200">
+      <a:lvl5pPr marL="1274491" algn="l" defTabSz="637245" rtl="0" eaLnBrk="1" latinLnBrk="0" hangingPunct="1">
+        <a:defRPr sz="1254" kern="1200">
           <a:solidFill>
             <a:schemeClr val="tx1"/>
           </a:solidFill>
@@ -4116,8 +5098,8 @@
           <a:cs typeface="+mn-cs"/>
         </a:defRPr>
       </a:lvl5pPr>
-      <a:lvl6pPr marL="1235354" algn="l" defTabSz="494142" rtl="0" eaLnBrk="1" latinLnBrk="0" hangingPunct="1">
-        <a:defRPr sz="973" kern="1200">
+      <a:lvl6pPr marL="1593113" algn="l" defTabSz="637245" rtl="0" eaLnBrk="1" latinLnBrk="0" hangingPunct="1">
+        <a:defRPr sz="1254" kern="1200">
           <a:solidFill>
             <a:schemeClr val="tx1"/>
           </a:solidFill>
@@ -4126,8 +5108,8 @@
           <a:cs typeface="+mn-cs"/>
         </a:defRPr>
       </a:lvl6pPr>
-      <a:lvl7pPr marL="1482425" algn="l" defTabSz="494142" rtl="0" eaLnBrk="1" latinLnBrk="0" hangingPunct="1">
-        <a:defRPr sz="973" kern="1200">
+      <a:lvl7pPr marL="1911736" algn="l" defTabSz="637245" rtl="0" eaLnBrk="1" latinLnBrk="0" hangingPunct="1">
+        <a:defRPr sz="1254" kern="1200">
           <a:solidFill>
             <a:schemeClr val="tx1"/>
           </a:solidFill>
@@ -4136,8 +5118,8 @@
           <a:cs typeface="+mn-cs"/>
         </a:defRPr>
       </a:lvl7pPr>
-      <a:lvl8pPr marL="1729496" algn="l" defTabSz="494142" rtl="0" eaLnBrk="1" latinLnBrk="0" hangingPunct="1">
-        <a:defRPr sz="973" kern="1200">
+      <a:lvl8pPr marL="2230359" algn="l" defTabSz="637245" rtl="0" eaLnBrk="1" latinLnBrk="0" hangingPunct="1">
+        <a:defRPr sz="1254" kern="1200">
           <a:solidFill>
             <a:schemeClr val="tx1"/>
           </a:solidFill>
@@ -4146,8 +5128,8 @@
           <a:cs typeface="+mn-cs"/>
         </a:defRPr>
       </a:lvl8pPr>
-      <a:lvl9pPr marL="1976567" algn="l" defTabSz="494142" rtl="0" eaLnBrk="1" latinLnBrk="0" hangingPunct="1">
-        <a:defRPr sz="973" kern="1200">
+      <a:lvl9pPr marL="2548981" algn="l" defTabSz="637245" rtl="0" eaLnBrk="1" latinLnBrk="0" hangingPunct="1">
+        <a:defRPr sz="1254" kern="1200">
           <a:solidFill>
             <a:schemeClr val="tx1"/>
           </a:solidFill>
@@ -4180,10 +5162,10 @@
       </p:grpSpPr>
       <p:pic>
         <p:nvPicPr>
-          <p:cNvPr id="5" name="Immagine 4">
+          <p:cNvPr id="76" name="Immagine 6">
             <a:extLst>
               <a:ext uri="{FF2B5EF4-FFF2-40B4-BE49-F238E27FC236}">
-                <a16:creationId xmlns:a16="http://schemas.microsoft.com/office/drawing/2014/main" id="{4985DDCB-5CB6-5BC9-0056-C09A0C7C5A32}"/>
+                <a16:creationId xmlns:a16="http://schemas.microsoft.com/office/drawing/2014/main" id="{871E9F37-2633-C94D-7124-C052F7F3446C}"/>
               </a:ext>
             </a:extLst>
           </p:cNvPr>
@@ -4205,8 +5187,8 @@
         </p:blipFill>
         <p:spPr>
           <a:xfrm>
-            <a:off x="3337809" y="2247102"/>
-            <a:ext cx="3240000" cy="1630341"/>
+            <a:off x="18588" y="6749842"/>
+            <a:ext cx="5723465" cy="2880000"/>
           </a:xfrm>
           <a:prstGeom prst="rect">
             <a:avLst/>
@@ -4215,10 +5197,10 @@
       </p:pic>
       <p:pic>
         <p:nvPicPr>
-          <p:cNvPr id="7" name="Immagine 6">
+          <p:cNvPr id="77" name="Immagine 8">
             <a:extLst>
               <a:ext uri="{FF2B5EF4-FFF2-40B4-BE49-F238E27FC236}">
-                <a16:creationId xmlns:a16="http://schemas.microsoft.com/office/drawing/2014/main" id="{871E9F37-2633-C94D-7124-C052F7F3446C}"/>
+                <a16:creationId xmlns:a16="http://schemas.microsoft.com/office/drawing/2014/main" id="{7C33DA90-2417-8085-3430-0F83A0257B0B}"/>
               </a:ext>
             </a:extLst>
           </p:cNvPr>
@@ -4240,8 +5222,8 @@
         </p:blipFill>
         <p:spPr>
           <a:xfrm>
-            <a:off x="9994" y="2247102"/>
-            <a:ext cx="3240000" cy="1630341"/>
+            <a:off x="1" y="3647835"/>
+            <a:ext cx="5723465" cy="2880000"/>
           </a:xfrm>
           <a:prstGeom prst="rect">
             <a:avLst/>
@@ -4250,10 +5232,10 @@
       </p:pic>
       <p:pic>
         <p:nvPicPr>
-          <p:cNvPr id="9" name="Immagine 8">
+          <p:cNvPr id="78" name="Immagine 10">
             <a:extLst>
               <a:ext uri="{FF2B5EF4-FFF2-40B4-BE49-F238E27FC236}">
-                <a16:creationId xmlns:a16="http://schemas.microsoft.com/office/drawing/2014/main" id="{7C33DA90-2417-8085-3430-0F83A0257B0B}"/>
+                <a16:creationId xmlns:a16="http://schemas.microsoft.com/office/drawing/2014/main" id="{E2ACEC1D-E5D1-9F10-A5BC-51A2C4D077AE}"/>
               </a:ext>
             </a:extLst>
           </p:cNvPr>
@@ -4275,8 +5257,8 @@
         </p:blipFill>
         <p:spPr>
           <a:xfrm>
-            <a:off x="3337809" y="529652"/>
-            <a:ext cx="3240000" cy="1630341"/>
+            <a:off x="1" y="545828"/>
+            <a:ext cx="5723465" cy="2880000"/>
           </a:xfrm>
           <a:prstGeom prst="rect">
             <a:avLst/>
@@ -4285,128 +5267,7 @@
       </p:pic>
       <p:pic>
         <p:nvPicPr>
-          <p:cNvPr id="11" name="Immagine 10">
-            <a:extLst>
-              <a:ext uri="{FF2B5EF4-FFF2-40B4-BE49-F238E27FC236}">
-                <a16:creationId xmlns:a16="http://schemas.microsoft.com/office/drawing/2014/main" id="{E2ACEC1D-E5D1-9F10-A5BC-51A2C4D077AE}"/>
-              </a:ext>
-            </a:extLst>
-          </p:cNvPr>
-          <p:cNvPicPr>
-            <a:picLocks noChangeAspect="1"/>
-          </p:cNvPicPr>
-          <p:nvPr/>
-        </p:nvPicPr>
-        <p:blipFill rotWithShape="1">
-          <a:blip r:embed="rId5">
-            <a:extLst>
-              <a:ext uri="{28A0092B-C50C-407E-A947-70E740481C1C}">
-                <a14:useLocalDpi xmlns:a14="http://schemas.microsoft.com/office/drawing/2010/main" val="0"/>
-              </a:ext>
-            </a:extLst>
-          </a:blip>
-          <a:srcRect l="7240" t="34444" r="7285" b="4764"/>
-          <a:stretch/>
-        </p:blipFill>
-        <p:spPr>
-          <a:xfrm>
-            <a:off x="9994" y="529652"/>
-            <a:ext cx="3240000" cy="1630341"/>
-          </a:xfrm>
-          <a:prstGeom prst="rect">
-            <a:avLst/>
-          </a:prstGeom>
-        </p:spPr>
-      </p:pic>
-      <p:cxnSp>
-        <p:nvCxnSpPr>
-          <p:cNvPr id="12" name="Straight Connector 88">
-            <a:extLst>
-              <a:ext uri="{FF2B5EF4-FFF2-40B4-BE49-F238E27FC236}">
-                <a16:creationId xmlns:a16="http://schemas.microsoft.com/office/drawing/2014/main" id="{3A0FA579-A86B-403C-BB7E-7C40FE7275E3}"/>
-              </a:ext>
-            </a:extLst>
-          </p:cNvPr>
-          <p:cNvCxnSpPr>
-            <a:cxnSpLocks/>
-          </p:cNvCxnSpPr>
-          <p:nvPr/>
-        </p:nvCxnSpPr>
-        <p:spPr>
-          <a:xfrm>
-            <a:off x="3292787" y="2202534"/>
-            <a:ext cx="0" cy="1685254"/>
-          </a:xfrm>
-          <a:prstGeom prst="line">
-            <a:avLst/>
-          </a:prstGeom>
-          <a:ln w="12700">
-            <a:solidFill>
-              <a:srgbClr val="FF0000"/>
-            </a:solidFill>
-          </a:ln>
-        </p:spPr>
-        <p:style>
-          <a:lnRef idx="1">
-            <a:schemeClr val="dk1"/>
-          </a:lnRef>
-          <a:fillRef idx="0">
-            <a:schemeClr val="dk1"/>
-          </a:fillRef>
-          <a:effectRef idx="0">
-            <a:schemeClr val="dk1"/>
-          </a:effectRef>
-          <a:fontRef idx="minor">
-            <a:schemeClr val="tx1"/>
-          </a:fontRef>
-        </p:style>
-      </p:cxnSp>
-      <p:cxnSp>
-        <p:nvCxnSpPr>
-          <p:cNvPr id="13" name="Straight Connector 89">
-            <a:extLst>
-              <a:ext uri="{FF2B5EF4-FFF2-40B4-BE49-F238E27FC236}">
-                <a16:creationId xmlns:a16="http://schemas.microsoft.com/office/drawing/2014/main" id="{45FAEEA4-3AD6-6555-8095-FD58585F4512}"/>
-              </a:ext>
-            </a:extLst>
-          </p:cNvPr>
-          <p:cNvCxnSpPr>
-            <a:cxnSpLocks/>
-          </p:cNvCxnSpPr>
-          <p:nvPr/>
-        </p:nvCxnSpPr>
-        <p:spPr>
-          <a:xfrm>
-            <a:off x="3290341" y="2202534"/>
-            <a:ext cx="3287468" cy="0"/>
-          </a:xfrm>
-          <a:prstGeom prst="line">
-            <a:avLst/>
-          </a:prstGeom>
-          <a:ln w="12700">
-            <a:solidFill>
-              <a:srgbClr val="FF0000"/>
-            </a:solidFill>
-          </a:ln>
-        </p:spPr>
-        <p:style>
-          <a:lnRef idx="1">
-            <a:schemeClr val="dk1"/>
-          </a:lnRef>
-          <a:fillRef idx="0">
-            <a:schemeClr val="dk1"/>
-          </a:fillRef>
-          <a:effectRef idx="0">
-            <a:schemeClr val="dk1"/>
-          </a:effectRef>
-          <a:fontRef idx="minor">
-            <a:schemeClr val="tx1"/>
-          </a:fontRef>
-        </p:style>
-      </p:cxnSp>
-      <p:pic>
-        <p:nvPicPr>
-          <p:cNvPr id="8" name="Picture 7" descr="A map of the world&#10;&#10;Description automatically generated">
+          <p:cNvPr id="79" name="Picture 78" descr="A map of the world&#10;&#10;Description automatically generated">
             <a:extLst>
               <a:ext uri="{FF2B5EF4-FFF2-40B4-BE49-F238E27FC236}">
                 <a16:creationId xmlns:a16="http://schemas.microsoft.com/office/drawing/2014/main" id="{0C185AEB-FBDC-4979-6408-BB4819BD4C96}"/>
@@ -4419,20 +5280,20 @@
           <p:nvPr/>
         </p:nvPicPr>
         <p:blipFill rotWithShape="1">
-          <a:blip r:embed="rId5">
+          <a:blip r:embed="rId4">
             <a:extLst>
               <a:ext uri="{28A0092B-C50C-407E-A947-70E740481C1C}">
                 <a14:useLocalDpi xmlns:a14="http://schemas.microsoft.com/office/drawing/2010/main" val="0"/>
               </a:ext>
             </a:extLst>
           </a:blip>
-          <a:srcRect l="7442" t="18368" r="7112" b="67576"/>
+          <a:srcRect l="11448" t="28921" r="11575" b="67576"/>
           <a:stretch/>
         </p:blipFill>
         <p:spPr>
-          <a:xfrm>
-            <a:off x="9995" y="158176"/>
-            <a:ext cx="3240000" cy="371476"/>
+          <a:xfrm rot="16200000">
+            <a:off x="1519132" y="5031371"/>
+            <a:ext cx="8841311" cy="280473"/>
           </a:xfrm>
           <a:prstGeom prst="rect">
             <a:avLst/>
@@ -4441,7 +5302,7 @@
       </p:pic>
       <p:sp>
         <p:nvSpPr>
-          <p:cNvPr id="10" name="TextBox 9">
+          <p:cNvPr id="80" name="TextBox 79">
             <a:extLst>
               <a:ext uri="{FF2B5EF4-FFF2-40B4-BE49-F238E27FC236}">
                 <a16:creationId xmlns:a16="http://schemas.microsoft.com/office/drawing/2014/main" id="{4FE095D0-F330-6D0B-8D62-E81D7A85EDDC}"/>
@@ -4453,8 +5314,8 @@
         </p:nvSpPr>
         <p:spPr>
           <a:xfrm>
-            <a:off x="50341" y="-43998"/>
-            <a:ext cx="3240000" cy="215444"/>
+            <a:off x="-60757" y="-43998"/>
+            <a:ext cx="6636921" cy="400110"/>
           </a:xfrm>
           <a:prstGeom prst="rect">
             <a:avLst/>
@@ -4467,35 +5328,89 @@
           </a:bodyPr>
           <a:lstStyle/>
           <a:p>
-            <a:pPr algn="ctr"/>
-            <a:r>
-              <a:rPr lang="en-US" sz="800" b="1" dirty="0">
+            <a:r>
+              <a:rPr lang="en-US" sz="1000" b="1" dirty="0">
                 <a:solidFill>
                   <a:schemeClr val="tx1">
-                    <a:lumMod val="65000"/>
-                    <a:lumOff val="35000"/>
+                    <a:lumMod val="85000"/>
+                    <a:lumOff val="15000"/>
                   </a:schemeClr>
                 </a:solidFill>
+                <a:latin typeface="Aptos" panose="020B0004020202020204" pitchFamily="34" charset="0"/>
               </a:rPr>
               <a:t>Probability [%] of tp &gt;= 10 mm/12h</a:t>
             </a:r>
-            <a:endParaRPr lang="en-GB" sz="800" b="1" dirty="0">
-              <a:solidFill>
-                <a:schemeClr val="tx1">
-                  <a:lumMod val="65000"/>
-                  <a:lumOff val="35000"/>
-                </a:schemeClr>
-              </a:solidFill>
-            </a:endParaRPr>
-          </a:p>
-        </p:txBody>
-      </p:sp>
-      <p:sp>
-        <p:nvSpPr>
-          <p:cNvPr id="14" name="TextBox 13">
+          </a:p>
+          <a:p>
+            <a:r>
+              <a:rPr lang="en-GB" sz="1000" dirty="0">
+                <a:solidFill>
+                  <a:schemeClr val="tx1">
+                    <a:lumMod val="85000"/>
+                    <a:lumOff val="15000"/>
+                  </a:schemeClr>
+                </a:solidFill>
+                <a:latin typeface="Aptos" panose="020B0004020202020204" pitchFamily="34" charset="0"/>
+              </a:rPr>
+              <a:t>FC: 09-12-2021 at 00 UTC (t+36,t+48), VT: 10</a:t>
+            </a:r>
+            <a:r>
+              <a:rPr lang="en-GB" sz="1000" baseline="30000" dirty="0">
+                <a:solidFill>
+                  <a:schemeClr val="tx1">
+                    <a:lumMod val="85000"/>
+                    <a:lumOff val="15000"/>
+                  </a:schemeClr>
+                </a:solidFill>
+                <a:latin typeface="Aptos" panose="020B0004020202020204" pitchFamily="34" charset="0"/>
+              </a:rPr>
+              <a:t>th</a:t>
+            </a:r>
+            <a:r>
+              <a:rPr lang="en-GB" sz="1000" dirty="0">
+                <a:solidFill>
+                  <a:schemeClr val="tx1">
+                    <a:lumMod val="85000"/>
+                    <a:lumOff val="15000"/>
+                  </a:schemeClr>
+                </a:solidFill>
+                <a:latin typeface="Aptos" panose="020B0004020202020204" pitchFamily="34" charset="0"/>
+              </a:rPr>
+              <a:t> December 2021 at 12 UTC and 11</a:t>
+            </a:r>
+            <a:r>
+              <a:rPr lang="en-GB" sz="1000" baseline="30000" dirty="0">
+                <a:solidFill>
+                  <a:schemeClr val="tx1">
+                    <a:lumMod val="85000"/>
+                    <a:lumOff val="15000"/>
+                  </a:schemeClr>
+                </a:solidFill>
+                <a:latin typeface="Aptos" panose="020B0004020202020204" pitchFamily="34" charset="0"/>
+              </a:rPr>
+              <a:t>th</a:t>
+            </a:r>
+            <a:r>
+              <a:rPr lang="en-GB" sz="1000" dirty="0">
+                <a:solidFill>
+                  <a:schemeClr val="tx1">
+                    <a:lumMod val="85000"/>
+                    <a:lumOff val="15000"/>
+                  </a:schemeClr>
+                </a:solidFill>
+                <a:latin typeface="Aptos" panose="020B0004020202020204" pitchFamily="34" charset="0"/>
+              </a:rPr>
+              <a:t> December 2021 at 00 UTC</a:t>
+            </a:r>
+          </a:p>
+        </p:txBody>
+      </p:sp>
+      <p:sp>
+        <p:nvSpPr>
+          <p:cNvPr id="81" name="TextBox 80">
             <a:extLst>
               <a:ext uri="{FF2B5EF4-FFF2-40B4-BE49-F238E27FC236}">
-                <a16:creationId xmlns:a16="http://schemas.microsoft.com/office/drawing/2014/main" id="{4F79B5CA-9846-C2A1-7E4D-ABD91AE0233C}"/>
+                <a16:creationId xmlns:a16="http://schemas.microsoft.com/office/drawing/2014/main" id="{76152E3D-3F02-0B1C-AA13-6F4BAB5BB0AF}"/>
               </a:ext>
             </a:extLst>
           </p:cNvPr>
@@ -4504,23 +5419,13 @@
         </p:nvSpPr>
         <p:spPr>
           <a:xfrm>
-            <a:off x="2382093" y="569600"/>
-            <a:ext cx="824125" cy="184666"/>
+            <a:off x="-60757" y="351153"/>
+            <a:ext cx="5723465" cy="246221"/>
           </a:xfrm>
           <a:prstGeom prst="rect">
             <a:avLst/>
           </a:prstGeom>
-          <a:solidFill>
-            <a:schemeClr val="bg1"/>
-          </a:solidFill>
-          <a:ln w="3175">
-            <a:solidFill>
-              <a:schemeClr val="tx1">
-                <a:lumMod val="65000"/>
-                <a:lumOff val="35000"/>
-              </a:schemeClr>
-            </a:solidFill>
-          </a:ln>
+          <a:noFill/>
         </p:spPr>
         <p:txBody>
           <a:bodyPr wrap="square" rtlCol="0">
@@ -4528,35 +5433,27 @@
           </a:bodyPr>
           <a:lstStyle/>
           <a:p>
-            <a:pPr algn="ctr"/>
-            <a:r>
-              <a:rPr lang="en-US" sz="600" dirty="0">
+            <a:r>
+              <a:rPr lang="en-GB" sz="1000" dirty="0">
                 <a:solidFill>
                   <a:schemeClr val="tx1">
-                    <a:lumMod val="65000"/>
-                    <a:lumOff val="35000"/>
+                    <a:lumMod val="50000"/>
+                    <a:lumOff val="50000"/>
                   </a:schemeClr>
                 </a:solidFill>
+                <a:latin typeface="Aptos" panose="020B0004020202020204" pitchFamily="34" charset="0"/>
               </a:rPr>
-              <a:t>ENS</a:t>
-            </a:r>
-            <a:endParaRPr lang="en-GB" sz="600" dirty="0">
-              <a:solidFill>
-                <a:schemeClr val="tx1">
-                  <a:lumMod val="65000"/>
-                  <a:lumOff val="35000"/>
-                </a:schemeClr>
-              </a:solidFill>
-            </a:endParaRPr>
-          </a:p>
-        </p:txBody>
-      </p:sp>
-      <p:sp>
-        <p:nvSpPr>
-          <p:cNvPr id="15" name="TextBox 14">
+              <a:t>(a) ECMWF ENSemble forecasts (ENS)</a:t>
+            </a:r>
+          </a:p>
+        </p:txBody>
+      </p:sp>
+      <p:sp>
+        <p:nvSpPr>
+          <p:cNvPr id="82" name="TextBox 81">
             <a:extLst>
               <a:ext uri="{FF2B5EF4-FFF2-40B4-BE49-F238E27FC236}">
-                <a16:creationId xmlns:a16="http://schemas.microsoft.com/office/drawing/2014/main" id="{C48DEC25-43DE-3CB2-AF8A-3C2A97F8F4D1}"/>
+                <a16:creationId xmlns:a16="http://schemas.microsoft.com/office/drawing/2014/main" id="{966D71FF-DE5A-3195-D4B3-EDC7395E6A95}"/>
               </a:ext>
             </a:extLst>
           </p:cNvPr>
@@ -4565,23 +5462,13 @@
         </p:nvSpPr>
         <p:spPr>
           <a:xfrm>
-            <a:off x="2382093" y="2286739"/>
-            <a:ext cx="824125" cy="184666"/>
+            <a:off x="-60757" y="3440903"/>
+            <a:ext cx="5723465" cy="246221"/>
           </a:xfrm>
           <a:prstGeom prst="rect">
             <a:avLst/>
           </a:prstGeom>
-          <a:solidFill>
-            <a:schemeClr val="bg1"/>
-          </a:solidFill>
-          <a:ln w="3175">
-            <a:solidFill>
-              <a:schemeClr val="tx1">
-                <a:lumMod val="65000"/>
-                <a:lumOff val="35000"/>
-              </a:schemeClr>
-            </a:solidFill>
-          </a:ln>
+          <a:noFill/>
         </p:spPr>
         <p:txBody>
           <a:bodyPr wrap="square" rtlCol="0">
@@ -4589,35 +5476,27 @@
           </a:bodyPr>
           <a:lstStyle/>
           <a:p>
-            <a:pPr algn="ctr"/>
-            <a:r>
-              <a:rPr lang="en-US" sz="600" dirty="0">
+            <a:r>
+              <a:rPr lang="en-GB" sz="1000" dirty="0">
                 <a:solidFill>
                   <a:schemeClr val="tx1">
-                    <a:lumMod val="65000"/>
-                    <a:lumOff val="35000"/>
+                    <a:lumMod val="50000"/>
+                    <a:lumOff val="50000"/>
                   </a:schemeClr>
                 </a:solidFill>
+                <a:latin typeface="Aptos" panose="020B0004020202020204" pitchFamily="34" charset="0"/>
               </a:rPr>
-              <a:t>Multiple-WT ecPoint</a:t>
-            </a:r>
-            <a:endParaRPr lang="en-GB" sz="600" dirty="0">
-              <a:solidFill>
-                <a:schemeClr val="tx1">
-                  <a:lumMod val="65000"/>
-                  <a:lumOff val="35000"/>
-                </a:schemeClr>
-              </a:solidFill>
-            </a:endParaRPr>
-          </a:p>
-        </p:txBody>
-      </p:sp>
-      <p:sp>
-        <p:nvSpPr>
-          <p:cNvPr id="16" name="TextBox 15">
+              <a:t>(b) Univariate ecPoint (U-ecPoint)</a:t>
+            </a:r>
+          </a:p>
+        </p:txBody>
+      </p:sp>
+      <p:sp>
+        <p:nvSpPr>
+          <p:cNvPr id="83" name="TextBox 82">
             <a:extLst>
               <a:ext uri="{FF2B5EF4-FFF2-40B4-BE49-F238E27FC236}">
-                <a16:creationId xmlns:a16="http://schemas.microsoft.com/office/drawing/2014/main" id="{7A140EFE-E9C2-3A10-FD69-64FE12C4CE44}"/>
+                <a16:creationId xmlns:a16="http://schemas.microsoft.com/office/drawing/2014/main" id="{7F65EB5E-8C99-2898-308D-4B7B6240EE93}"/>
               </a:ext>
             </a:extLst>
           </p:cNvPr>
@@ -4626,23 +5505,13 @@
         </p:nvSpPr>
         <p:spPr>
           <a:xfrm>
-            <a:off x="5714325" y="569600"/>
-            <a:ext cx="824125" cy="184666"/>
+            <a:off x="-60757" y="6547813"/>
+            <a:ext cx="5723465" cy="246221"/>
           </a:xfrm>
           <a:prstGeom prst="rect">
             <a:avLst/>
           </a:prstGeom>
-          <a:solidFill>
-            <a:schemeClr val="bg1"/>
-          </a:solidFill>
-          <a:ln w="3175">
-            <a:solidFill>
-              <a:schemeClr val="tx1">
-                <a:lumMod val="65000"/>
-                <a:lumOff val="35000"/>
-              </a:schemeClr>
-            </a:solidFill>
-          </a:ln>
+          <a:noFill/>
         </p:spPr>
         <p:txBody>
           <a:bodyPr wrap="square" rtlCol="0">
@@ -4650,35 +5519,27 @@
           </a:bodyPr>
           <a:lstStyle/>
           <a:p>
-            <a:pPr algn="ctr"/>
-            <a:r>
-              <a:rPr lang="en-US" sz="600" dirty="0">
+            <a:r>
+              <a:rPr lang="en-GB" sz="1000" dirty="0">
                 <a:solidFill>
                   <a:schemeClr val="tx1">
-                    <a:lumMod val="65000"/>
-                    <a:lumOff val="35000"/>
+                    <a:lumMod val="50000"/>
+                    <a:lumOff val="50000"/>
                   </a:schemeClr>
                 </a:solidFill>
+                <a:latin typeface="Aptos" panose="020B0004020202020204" pitchFamily="34" charset="0"/>
               </a:rPr>
-              <a:t>Single-WT ecPoint</a:t>
-            </a:r>
-            <a:endParaRPr lang="en-GB" sz="600" dirty="0">
-              <a:solidFill>
-                <a:schemeClr val="tx1">
-                  <a:lumMod val="65000"/>
-                  <a:lumOff val="35000"/>
-                </a:schemeClr>
-              </a:solidFill>
-            </a:endParaRPr>
-          </a:p>
-        </p:txBody>
-      </p:sp>
-      <p:sp>
-        <p:nvSpPr>
-          <p:cNvPr id="17" name="TextBox 16">
+              <a:t>(c) Multivariate ecPoint (M-ecPoint)</a:t>
+            </a:r>
+          </a:p>
+        </p:txBody>
+      </p:sp>
+      <p:sp>
+        <p:nvSpPr>
+          <p:cNvPr id="84" name="TextBox 83">
             <a:extLst>
               <a:ext uri="{FF2B5EF4-FFF2-40B4-BE49-F238E27FC236}">
-                <a16:creationId xmlns:a16="http://schemas.microsoft.com/office/drawing/2014/main" id="{D9B8CD13-EBE6-3643-4AFB-D0DACE221007}"/>
+                <a16:creationId xmlns:a16="http://schemas.microsoft.com/office/drawing/2014/main" id="{A2EB6F06-395D-9318-4EA7-3D2A87F7A7F8}"/>
               </a:ext>
             </a:extLst>
           </p:cNvPr>
@@ -4687,23 +5548,13 @@
         </p:nvSpPr>
         <p:spPr>
           <a:xfrm>
-            <a:off x="5489212" y="3626393"/>
-            <a:ext cx="1054848" cy="215444"/>
+            <a:off x="6002861" y="662153"/>
+            <a:ext cx="433315" cy="246221"/>
           </a:xfrm>
           <a:prstGeom prst="rect">
             <a:avLst/>
           </a:prstGeom>
-          <a:solidFill>
-            <a:schemeClr val="bg1"/>
-          </a:solidFill>
-          <a:ln w="3175">
-            <a:solidFill>
-              <a:schemeClr val="tx1">
-                <a:lumMod val="65000"/>
-                <a:lumOff val="35000"/>
-              </a:schemeClr>
-            </a:solidFill>
-          </a:ln>
+          <a:noFill/>
         </p:spPr>
         <p:txBody>
           <a:bodyPr wrap="square" rtlCol="0">
@@ -4711,35 +5562,27 @@
           </a:bodyPr>
           <a:lstStyle/>
           <a:p>
-            <a:pPr algn="ctr"/>
-            <a:r>
-              <a:rPr lang="en-US" sz="800" b="1" dirty="0">
+            <a:r>
+              <a:rPr lang="en-GB" sz="1000" dirty="0">
                 <a:solidFill>
                   <a:schemeClr val="tx1">
-                    <a:lumMod val="65000"/>
-                    <a:lumOff val="35000"/>
+                    <a:lumMod val="50000"/>
+                    <a:lumOff val="50000"/>
                   </a:schemeClr>
                 </a:solidFill>
+                <a:latin typeface="Aptos" panose="020B0004020202020204" pitchFamily="34" charset="0"/>
               </a:rPr>
-              <a:t>Rain gauge locations</a:t>
-            </a:r>
-            <a:endParaRPr lang="en-GB" sz="800" b="1" dirty="0">
-              <a:solidFill>
-                <a:schemeClr val="tx1">
-                  <a:lumMod val="65000"/>
-                  <a:lumOff val="35000"/>
-                </a:schemeClr>
-              </a:solidFill>
-            </a:endParaRPr>
-          </a:p>
-        </p:txBody>
-      </p:sp>
-      <p:sp>
-        <p:nvSpPr>
-          <p:cNvPr id="18" name="TextBox 17">
+              <a:t>100</a:t>
+            </a:r>
+          </a:p>
+        </p:txBody>
+      </p:sp>
+      <p:sp>
+        <p:nvSpPr>
+          <p:cNvPr id="85" name="TextBox 84">
             <a:extLst>
               <a:ext uri="{FF2B5EF4-FFF2-40B4-BE49-F238E27FC236}">
-                <a16:creationId xmlns:a16="http://schemas.microsoft.com/office/drawing/2014/main" id="{EB584B3D-ED06-B266-CA62-9934C712A3F8}"/>
+                <a16:creationId xmlns:a16="http://schemas.microsoft.com/office/drawing/2014/main" id="{6325FE5D-06ED-04EF-69C0-BD0EBDC8BD88}"/>
               </a:ext>
             </a:extLst>
           </p:cNvPr>
@@ -4748,23 +5591,13 @@
         </p:nvSpPr>
         <p:spPr>
           <a:xfrm>
-            <a:off x="53555" y="1916822"/>
-            <a:ext cx="180000" cy="180000"/>
+            <a:off x="6002861" y="1497641"/>
+            <a:ext cx="433315" cy="246221"/>
           </a:xfrm>
           <a:prstGeom prst="rect">
             <a:avLst/>
           </a:prstGeom>
-          <a:solidFill>
-            <a:schemeClr val="bg1"/>
-          </a:solidFill>
-          <a:ln w="3175">
-            <a:solidFill>
-              <a:schemeClr val="tx1">
-                <a:lumMod val="65000"/>
-                <a:lumOff val="35000"/>
-              </a:schemeClr>
-            </a:solidFill>
-          </a:ln>
+          <a:noFill/>
         </p:spPr>
         <p:txBody>
           <a:bodyPr wrap="square" rtlCol="0">
@@ -4772,35 +5605,27 @@
           </a:bodyPr>
           <a:lstStyle/>
           <a:p>
-            <a:pPr algn="ctr"/>
-            <a:r>
-              <a:rPr lang="en-US" sz="600" dirty="0">
+            <a:r>
+              <a:rPr lang="en-GB" sz="1000" dirty="0">
                 <a:solidFill>
                   <a:schemeClr val="tx1">
-                    <a:lumMod val="65000"/>
-                    <a:lumOff val="35000"/>
+                    <a:lumMod val="50000"/>
+                    <a:lumOff val="50000"/>
                   </a:schemeClr>
                 </a:solidFill>
+                <a:latin typeface="Aptos" panose="020B0004020202020204" pitchFamily="34" charset="0"/>
               </a:rPr>
-              <a:t>a</a:t>
-            </a:r>
-            <a:endParaRPr lang="en-GB" sz="600" dirty="0">
-              <a:solidFill>
-                <a:schemeClr val="tx1">
-                  <a:lumMod val="65000"/>
-                  <a:lumOff val="35000"/>
-                </a:schemeClr>
-              </a:solidFill>
-            </a:endParaRPr>
-          </a:p>
-        </p:txBody>
-      </p:sp>
-      <p:sp>
-        <p:nvSpPr>
-          <p:cNvPr id="19" name="TextBox 18">
+              <a:t>80.5</a:t>
+            </a:r>
+          </a:p>
+        </p:txBody>
+      </p:sp>
+      <p:sp>
+        <p:nvSpPr>
+          <p:cNvPr id="86" name="TextBox 85">
             <a:extLst>
               <a:ext uri="{FF2B5EF4-FFF2-40B4-BE49-F238E27FC236}">
-                <a16:creationId xmlns:a16="http://schemas.microsoft.com/office/drawing/2014/main" id="{7E3CEC12-94E9-EB0F-1D95-91E649E86A7F}"/>
+                <a16:creationId xmlns:a16="http://schemas.microsoft.com/office/drawing/2014/main" id="{6835EBA5-C264-52F1-869D-3FD37CDE780F}"/>
               </a:ext>
             </a:extLst>
           </p:cNvPr>
@@ -4809,23 +5634,13 @@
         </p:nvSpPr>
         <p:spPr>
           <a:xfrm>
-            <a:off x="53555" y="3637279"/>
-            <a:ext cx="180000" cy="184666"/>
+            <a:off x="6002861" y="1079897"/>
+            <a:ext cx="433315" cy="246221"/>
           </a:xfrm>
           <a:prstGeom prst="rect">
             <a:avLst/>
           </a:prstGeom>
-          <a:solidFill>
-            <a:schemeClr val="bg1"/>
-          </a:solidFill>
-          <a:ln w="3175">
-            <a:solidFill>
-              <a:schemeClr val="tx1">
-                <a:lumMod val="65000"/>
-                <a:lumOff val="35000"/>
-              </a:schemeClr>
-            </a:solidFill>
-          </a:ln>
+          <a:noFill/>
         </p:spPr>
         <p:txBody>
           <a:bodyPr wrap="square" rtlCol="0">
@@ -4833,35 +5648,27 @@
           </a:bodyPr>
           <a:lstStyle/>
           <a:p>
-            <a:pPr algn="ctr"/>
-            <a:r>
-              <a:rPr lang="en-US" sz="600" dirty="0">
+            <a:r>
+              <a:rPr lang="en-GB" sz="1000" dirty="0">
                 <a:solidFill>
                   <a:schemeClr val="tx1">
-                    <a:lumMod val="65000"/>
-                    <a:lumOff val="35000"/>
+                    <a:lumMod val="50000"/>
+                    <a:lumOff val="50000"/>
                   </a:schemeClr>
                 </a:solidFill>
+                <a:latin typeface="Aptos" panose="020B0004020202020204" pitchFamily="34" charset="0"/>
               </a:rPr>
-              <a:t>b</a:t>
-            </a:r>
-            <a:endParaRPr lang="en-GB" sz="600" dirty="0">
-              <a:solidFill>
-                <a:schemeClr val="tx1">
-                  <a:lumMod val="65000"/>
-                  <a:lumOff val="35000"/>
-                </a:schemeClr>
-              </a:solidFill>
-            </a:endParaRPr>
-          </a:p>
-        </p:txBody>
-      </p:sp>
-      <p:sp>
-        <p:nvSpPr>
-          <p:cNvPr id="20" name="TextBox 19">
+              <a:t>90.5</a:t>
+            </a:r>
+          </a:p>
+        </p:txBody>
+      </p:sp>
+      <p:sp>
+        <p:nvSpPr>
+          <p:cNvPr id="87" name="TextBox 86">
             <a:extLst>
               <a:ext uri="{FF2B5EF4-FFF2-40B4-BE49-F238E27FC236}">
-                <a16:creationId xmlns:a16="http://schemas.microsoft.com/office/drawing/2014/main" id="{19FBFF87-0A12-838B-30AC-E0AE75911D4D}"/>
+                <a16:creationId xmlns:a16="http://schemas.microsoft.com/office/drawing/2014/main" id="{62D88A45-D06C-5F31-091D-286DBD29E7C0}"/>
               </a:ext>
             </a:extLst>
           </p:cNvPr>
@@ -4870,23 +5677,13 @@
         </p:nvSpPr>
         <p:spPr>
           <a:xfrm>
-            <a:off x="3385355" y="1910743"/>
-            <a:ext cx="180000" cy="184666"/>
+            <a:off x="6002861" y="2333129"/>
+            <a:ext cx="433315" cy="246221"/>
           </a:xfrm>
           <a:prstGeom prst="rect">
             <a:avLst/>
           </a:prstGeom>
-          <a:solidFill>
-            <a:schemeClr val="bg1"/>
-          </a:solidFill>
-          <a:ln w="3175">
-            <a:solidFill>
-              <a:schemeClr val="tx1">
-                <a:lumMod val="65000"/>
-                <a:lumOff val="35000"/>
-              </a:schemeClr>
-            </a:solidFill>
-          </a:ln>
+          <a:noFill/>
         </p:spPr>
         <p:txBody>
           <a:bodyPr wrap="square" rtlCol="0">
@@ -4894,35 +5691,27 @@
           </a:bodyPr>
           <a:lstStyle/>
           <a:p>
-            <a:pPr algn="ctr"/>
-            <a:r>
-              <a:rPr lang="en-US" sz="600" dirty="0">
+            <a:r>
+              <a:rPr lang="en-GB" sz="1000" dirty="0">
                 <a:solidFill>
                   <a:schemeClr val="tx1">
-                    <a:lumMod val="65000"/>
-                    <a:lumOff val="35000"/>
+                    <a:lumMod val="50000"/>
+                    <a:lumOff val="50000"/>
                   </a:schemeClr>
                 </a:solidFill>
+                <a:latin typeface="Aptos" panose="020B0004020202020204" pitchFamily="34" charset="0"/>
               </a:rPr>
-              <a:t>c</a:t>
-            </a:r>
-            <a:endParaRPr lang="en-GB" sz="600" dirty="0">
-              <a:solidFill>
-                <a:schemeClr val="tx1">
-                  <a:lumMod val="65000"/>
-                  <a:lumOff val="35000"/>
-                </a:schemeClr>
-              </a:solidFill>
-            </a:endParaRPr>
-          </a:p>
-        </p:txBody>
-      </p:sp>
-      <p:sp>
-        <p:nvSpPr>
-          <p:cNvPr id="21" name="TextBox 20">
+              <a:t>60.5</a:t>
+            </a:r>
+          </a:p>
+        </p:txBody>
+      </p:sp>
+      <p:sp>
+        <p:nvSpPr>
+          <p:cNvPr id="88" name="TextBox 87">
             <a:extLst>
               <a:ext uri="{FF2B5EF4-FFF2-40B4-BE49-F238E27FC236}">
-                <a16:creationId xmlns:a16="http://schemas.microsoft.com/office/drawing/2014/main" id="{24F131B5-43EF-80FE-3944-8BCAD68A7A72}"/>
+                <a16:creationId xmlns:a16="http://schemas.microsoft.com/office/drawing/2014/main" id="{75935094-04FA-6918-ACA5-B36AC7E6F57D}"/>
               </a:ext>
             </a:extLst>
           </p:cNvPr>
@@ -4931,23 +5720,13 @@
         </p:nvSpPr>
         <p:spPr>
           <a:xfrm>
-            <a:off x="3385355" y="3637279"/>
-            <a:ext cx="180000" cy="184666"/>
+            <a:off x="6002861" y="1915385"/>
+            <a:ext cx="433315" cy="246221"/>
           </a:xfrm>
           <a:prstGeom prst="rect">
             <a:avLst/>
           </a:prstGeom>
-          <a:solidFill>
-            <a:schemeClr val="bg1"/>
-          </a:solidFill>
-          <a:ln w="3175">
-            <a:solidFill>
-              <a:schemeClr val="tx1">
-                <a:lumMod val="65000"/>
-                <a:lumOff val="35000"/>
-              </a:schemeClr>
-            </a:solidFill>
-          </a:ln>
+          <a:noFill/>
         </p:spPr>
         <p:txBody>
           <a:bodyPr wrap="square" rtlCol="0">
@@ -4955,26 +5734,793 @@
           </a:bodyPr>
           <a:lstStyle/>
           <a:p>
-            <a:pPr algn="ctr"/>
-            <a:r>
-              <a:rPr lang="en-US" sz="600" dirty="0">
+            <a:r>
+              <a:rPr lang="en-GB" sz="1000" dirty="0">
                 <a:solidFill>
                   <a:schemeClr val="tx1">
-                    <a:lumMod val="65000"/>
-                    <a:lumOff val="35000"/>
+                    <a:lumMod val="50000"/>
+                    <a:lumOff val="50000"/>
                   </a:schemeClr>
                 </a:solidFill>
+                <a:latin typeface="Aptos" panose="020B0004020202020204" pitchFamily="34" charset="0"/>
               </a:rPr>
-              <a:t>d</a:t>
-            </a:r>
-            <a:endParaRPr lang="en-GB" sz="600" dirty="0">
-              <a:solidFill>
-                <a:schemeClr val="tx1">
-                  <a:lumMod val="65000"/>
-                  <a:lumOff val="35000"/>
-                </a:schemeClr>
-              </a:solidFill>
-            </a:endParaRPr>
+              <a:t>70.5</a:t>
+            </a:r>
+          </a:p>
+        </p:txBody>
+      </p:sp>
+      <p:sp>
+        <p:nvSpPr>
+          <p:cNvPr id="89" name="TextBox 88">
+            <a:extLst>
+              <a:ext uri="{FF2B5EF4-FFF2-40B4-BE49-F238E27FC236}">
+                <a16:creationId xmlns:a16="http://schemas.microsoft.com/office/drawing/2014/main" id="{9E57529D-A32C-E6A8-C317-F2B525741717}"/>
+              </a:ext>
+            </a:extLst>
+          </p:cNvPr>
+          <p:cNvSpPr txBox="1"/>
+          <p:nvPr/>
+        </p:nvSpPr>
+        <p:spPr>
+          <a:xfrm>
+            <a:off x="6002861" y="3168617"/>
+            <a:ext cx="433315" cy="246221"/>
+          </a:xfrm>
+          <a:prstGeom prst="rect">
+            <a:avLst/>
+          </a:prstGeom>
+          <a:noFill/>
+        </p:spPr>
+        <p:txBody>
+          <a:bodyPr wrap="square" rtlCol="0">
+            <a:spAutoFit/>
+          </a:bodyPr>
+          <a:lstStyle/>
+          <a:p>
+            <a:r>
+              <a:rPr lang="en-GB" sz="1000" dirty="0">
+                <a:solidFill>
+                  <a:schemeClr val="tx1">
+                    <a:lumMod val="50000"/>
+                    <a:lumOff val="50000"/>
+                  </a:schemeClr>
+                </a:solidFill>
+                <a:latin typeface="Aptos" panose="020B0004020202020204" pitchFamily="34" charset="0"/>
+              </a:rPr>
+              <a:t>40.5</a:t>
+            </a:r>
+          </a:p>
+        </p:txBody>
+      </p:sp>
+      <p:sp>
+        <p:nvSpPr>
+          <p:cNvPr id="90" name="TextBox 89">
+            <a:extLst>
+              <a:ext uri="{FF2B5EF4-FFF2-40B4-BE49-F238E27FC236}">
+                <a16:creationId xmlns:a16="http://schemas.microsoft.com/office/drawing/2014/main" id="{C39289CC-107A-6BD7-94AC-9B2E82E9DD2E}"/>
+              </a:ext>
+            </a:extLst>
+          </p:cNvPr>
+          <p:cNvSpPr txBox="1"/>
+          <p:nvPr/>
+        </p:nvSpPr>
+        <p:spPr>
+          <a:xfrm>
+            <a:off x="6002861" y="2750873"/>
+            <a:ext cx="433315" cy="246221"/>
+          </a:xfrm>
+          <a:prstGeom prst="rect">
+            <a:avLst/>
+          </a:prstGeom>
+          <a:noFill/>
+        </p:spPr>
+        <p:txBody>
+          <a:bodyPr wrap="square" rtlCol="0">
+            <a:spAutoFit/>
+          </a:bodyPr>
+          <a:lstStyle/>
+          <a:p>
+            <a:r>
+              <a:rPr lang="en-GB" sz="1000" dirty="0">
+                <a:solidFill>
+                  <a:schemeClr val="tx1">
+                    <a:lumMod val="50000"/>
+                    <a:lumOff val="50000"/>
+                  </a:schemeClr>
+                </a:solidFill>
+                <a:latin typeface="Aptos" panose="020B0004020202020204" pitchFamily="34" charset="0"/>
+              </a:rPr>
+              <a:t>50.5</a:t>
+            </a:r>
+          </a:p>
+        </p:txBody>
+      </p:sp>
+      <p:sp>
+        <p:nvSpPr>
+          <p:cNvPr id="91" name="TextBox 90">
+            <a:extLst>
+              <a:ext uri="{FF2B5EF4-FFF2-40B4-BE49-F238E27FC236}">
+                <a16:creationId xmlns:a16="http://schemas.microsoft.com/office/drawing/2014/main" id="{FF26949D-6692-5742-5359-EF2280524EB6}"/>
+              </a:ext>
+            </a:extLst>
+          </p:cNvPr>
+          <p:cNvSpPr txBox="1"/>
+          <p:nvPr/>
+        </p:nvSpPr>
+        <p:spPr>
+          <a:xfrm>
+            <a:off x="6002861" y="4004105"/>
+            <a:ext cx="433315" cy="246221"/>
+          </a:xfrm>
+          <a:prstGeom prst="rect">
+            <a:avLst/>
+          </a:prstGeom>
+          <a:noFill/>
+        </p:spPr>
+        <p:txBody>
+          <a:bodyPr wrap="square" rtlCol="0">
+            <a:spAutoFit/>
+          </a:bodyPr>
+          <a:lstStyle/>
+          <a:p>
+            <a:r>
+              <a:rPr lang="en-GB" sz="1000" dirty="0">
+                <a:solidFill>
+                  <a:schemeClr val="tx1">
+                    <a:lumMod val="50000"/>
+                    <a:lumOff val="50000"/>
+                  </a:schemeClr>
+                </a:solidFill>
+                <a:latin typeface="Aptos" panose="020B0004020202020204" pitchFamily="34" charset="0"/>
+              </a:rPr>
+              <a:t>30.5</a:t>
+            </a:r>
+          </a:p>
+        </p:txBody>
+      </p:sp>
+      <p:sp>
+        <p:nvSpPr>
+          <p:cNvPr id="92" name="TextBox 91">
+            <a:extLst>
+              <a:ext uri="{FF2B5EF4-FFF2-40B4-BE49-F238E27FC236}">
+                <a16:creationId xmlns:a16="http://schemas.microsoft.com/office/drawing/2014/main" id="{47674D0E-8DEC-D619-FD5C-6291A6CB1F74}"/>
+              </a:ext>
+            </a:extLst>
+          </p:cNvPr>
+          <p:cNvSpPr txBox="1"/>
+          <p:nvPr/>
+        </p:nvSpPr>
+        <p:spPr>
+          <a:xfrm>
+            <a:off x="6002861" y="3586361"/>
+            <a:ext cx="433315" cy="246221"/>
+          </a:xfrm>
+          <a:prstGeom prst="rect">
+            <a:avLst/>
+          </a:prstGeom>
+          <a:noFill/>
+        </p:spPr>
+        <p:txBody>
+          <a:bodyPr wrap="square" rtlCol="0">
+            <a:spAutoFit/>
+          </a:bodyPr>
+          <a:lstStyle/>
+          <a:p>
+            <a:r>
+              <a:rPr lang="en-GB" sz="1000" dirty="0">
+                <a:solidFill>
+                  <a:schemeClr val="tx1">
+                    <a:lumMod val="50000"/>
+                    <a:lumOff val="50000"/>
+                  </a:schemeClr>
+                </a:solidFill>
+                <a:latin typeface="Aptos" panose="020B0004020202020204" pitchFamily="34" charset="0"/>
+              </a:rPr>
+              <a:t>35.5</a:t>
+            </a:r>
+          </a:p>
+        </p:txBody>
+      </p:sp>
+      <p:sp>
+        <p:nvSpPr>
+          <p:cNvPr id="93" name="TextBox 92">
+            <a:extLst>
+              <a:ext uri="{FF2B5EF4-FFF2-40B4-BE49-F238E27FC236}">
+                <a16:creationId xmlns:a16="http://schemas.microsoft.com/office/drawing/2014/main" id="{65BFDB0F-0CA5-5859-DF80-49AB12F1C7A0}"/>
+              </a:ext>
+            </a:extLst>
+          </p:cNvPr>
+          <p:cNvSpPr txBox="1"/>
+          <p:nvPr/>
+        </p:nvSpPr>
+        <p:spPr>
+          <a:xfrm>
+            <a:off x="6002861" y="4839593"/>
+            <a:ext cx="433315" cy="246221"/>
+          </a:xfrm>
+          <a:prstGeom prst="rect">
+            <a:avLst/>
+          </a:prstGeom>
+          <a:noFill/>
+        </p:spPr>
+        <p:txBody>
+          <a:bodyPr wrap="square" rtlCol="0">
+            <a:spAutoFit/>
+          </a:bodyPr>
+          <a:lstStyle/>
+          <a:p>
+            <a:r>
+              <a:rPr lang="en-GB" sz="1000" dirty="0">
+                <a:solidFill>
+                  <a:schemeClr val="tx1">
+                    <a:lumMod val="50000"/>
+                    <a:lumOff val="50000"/>
+                  </a:schemeClr>
+                </a:solidFill>
+                <a:latin typeface="Aptos" panose="020B0004020202020204" pitchFamily="34" charset="0"/>
+              </a:rPr>
+              <a:t>20.5</a:t>
+            </a:r>
+          </a:p>
+        </p:txBody>
+      </p:sp>
+      <p:sp>
+        <p:nvSpPr>
+          <p:cNvPr id="94" name="TextBox 93">
+            <a:extLst>
+              <a:ext uri="{FF2B5EF4-FFF2-40B4-BE49-F238E27FC236}">
+                <a16:creationId xmlns:a16="http://schemas.microsoft.com/office/drawing/2014/main" id="{B3053355-9D65-6A39-B80E-FE5297F3F1D7}"/>
+              </a:ext>
+            </a:extLst>
+          </p:cNvPr>
+          <p:cNvSpPr txBox="1"/>
+          <p:nvPr/>
+        </p:nvSpPr>
+        <p:spPr>
+          <a:xfrm>
+            <a:off x="6002861" y="4421849"/>
+            <a:ext cx="433315" cy="246221"/>
+          </a:xfrm>
+          <a:prstGeom prst="rect">
+            <a:avLst/>
+          </a:prstGeom>
+          <a:noFill/>
+        </p:spPr>
+        <p:txBody>
+          <a:bodyPr wrap="square" rtlCol="0">
+            <a:spAutoFit/>
+          </a:bodyPr>
+          <a:lstStyle/>
+          <a:p>
+            <a:r>
+              <a:rPr lang="en-GB" sz="1000" dirty="0">
+                <a:solidFill>
+                  <a:schemeClr val="tx1">
+                    <a:lumMod val="50000"/>
+                    <a:lumOff val="50000"/>
+                  </a:schemeClr>
+                </a:solidFill>
+                <a:latin typeface="Aptos" panose="020B0004020202020204" pitchFamily="34" charset="0"/>
+              </a:rPr>
+              <a:t>25.5</a:t>
+            </a:r>
+          </a:p>
+        </p:txBody>
+      </p:sp>
+      <p:sp>
+        <p:nvSpPr>
+          <p:cNvPr id="95" name="TextBox 94">
+            <a:extLst>
+              <a:ext uri="{FF2B5EF4-FFF2-40B4-BE49-F238E27FC236}">
+                <a16:creationId xmlns:a16="http://schemas.microsoft.com/office/drawing/2014/main" id="{6585FA76-FE82-6B72-5C97-E976DBC6F5A2}"/>
+              </a:ext>
+            </a:extLst>
+          </p:cNvPr>
+          <p:cNvSpPr txBox="1"/>
+          <p:nvPr/>
+        </p:nvSpPr>
+        <p:spPr>
+          <a:xfrm>
+            <a:off x="6002861" y="5675081"/>
+            <a:ext cx="433315" cy="246221"/>
+          </a:xfrm>
+          <a:prstGeom prst="rect">
+            <a:avLst/>
+          </a:prstGeom>
+          <a:noFill/>
+        </p:spPr>
+        <p:txBody>
+          <a:bodyPr wrap="square" rtlCol="0">
+            <a:spAutoFit/>
+          </a:bodyPr>
+          <a:lstStyle/>
+          <a:p>
+            <a:r>
+              <a:rPr lang="en-GB" sz="1000" dirty="0">
+                <a:solidFill>
+                  <a:schemeClr val="tx1">
+                    <a:lumMod val="50000"/>
+                    <a:lumOff val="50000"/>
+                  </a:schemeClr>
+                </a:solidFill>
+                <a:latin typeface="Aptos" panose="020B0004020202020204" pitchFamily="34" charset="0"/>
+              </a:rPr>
+              <a:t>13.5</a:t>
+            </a:r>
+          </a:p>
+        </p:txBody>
+      </p:sp>
+      <p:sp>
+        <p:nvSpPr>
+          <p:cNvPr id="96" name="TextBox 95">
+            <a:extLst>
+              <a:ext uri="{FF2B5EF4-FFF2-40B4-BE49-F238E27FC236}">
+                <a16:creationId xmlns:a16="http://schemas.microsoft.com/office/drawing/2014/main" id="{CA1C67A3-7D6D-0980-C65E-1A4EC6D02F65}"/>
+              </a:ext>
+            </a:extLst>
+          </p:cNvPr>
+          <p:cNvSpPr txBox="1"/>
+          <p:nvPr/>
+        </p:nvSpPr>
+        <p:spPr>
+          <a:xfrm>
+            <a:off x="6002861" y="5257337"/>
+            <a:ext cx="433315" cy="246221"/>
+          </a:xfrm>
+          <a:prstGeom prst="rect">
+            <a:avLst/>
+          </a:prstGeom>
+          <a:noFill/>
+        </p:spPr>
+        <p:txBody>
+          <a:bodyPr wrap="square" rtlCol="0">
+            <a:spAutoFit/>
+          </a:bodyPr>
+          <a:lstStyle/>
+          <a:p>
+            <a:r>
+              <a:rPr lang="en-GB" sz="1000" dirty="0">
+                <a:solidFill>
+                  <a:schemeClr val="tx1">
+                    <a:lumMod val="50000"/>
+                    <a:lumOff val="50000"/>
+                  </a:schemeClr>
+                </a:solidFill>
+                <a:latin typeface="Aptos" panose="020B0004020202020204" pitchFamily="34" charset="0"/>
+              </a:rPr>
+              <a:t>16.5</a:t>
+            </a:r>
+          </a:p>
+        </p:txBody>
+      </p:sp>
+      <p:sp>
+        <p:nvSpPr>
+          <p:cNvPr id="97" name="TextBox 96">
+            <a:extLst>
+              <a:ext uri="{FF2B5EF4-FFF2-40B4-BE49-F238E27FC236}">
+                <a16:creationId xmlns:a16="http://schemas.microsoft.com/office/drawing/2014/main" id="{971E2717-DEED-4972-6287-82BB16781D3B}"/>
+              </a:ext>
+            </a:extLst>
+          </p:cNvPr>
+          <p:cNvSpPr txBox="1"/>
+          <p:nvPr/>
+        </p:nvSpPr>
+        <p:spPr>
+          <a:xfrm>
+            <a:off x="6002861" y="6510569"/>
+            <a:ext cx="433315" cy="246221"/>
+          </a:xfrm>
+          <a:prstGeom prst="rect">
+            <a:avLst/>
+          </a:prstGeom>
+          <a:noFill/>
+        </p:spPr>
+        <p:txBody>
+          <a:bodyPr wrap="square" rtlCol="0">
+            <a:spAutoFit/>
+          </a:bodyPr>
+          <a:lstStyle/>
+          <a:p>
+            <a:r>
+              <a:rPr lang="en-GB" sz="1000" dirty="0">
+                <a:solidFill>
+                  <a:schemeClr val="tx1">
+                    <a:lumMod val="50000"/>
+                    <a:lumOff val="50000"/>
+                  </a:schemeClr>
+                </a:solidFill>
+                <a:latin typeface="Aptos" panose="020B0004020202020204" pitchFamily="34" charset="0"/>
+              </a:rPr>
+              <a:t>8.5</a:t>
+            </a:r>
+          </a:p>
+        </p:txBody>
+      </p:sp>
+      <p:sp>
+        <p:nvSpPr>
+          <p:cNvPr id="98" name="TextBox 97">
+            <a:extLst>
+              <a:ext uri="{FF2B5EF4-FFF2-40B4-BE49-F238E27FC236}">
+                <a16:creationId xmlns:a16="http://schemas.microsoft.com/office/drawing/2014/main" id="{7C89C3A8-5EAA-0C7C-D9E4-1E4B3909EBC8}"/>
+              </a:ext>
+            </a:extLst>
+          </p:cNvPr>
+          <p:cNvSpPr txBox="1"/>
+          <p:nvPr/>
+        </p:nvSpPr>
+        <p:spPr>
+          <a:xfrm>
+            <a:off x="6002861" y="6092825"/>
+            <a:ext cx="433315" cy="246221"/>
+          </a:xfrm>
+          <a:prstGeom prst="rect">
+            <a:avLst/>
+          </a:prstGeom>
+          <a:noFill/>
+        </p:spPr>
+        <p:txBody>
+          <a:bodyPr wrap="square" rtlCol="0">
+            <a:spAutoFit/>
+          </a:bodyPr>
+          <a:lstStyle/>
+          <a:p>
+            <a:r>
+              <a:rPr lang="en-GB" sz="1000" dirty="0">
+                <a:solidFill>
+                  <a:schemeClr val="tx1">
+                    <a:lumMod val="50000"/>
+                    <a:lumOff val="50000"/>
+                  </a:schemeClr>
+                </a:solidFill>
+                <a:latin typeface="Aptos" panose="020B0004020202020204" pitchFamily="34" charset="0"/>
+              </a:rPr>
+              <a:t>10.5</a:t>
+            </a:r>
+          </a:p>
+        </p:txBody>
+      </p:sp>
+      <p:sp>
+        <p:nvSpPr>
+          <p:cNvPr id="99" name="TextBox 98">
+            <a:extLst>
+              <a:ext uri="{FF2B5EF4-FFF2-40B4-BE49-F238E27FC236}">
+                <a16:creationId xmlns:a16="http://schemas.microsoft.com/office/drawing/2014/main" id="{7BF49BFA-FCE5-37B6-3322-30032CA035EA}"/>
+              </a:ext>
+            </a:extLst>
+          </p:cNvPr>
+          <p:cNvSpPr txBox="1"/>
+          <p:nvPr/>
+        </p:nvSpPr>
+        <p:spPr>
+          <a:xfrm>
+            <a:off x="6002861" y="7358583"/>
+            <a:ext cx="433315" cy="246221"/>
+          </a:xfrm>
+          <a:prstGeom prst="rect">
+            <a:avLst/>
+          </a:prstGeom>
+          <a:noFill/>
+        </p:spPr>
+        <p:txBody>
+          <a:bodyPr wrap="square" rtlCol="0">
+            <a:spAutoFit/>
+          </a:bodyPr>
+          <a:lstStyle/>
+          <a:p>
+            <a:r>
+              <a:rPr lang="en-GB" sz="1000" dirty="0">
+                <a:solidFill>
+                  <a:schemeClr val="tx1">
+                    <a:lumMod val="50000"/>
+                    <a:lumOff val="50000"/>
+                  </a:schemeClr>
+                </a:solidFill>
+                <a:latin typeface="Aptos" panose="020B0004020202020204" pitchFamily="34" charset="0"/>
+              </a:rPr>
+              <a:t>4.5</a:t>
+            </a:r>
+          </a:p>
+        </p:txBody>
+      </p:sp>
+      <p:sp>
+        <p:nvSpPr>
+          <p:cNvPr id="100" name="TextBox 99">
+            <a:extLst>
+              <a:ext uri="{FF2B5EF4-FFF2-40B4-BE49-F238E27FC236}">
+                <a16:creationId xmlns:a16="http://schemas.microsoft.com/office/drawing/2014/main" id="{3810E10D-233E-192F-E764-BC5AEBD140CA}"/>
+              </a:ext>
+            </a:extLst>
+          </p:cNvPr>
+          <p:cNvSpPr txBox="1"/>
+          <p:nvPr/>
+        </p:nvSpPr>
+        <p:spPr>
+          <a:xfrm>
+            <a:off x="6002861" y="6940839"/>
+            <a:ext cx="433315" cy="246221"/>
+          </a:xfrm>
+          <a:prstGeom prst="rect">
+            <a:avLst/>
+          </a:prstGeom>
+          <a:noFill/>
+        </p:spPr>
+        <p:txBody>
+          <a:bodyPr wrap="square" rtlCol="0">
+            <a:spAutoFit/>
+          </a:bodyPr>
+          <a:lstStyle/>
+          <a:p>
+            <a:r>
+              <a:rPr lang="en-GB" sz="1000" dirty="0">
+                <a:solidFill>
+                  <a:schemeClr val="tx1">
+                    <a:lumMod val="50000"/>
+                    <a:lumOff val="50000"/>
+                  </a:schemeClr>
+                </a:solidFill>
+                <a:latin typeface="Aptos" panose="020B0004020202020204" pitchFamily="34" charset="0"/>
+              </a:rPr>
+              <a:t>6.5</a:t>
+            </a:r>
+          </a:p>
+        </p:txBody>
+      </p:sp>
+      <p:sp>
+        <p:nvSpPr>
+          <p:cNvPr id="101" name="TextBox 100">
+            <a:extLst>
+              <a:ext uri="{FF2B5EF4-FFF2-40B4-BE49-F238E27FC236}">
+                <a16:creationId xmlns:a16="http://schemas.microsoft.com/office/drawing/2014/main" id="{87E8E644-5256-6F3C-07ED-5C55FE638F1C}"/>
+              </a:ext>
+            </a:extLst>
+          </p:cNvPr>
+          <p:cNvSpPr txBox="1"/>
+          <p:nvPr/>
+        </p:nvSpPr>
+        <p:spPr>
+          <a:xfrm>
+            <a:off x="6002861" y="8194071"/>
+            <a:ext cx="433315" cy="246221"/>
+          </a:xfrm>
+          <a:prstGeom prst="rect">
+            <a:avLst/>
+          </a:prstGeom>
+          <a:noFill/>
+        </p:spPr>
+        <p:txBody>
+          <a:bodyPr wrap="square" rtlCol="0">
+            <a:spAutoFit/>
+          </a:bodyPr>
+          <a:lstStyle/>
+          <a:p>
+            <a:r>
+              <a:rPr lang="en-GB" sz="1000" dirty="0">
+                <a:solidFill>
+                  <a:schemeClr val="tx1">
+                    <a:lumMod val="50000"/>
+                    <a:lumOff val="50000"/>
+                  </a:schemeClr>
+                </a:solidFill>
+                <a:latin typeface="Aptos" panose="020B0004020202020204" pitchFamily="34" charset="0"/>
+              </a:rPr>
+              <a:t>2.5</a:t>
+            </a:r>
+          </a:p>
+        </p:txBody>
+      </p:sp>
+      <p:sp>
+        <p:nvSpPr>
+          <p:cNvPr id="102" name="TextBox 101">
+            <a:extLst>
+              <a:ext uri="{FF2B5EF4-FFF2-40B4-BE49-F238E27FC236}">
+                <a16:creationId xmlns:a16="http://schemas.microsoft.com/office/drawing/2014/main" id="{09487492-2BFD-7E60-8F1E-4990C80286FF}"/>
+              </a:ext>
+            </a:extLst>
+          </p:cNvPr>
+          <p:cNvSpPr txBox="1"/>
+          <p:nvPr/>
+        </p:nvSpPr>
+        <p:spPr>
+          <a:xfrm>
+            <a:off x="6002861" y="7788853"/>
+            <a:ext cx="433315" cy="246221"/>
+          </a:xfrm>
+          <a:prstGeom prst="rect">
+            <a:avLst/>
+          </a:prstGeom>
+          <a:noFill/>
+        </p:spPr>
+        <p:txBody>
+          <a:bodyPr wrap="square" rtlCol="0">
+            <a:spAutoFit/>
+          </a:bodyPr>
+          <a:lstStyle/>
+          <a:p>
+            <a:r>
+              <a:rPr lang="en-GB" sz="1000" dirty="0">
+                <a:solidFill>
+                  <a:schemeClr val="tx1">
+                    <a:lumMod val="50000"/>
+                    <a:lumOff val="50000"/>
+                  </a:schemeClr>
+                </a:solidFill>
+                <a:latin typeface="Aptos" panose="020B0004020202020204" pitchFamily="34" charset="0"/>
+              </a:rPr>
+              <a:t>3.5</a:t>
+            </a:r>
+          </a:p>
+        </p:txBody>
+      </p:sp>
+      <p:sp>
+        <p:nvSpPr>
+          <p:cNvPr id="103" name="TextBox 102">
+            <a:extLst>
+              <a:ext uri="{FF2B5EF4-FFF2-40B4-BE49-F238E27FC236}">
+                <a16:creationId xmlns:a16="http://schemas.microsoft.com/office/drawing/2014/main" id="{A34808D0-85BC-49FD-DE30-3E36BC1F3EB7}"/>
+              </a:ext>
+            </a:extLst>
+          </p:cNvPr>
+          <p:cNvSpPr txBox="1"/>
+          <p:nvPr/>
+        </p:nvSpPr>
+        <p:spPr>
+          <a:xfrm>
+            <a:off x="6002861" y="9029559"/>
+            <a:ext cx="433315" cy="246221"/>
+          </a:xfrm>
+          <a:prstGeom prst="rect">
+            <a:avLst/>
+          </a:prstGeom>
+          <a:noFill/>
+        </p:spPr>
+        <p:txBody>
+          <a:bodyPr wrap="square" rtlCol="0">
+            <a:spAutoFit/>
+          </a:bodyPr>
+          <a:lstStyle/>
+          <a:p>
+            <a:r>
+              <a:rPr lang="en-GB" sz="1000" dirty="0">
+                <a:solidFill>
+                  <a:schemeClr val="tx1">
+                    <a:lumMod val="50000"/>
+                    <a:lumOff val="50000"/>
+                  </a:schemeClr>
+                </a:solidFill>
+                <a:latin typeface="Aptos" panose="020B0004020202020204" pitchFamily="34" charset="0"/>
+              </a:rPr>
+              <a:t>0.5</a:t>
+            </a:r>
+          </a:p>
+        </p:txBody>
+      </p:sp>
+      <p:sp>
+        <p:nvSpPr>
+          <p:cNvPr id="104" name="TextBox 103">
+            <a:extLst>
+              <a:ext uri="{FF2B5EF4-FFF2-40B4-BE49-F238E27FC236}">
+                <a16:creationId xmlns:a16="http://schemas.microsoft.com/office/drawing/2014/main" id="{CCAF333D-D62A-6E5A-9E5C-A77D4E489CC7}"/>
+              </a:ext>
+            </a:extLst>
+          </p:cNvPr>
+          <p:cNvSpPr txBox="1"/>
+          <p:nvPr/>
+        </p:nvSpPr>
+        <p:spPr>
+          <a:xfrm>
+            <a:off x="6002861" y="8611815"/>
+            <a:ext cx="433315" cy="246221"/>
+          </a:xfrm>
+          <a:prstGeom prst="rect">
+            <a:avLst/>
+          </a:prstGeom>
+          <a:noFill/>
+        </p:spPr>
+        <p:txBody>
+          <a:bodyPr wrap="square" rtlCol="0">
+            <a:spAutoFit/>
+          </a:bodyPr>
+          <a:lstStyle/>
+          <a:p>
+            <a:r>
+              <a:rPr lang="en-GB" sz="1000" dirty="0">
+                <a:solidFill>
+                  <a:schemeClr val="tx1">
+                    <a:lumMod val="50000"/>
+                    <a:lumOff val="50000"/>
+                  </a:schemeClr>
+                </a:solidFill>
+                <a:latin typeface="Aptos" panose="020B0004020202020204" pitchFamily="34" charset="0"/>
+              </a:rPr>
+              <a:t>1.5</a:t>
+            </a:r>
+          </a:p>
+        </p:txBody>
+      </p:sp>
+      <p:sp>
+        <p:nvSpPr>
+          <p:cNvPr id="105" name="TextBox 104">
+            <a:extLst>
+              <a:ext uri="{FF2B5EF4-FFF2-40B4-BE49-F238E27FC236}">
+                <a16:creationId xmlns:a16="http://schemas.microsoft.com/office/drawing/2014/main" id="{E801BCDD-D7EC-8708-6E95-AEB9AD3D0562}"/>
+              </a:ext>
+            </a:extLst>
+          </p:cNvPr>
+          <p:cNvSpPr txBox="1"/>
+          <p:nvPr/>
+        </p:nvSpPr>
+        <p:spPr>
+          <a:xfrm>
+            <a:off x="6002861" y="9434770"/>
+            <a:ext cx="433315" cy="246221"/>
+          </a:xfrm>
+          <a:prstGeom prst="rect">
+            <a:avLst/>
+          </a:prstGeom>
+          <a:noFill/>
+        </p:spPr>
+        <p:txBody>
+          <a:bodyPr wrap="square" rtlCol="0">
+            <a:spAutoFit/>
+          </a:bodyPr>
+          <a:lstStyle/>
+          <a:p>
+            <a:r>
+              <a:rPr lang="en-GB" sz="1000" dirty="0">
+                <a:solidFill>
+                  <a:schemeClr val="tx1">
+                    <a:lumMod val="50000"/>
+                    <a:lumOff val="50000"/>
+                  </a:schemeClr>
+                </a:solidFill>
+                <a:latin typeface="Aptos" panose="020B0004020202020204" pitchFamily="34" charset="0"/>
+              </a:rPr>
+              <a:t>0</a:t>
+            </a:r>
+          </a:p>
+        </p:txBody>
+      </p:sp>
+      <p:sp>
+        <p:nvSpPr>
+          <p:cNvPr id="106" name="TextBox 105">
+            <a:extLst>
+              <a:ext uri="{FF2B5EF4-FFF2-40B4-BE49-F238E27FC236}">
+                <a16:creationId xmlns:a16="http://schemas.microsoft.com/office/drawing/2014/main" id="{3D6B6A65-7136-1666-0656-0F83A85E5896}"/>
+              </a:ext>
+            </a:extLst>
+          </p:cNvPr>
+          <p:cNvSpPr txBox="1"/>
+          <p:nvPr/>
+        </p:nvSpPr>
+        <p:spPr>
+          <a:xfrm>
+            <a:off x="5799551" y="515102"/>
+            <a:ext cx="497132" cy="246221"/>
+          </a:xfrm>
+          <a:prstGeom prst="rect">
+            <a:avLst/>
+          </a:prstGeom>
+          <a:noFill/>
+        </p:spPr>
+        <p:txBody>
+          <a:bodyPr wrap="square" rtlCol="0">
+            <a:spAutoFit/>
+          </a:bodyPr>
+          <a:lstStyle/>
+          <a:p>
+            <a:pPr algn="ctr"/>
+            <a:r>
+              <a:rPr lang="en-GB" sz="1000" dirty="0">
+                <a:solidFill>
+                  <a:schemeClr val="tx1">
+                    <a:lumMod val="50000"/>
+                    <a:lumOff val="50000"/>
+                  </a:schemeClr>
+                </a:solidFill>
+                <a:latin typeface="Aptos" panose="020B0004020202020204" pitchFamily="34" charset="0"/>
+              </a:rPr>
+              <a:t>%</a:t>
+            </a:r>
           </a:p>
         </p:txBody>
       </p:sp>
@@ -4992,9 +6538,9 @@
 </file>
 
 <file path=ppt/theme/theme1.xml><?xml version="1.0" encoding="utf-8"?>
-<a:theme xmlns:a="http://schemas.openxmlformats.org/drawingml/2006/main" name="Office Theme">
+<a:theme xmlns:a="http://schemas.openxmlformats.org/drawingml/2006/main" name="Office 2013 - 2022 Theme">
   <a:themeElements>
-    <a:clrScheme name="Office Theme">
+    <a:clrScheme name="Office 2013 - 2022 Theme">
       <a:dk1>
         <a:sysClr val="windowText" lastClr="000000"/>
       </a:dk1>
@@ -5032,7 +6578,7 @@
         <a:srgbClr val="954F72"/>
       </a:folHlink>
     </a:clrScheme>
-    <a:fontScheme name="Office Theme">
+    <a:fontScheme name="Office 2013 - 2022 Theme">
       <a:majorFont>
         <a:latin typeface="Calibri Light" panose="020F0302020204030204"/>
         <a:ea typeface=""/>
@@ -5104,7 +6650,7 @@
         <a:font script="Geor" typeface="Sylfaen"/>
       </a:minorFont>
     </a:fontScheme>
-    <a:fmtScheme name="Office Theme">
+    <a:fmtScheme name="Office 2013 - 2022 Theme">
       <a:fillStyleLst>
         <a:solidFill>
           <a:schemeClr val="phClr"/>
@@ -5246,7 +6792,7 @@
   <a:extraClrSchemeLst/>
   <a:extLst>
     <a:ext uri="{05A4C25C-085E-4340-85A3-A5531E510DB2}">
-      <thm15:themeFamily xmlns:thm15="http://schemas.microsoft.com/office/thememl/2012/main" name="Office Theme 2013 - 2022" id="{62F939B6-93AF-4DB8-9C6B-D6C7DFDC589F}" vid="{4A3C46E8-61CC-4603-A589-7422A47A8E4A}"/>
+      <thm15:themeFamily xmlns:thm15="http://schemas.microsoft.com/office/thememl/2012/main" name="Office 2013 - 2022 Theme" id="{62F939B6-93AF-4DB8-9C6B-D6C7DFDC589F}" vid="{4A3C46E8-61CC-4603-A589-7422A47A8E4A}"/>
     </a:ext>
   </a:extLst>
 </a:theme>

</xml_diff>